<commit_message>
Presentación con requerimientos actualizados
</commit_message>
<xml_diff>
--- a/Documentos/RECICLAJE INTELIGENTE.pptx
+++ b/Documentos/RECICLAJE INTELIGENTE.pptx
@@ -13,9 +13,10 @@
     <p:sldId id="268" r:id="rId7"/>
     <p:sldId id="270" r:id="rId8"/>
     <p:sldId id="269" r:id="rId9"/>
-    <p:sldId id="264" r:id="rId10"/>
-    <p:sldId id="265" r:id="rId11"/>
-    <p:sldId id="266" r:id="rId12"/>
+    <p:sldId id="271" r:id="rId10"/>
+    <p:sldId id="264" r:id="rId11"/>
+    <p:sldId id="265" r:id="rId12"/>
+    <p:sldId id="266" r:id="rId13"/>
   </p:sldIdLst>
   <p:sldSz cx="12192000" cy="6858000"/>
   <p:notesSz cx="6858000" cy="9144000"/>
@@ -253,7 +254,7 @@
           <a:p>
             <a:fld id="{6111638D-ECAC-4911-BF78-2D55BB98130A}" type="datetimeFigureOut">
               <a:rPr lang="en-US" smtClean="0"/>
-              <a:t>3/4/2019</a:t>
+              <a:t>3/6/2019</a:t>
             </a:fld>
             <a:endParaRPr lang="en-US" dirty="0"/>
           </a:p>
@@ -423,7 +424,7 @@
           <a:p>
             <a:fld id="{6111638D-ECAC-4911-BF78-2D55BB98130A}" type="datetimeFigureOut">
               <a:rPr lang="en-US" smtClean="0"/>
-              <a:t>3/4/2019</a:t>
+              <a:t>3/6/2019</a:t>
             </a:fld>
             <a:endParaRPr lang="en-US" dirty="0"/>
           </a:p>
@@ -603,7 +604,7 @@
           <a:p>
             <a:fld id="{6111638D-ECAC-4911-BF78-2D55BB98130A}" type="datetimeFigureOut">
               <a:rPr lang="en-US" smtClean="0"/>
-              <a:t>3/4/2019</a:t>
+              <a:t>3/6/2019</a:t>
             </a:fld>
             <a:endParaRPr lang="en-US" dirty="0"/>
           </a:p>
@@ -773,7 +774,7 @@
           <a:p>
             <a:fld id="{6111638D-ECAC-4911-BF78-2D55BB98130A}" type="datetimeFigureOut">
               <a:rPr lang="en-US" smtClean="0"/>
-              <a:t>3/4/2019</a:t>
+              <a:t>3/6/2019</a:t>
             </a:fld>
             <a:endParaRPr lang="en-US" dirty="0"/>
           </a:p>
@@ -1019,7 +1020,7 @@
           <a:p>
             <a:fld id="{6111638D-ECAC-4911-BF78-2D55BB98130A}" type="datetimeFigureOut">
               <a:rPr lang="en-US" smtClean="0"/>
-              <a:t>3/4/2019</a:t>
+              <a:t>3/6/2019</a:t>
             </a:fld>
             <a:endParaRPr lang="en-US" dirty="0"/>
           </a:p>
@@ -1251,7 +1252,7 @@
           <a:p>
             <a:fld id="{6111638D-ECAC-4911-BF78-2D55BB98130A}" type="datetimeFigureOut">
               <a:rPr lang="en-US" smtClean="0"/>
-              <a:t>3/4/2019</a:t>
+              <a:t>3/6/2019</a:t>
             </a:fld>
             <a:endParaRPr lang="en-US" dirty="0"/>
           </a:p>
@@ -1618,7 +1619,7 @@
           <a:p>
             <a:fld id="{6111638D-ECAC-4911-BF78-2D55BB98130A}" type="datetimeFigureOut">
               <a:rPr lang="en-US" smtClean="0"/>
-              <a:t>3/4/2019</a:t>
+              <a:t>3/6/2019</a:t>
             </a:fld>
             <a:endParaRPr lang="en-US" dirty="0"/>
           </a:p>
@@ -1736,7 +1737,7 @@
           <a:p>
             <a:fld id="{6111638D-ECAC-4911-BF78-2D55BB98130A}" type="datetimeFigureOut">
               <a:rPr lang="en-US" smtClean="0"/>
-              <a:t>3/4/2019</a:t>
+              <a:t>3/6/2019</a:t>
             </a:fld>
             <a:endParaRPr lang="en-US" dirty="0"/>
           </a:p>
@@ -1831,7 +1832,7 @@
           <a:p>
             <a:fld id="{6111638D-ECAC-4911-BF78-2D55BB98130A}" type="datetimeFigureOut">
               <a:rPr lang="en-US" smtClean="0"/>
-              <a:t>3/4/2019</a:t>
+              <a:t>3/6/2019</a:t>
             </a:fld>
             <a:endParaRPr lang="en-US" dirty="0"/>
           </a:p>
@@ -2108,7 +2109,7 @@
           <a:p>
             <a:fld id="{6111638D-ECAC-4911-BF78-2D55BB98130A}" type="datetimeFigureOut">
               <a:rPr lang="en-US" smtClean="0"/>
-              <a:t>3/4/2019</a:t>
+              <a:t>3/6/2019</a:t>
             </a:fld>
             <a:endParaRPr lang="en-US" dirty="0"/>
           </a:p>
@@ -2361,7 +2362,7 @@
           <a:p>
             <a:fld id="{6111638D-ECAC-4911-BF78-2D55BB98130A}" type="datetimeFigureOut">
               <a:rPr lang="en-US" smtClean="0"/>
-              <a:t>3/4/2019</a:t>
+              <a:t>3/6/2019</a:t>
             </a:fld>
             <a:endParaRPr lang="en-US" dirty="0"/>
           </a:p>
@@ -2574,7 +2575,7 @@
           <a:p>
             <a:fld id="{6111638D-ECAC-4911-BF78-2D55BB98130A}" type="datetimeFigureOut">
               <a:rPr lang="en-US" smtClean="0"/>
-              <a:t>3/4/2019</a:t>
+              <a:t>3/6/2019</a:t>
             </a:fld>
             <a:endParaRPr lang="en-US" dirty="0"/>
           </a:p>
@@ -3266,6 +3267,103 @@
         </p:blipFill>
         <p:spPr>
           <a:xfrm>
+            <a:off x="1658983" y="-1"/>
+            <a:ext cx="8373291" cy="6858000"/>
+          </a:xfrm>
+          <a:prstGeom prst="rect">
+            <a:avLst/>
+          </a:prstGeom>
+        </p:spPr>
+      </p:pic>
+    </p:spTree>
+    <p:extLst>
+      <p:ext uri="{BB962C8B-B14F-4D97-AF65-F5344CB8AC3E}">
+        <p14:creationId xmlns:p14="http://schemas.microsoft.com/office/powerpoint/2010/main" val="3066148774"/>
+      </p:ext>
+    </p:extLst>
+  </p:cSld>
+  <p:clrMapOvr>
+    <a:masterClrMapping/>
+  </p:clrMapOvr>
+  <p:timing>
+    <p:tnLst>
+      <p:par>
+        <p:cTn id="1" dur="indefinite" restart="never" nodeType="tmRoot"/>
+      </p:par>
+    </p:tnLst>
+  </p:timing>
+</p:sld>
+</file>
+
+<file path=ppt/slides/slide11.xml><?xml version="1.0" encoding="utf-8"?>
+<p:sld xmlns:a="http://schemas.openxmlformats.org/drawingml/2006/main" xmlns:r="http://schemas.openxmlformats.org/officeDocument/2006/relationships" xmlns:p="http://schemas.openxmlformats.org/presentationml/2006/main">
+  <p:cSld>
+    <p:spTree>
+      <p:nvGrpSpPr>
+        <p:cNvPr id="1" name=""/>
+        <p:cNvGrpSpPr/>
+        <p:nvPr/>
+      </p:nvGrpSpPr>
+      <p:grpSpPr>
+        <a:xfrm>
+          <a:off x="0" y="0"/>
+          <a:ext cx="0" cy="0"/>
+          <a:chOff x="0" y="0"/>
+          <a:chExt cx="0" cy="0"/>
+        </a:xfrm>
+      </p:grpSpPr>
+      <p:pic>
+        <p:nvPicPr>
+          <p:cNvPr id="4" name="Imagen 3"/>
+          <p:cNvPicPr>
+            <a:picLocks noChangeAspect="1"/>
+          </p:cNvPicPr>
+          <p:nvPr/>
+        </p:nvPicPr>
+        <p:blipFill>
+          <a:blip r:embed="rId2" cstate="print">
+            <a:extLst>
+              <a:ext uri="{28A0092B-C50C-407E-A947-70E740481C1C}">
+                <a14:useLocalDpi xmlns:a14="http://schemas.microsoft.com/office/drawing/2010/main" val="0"/>
+              </a:ext>
+            </a:extLst>
+          </a:blip>
+          <a:stretch>
+            <a:fillRect/>
+          </a:stretch>
+        </p:blipFill>
+        <p:spPr>
+          <a:xfrm>
+            <a:off x="0" y="0"/>
+            <a:ext cx="12192000" cy="6858000"/>
+          </a:xfrm>
+          <a:prstGeom prst="rect">
+            <a:avLst/>
+          </a:prstGeom>
+        </p:spPr>
+      </p:pic>
+      <p:pic>
+        <p:nvPicPr>
+          <p:cNvPr id="5" name="Imagen 4"/>
+          <p:cNvPicPr>
+            <a:picLocks noChangeAspect="1"/>
+          </p:cNvPicPr>
+          <p:nvPr/>
+        </p:nvPicPr>
+        <p:blipFill>
+          <a:blip r:embed="rId3" cstate="print">
+            <a:extLst>
+              <a:ext uri="{28A0092B-C50C-407E-A947-70E740481C1C}">
+                <a14:useLocalDpi xmlns:a14="http://schemas.microsoft.com/office/drawing/2010/main" val="0"/>
+              </a:ext>
+            </a:extLst>
+          </a:blip>
+          <a:stretch>
+            <a:fillRect/>
+          </a:stretch>
+        </p:blipFill>
+        <p:spPr>
+          <a:xfrm>
             <a:off x="1685109" y="0"/>
             <a:ext cx="8360228" cy="6858000"/>
           </a:xfrm>
@@ -3294,7 +3392,7 @@
 </p:sld>
 </file>
 
-<file path=ppt/slides/slide11.xml><?xml version="1.0" encoding="utf-8"?>
+<file path=ppt/slides/slide12.xml><?xml version="1.0" encoding="utf-8"?>
 <p:sld xmlns:a="http://schemas.openxmlformats.org/drawingml/2006/main" xmlns:r="http://schemas.openxmlformats.org/officeDocument/2006/relationships" xmlns:p="http://schemas.openxmlformats.org/presentationml/2006/main">
   <p:cSld>
     <p:spTree>
@@ -5725,14 +5823,14 @@
             <p:ph idx="1"/>
             <p:extLst>
               <p:ext uri="{D42A27DB-BD31-4B8C-83A1-F6EECF244321}">
-                <p14:modId xmlns:p14="http://schemas.microsoft.com/office/powerpoint/2010/main" val="2032068273"/>
+                <p14:modId xmlns:p14="http://schemas.microsoft.com/office/powerpoint/2010/main" val="1918928838"/>
               </p:ext>
             </p:extLst>
           </p:nvPr>
         </p:nvGraphicFramePr>
         <p:xfrm>
           <a:off x="1072242" y="1107871"/>
-          <a:ext cx="9995264" cy="5076725"/>
+          <a:ext cx="9995264" cy="4178683"/>
         </p:xfrm>
         <a:graphic>
           <a:graphicData uri="http://schemas.openxmlformats.org/drawingml/2006/table">
@@ -5922,7 +6020,16 @@
                           <a:ea typeface="+mn-ea"/>
                           <a:cs typeface="+mn-cs"/>
                         </a:rPr>
-                        <a:t> e Historial.</a:t>
+                        <a:t> </a:t>
+                      </a:r>
+                      <a:r>
+                        <a:rPr lang="es-CO" sz="1300" baseline="0" dirty="0" smtClean="0">
+                          <a:effectLst/>
+                          <a:latin typeface="+mn-lt"/>
+                          <a:ea typeface="+mn-ea"/>
+                          <a:cs typeface="+mn-cs"/>
+                        </a:rPr>
+                        <a:t>e Historial.</a:t>
                       </a:r>
                       <a:endParaRPr lang="en-US" sz="1300" dirty="0">
                         <a:effectLst/>
@@ -5999,10 +6106,16 @@
                         <a:t>02 </a:t>
                       </a:r>
                       <a:r>
-                        <a:rPr lang="es-CO" sz="1300" dirty="0">
-                          <a:effectLst/>
-                        </a:rPr>
-                        <a:t>Caja</a:t>
+                        <a:rPr lang="es-CO" sz="1300" dirty="0" smtClean="0">
+                          <a:effectLst/>
+                        </a:rPr>
+                        <a:t>Base</a:t>
+                      </a:r>
+                      <a:r>
+                        <a:rPr lang="es-CO" sz="1300" baseline="0" dirty="0" smtClean="0">
+                          <a:effectLst/>
+                        </a:rPr>
+                        <a:t> de datos</a:t>
                       </a:r>
                       <a:endParaRPr lang="en-US" sz="1300" dirty="0">
                         <a:effectLst/>
@@ -6032,13 +6145,16 @@
                         </a:spcAft>
                       </a:pPr>
                       <a:r>
-                        <a:rPr lang="es-CO" sz="1300" dirty="0">
+                        <a:rPr lang="es-CO" sz="1300" dirty="0" smtClean="0">
                           <a:solidFill>
                             <a:schemeClr val="tx1"/>
                           </a:solidFill>
                           <a:effectLst/>
-                        </a:rPr>
-                        <a:t>Scanner</a:t>
+                          <a:latin typeface="+mn-lt"/>
+                          <a:ea typeface="+mn-ea"/>
+                          <a:cs typeface="+mn-cs"/>
+                        </a:rPr>
+                        <a:t>CRUD</a:t>
                       </a:r>
                       <a:endParaRPr lang="en-US" sz="1300" dirty="0">
                         <a:solidFill>
@@ -6064,10 +6180,16 @@
                         </a:spcAft>
                       </a:pPr>
                       <a:r>
-                        <a:rPr lang="es-CO" sz="1300" dirty="0">
-                          <a:effectLst/>
-                        </a:rPr>
-                        <a:t> El Scanner debe cumplir la función de que cuando una persona deposite un material en la caja, se active inmediatamente el sistema.</a:t>
+                        <a:rPr lang="es-CO" sz="1300" dirty="0" smtClean="0">
+                          <a:effectLst/>
+                        </a:rPr>
+                        <a:t>La</a:t>
+                      </a:r>
+                      <a:r>
+                        <a:rPr lang="es-CO" sz="1300" baseline="0" dirty="0" smtClean="0">
+                          <a:effectLst/>
+                        </a:rPr>
+                        <a:t> base de datos debe contar con un CRUD para las tablas de basura, categoría y usuario.</a:t>
                       </a:r>
                       <a:endParaRPr lang="en-US" sz="1300" dirty="0">
                         <a:effectLst/>
@@ -6112,7 +6234,7 @@
                           </a:solidFill>
                           <a:effectLst/>
                         </a:rPr>
-                        <a:t>#3</a:t>
+                        <a:t>#7.2</a:t>
                       </a:r>
                       <a:endParaRPr lang="en-US" sz="1300" dirty="0">
                         <a:solidFill>
@@ -6144,10 +6266,16 @@
                         <a:t>03 </a:t>
                       </a:r>
                       <a:r>
-                        <a:rPr lang="es-CO" sz="1300" dirty="0">
-                          <a:effectLst/>
-                        </a:rPr>
-                        <a:t>Caja</a:t>
+                        <a:rPr lang="es-CO" sz="1300" dirty="0" smtClean="0">
+                          <a:effectLst/>
+                        </a:rPr>
+                        <a:t>Base</a:t>
+                      </a:r>
+                      <a:r>
+                        <a:rPr lang="es-CO" sz="1300" baseline="0" dirty="0" smtClean="0">
+                          <a:effectLst/>
+                        </a:rPr>
+                        <a:t> de datos</a:t>
                       </a:r>
                       <a:endParaRPr lang="en-US" sz="1300" dirty="0">
                         <a:effectLst/>
@@ -6177,13 +6305,28 @@
                         </a:spcAft>
                       </a:pPr>
                       <a:r>
-                        <a:rPr lang="es-CO" sz="1300" dirty="0">
+                        <a:rPr lang="en-US" sz="1300" dirty="0" smtClean="0">
                           <a:solidFill>
                             <a:schemeClr val="tx1"/>
                           </a:solidFill>
                           <a:effectLst/>
-                        </a:rPr>
-                        <a:t>Servomotor 1</a:t>
+                          <a:latin typeface="Times New Roman" panose="02020603050405020304" pitchFamily="18" charset="0"/>
+                          <a:ea typeface="Times New Roman" panose="02020603050405020304" pitchFamily="18" charset="0"/>
+                          <a:cs typeface="Times New Roman" panose="02020603050405020304" pitchFamily="18" charset="0"/>
+                        </a:rPr>
+                        <a:t>Procedimiento</a:t>
+                      </a:r>
+                      <a:r>
+                        <a:rPr lang="en-US" sz="1300" baseline="0" dirty="0" smtClean="0">
+                          <a:solidFill>
+                            <a:schemeClr val="tx1"/>
+                          </a:solidFill>
+                          <a:effectLst/>
+                          <a:latin typeface="Times New Roman" panose="02020603050405020304" pitchFamily="18" charset="0"/>
+                          <a:ea typeface="Times New Roman" panose="02020603050405020304" pitchFamily="18" charset="0"/>
+                          <a:cs typeface="Times New Roman" panose="02020603050405020304" pitchFamily="18" charset="0"/>
+                        </a:rPr>
+                        <a:t> de historial</a:t>
                       </a:r>
                       <a:endParaRPr lang="en-US" sz="1300" dirty="0">
                         <a:solidFill>
@@ -6209,10 +6352,16 @@
                         </a:spcAft>
                       </a:pPr>
                       <a:r>
-                        <a:rPr lang="es-CO" sz="1300" dirty="0">
-                          <a:effectLst/>
-                        </a:rPr>
-                        <a:t> Luego de que el material haya sido analizado, el servomotor debe abrir la escotilla para dejar entrar a este hacia los ductos que posteriormente lo llevarán hacia su respectivo basurero. </a:t>
+                        <a:rPr lang="es-CO" sz="1300" dirty="0" smtClean="0">
+                          <a:effectLst/>
+                        </a:rPr>
+                        <a:t>La</a:t>
+                      </a:r>
+                      <a:r>
+                        <a:rPr lang="es-CO" sz="1300" baseline="0" dirty="0" smtClean="0">
+                          <a:effectLst/>
+                        </a:rPr>
+                        <a:t> base de datos debe contar con un procedimiento de almacenado para guardar los historiales de las basuras</a:t>
                       </a:r>
                       <a:endParaRPr lang="en-US" sz="1300" dirty="0">
                         <a:effectLst/>
@@ -6257,7 +6406,7 @@
                           </a:solidFill>
                           <a:effectLst/>
                         </a:rPr>
-                        <a:t>#3.1</a:t>
+                        <a:t>#8</a:t>
                       </a:r>
                       <a:endParaRPr lang="en-US" sz="1300" dirty="0">
                         <a:solidFill>
@@ -6286,7 +6435,19 @@
                         <a:rPr lang="es-CO" sz="1300" dirty="0">
                           <a:effectLst/>
                         </a:rPr>
-                        <a:t>01 Ductos</a:t>
+                        <a:t>01 </a:t>
+                      </a:r>
+                      <a:r>
+                        <a:rPr lang="es-CO" sz="1300" dirty="0" smtClean="0">
+                          <a:effectLst/>
+                        </a:rPr>
+                        <a:t>Página</a:t>
+                      </a:r>
+                      <a:r>
+                        <a:rPr lang="es-CO" sz="1300" baseline="0" dirty="0" smtClean="0">
+                          <a:effectLst/>
+                        </a:rPr>
+                        <a:t> web</a:t>
                       </a:r>
                       <a:endParaRPr lang="en-US" sz="1300" dirty="0">
                         <a:effectLst/>
@@ -6316,22 +6477,16 @@
                         </a:spcAft>
                       </a:pPr>
                       <a:r>
-                        <a:rPr lang="es-CO" sz="1300" dirty="0">
-                          <a:solidFill>
-                            <a:schemeClr val="tx1"/>
-                          </a:solidFill>
-                          <a:effectLst/>
-                        </a:rPr>
-                        <a:t>Servomotores 2 </a:t>
-                      </a:r>
-                      <a:r>
                         <a:rPr lang="es-CO" sz="1300" dirty="0" smtClean="0">
                           <a:solidFill>
                             <a:schemeClr val="tx1"/>
                           </a:solidFill>
                           <a:effectLst/>
-                        </a:rPr>
-                        <a:t>y</a:t>
+                          <a:latin typeface="+mn-lt"/>
+                          <a:ea typeface="+mn-ea"/>
+                          <a:cs typeface="+mn-cs"/>
+                        </a:rPr>
+                        <a:t>Inicio</a:t>
                       </a:r>
                       <a:r>
                         <a:rPr lang="es-CO" sz="1300" baseline="0" dirty="0" smtClean="0">
@@ -6339,8 +6494,11 @@
                             <a:schemeClr val="tx1"/>
                           </a:solidFill>
                           <a:effectLst/>
-                        </a:rPr>
-                        <a:t> 3</a:t>
+                          <a:latin typeface="+mn-lt"/>
+                          <a:ea typeface="+mn-ea"/>
+                          <a:cs typeface="+mn-cs"/>
+                        </a:rPr>
+                        <a:t> de sesión</a:t>
                       </a:r>
                       <a:endParaRPr lang="en-US" sz="1300" dirty="0">
                         <a:solidFill>
@@ -6366,34 +6524,16 @@
                         </a:spcAft>
                       </a:pPr>
                       <a:r>
-                        <a:rPr lang="es-CO" sz="1300" dirty="0">
-                          <a:effectLst/>
-                        </a:rPr>
-                        <a:t> Los servomotores deben </a:t>
-                      </a:r>
-                      <a:r>
                         <a:rPr lang="es-CO" sz="1300" dirty="0" smtClean="0">
                           <a:effectLst/>
                         </a:rPr>
-                        <a:t>mover</a:t>
+                        <a:t>La</a:t>
                       </a:r>
                       <a:r>
                         <a:rPr lang="es-CO" sz="1300" baseline="0" dirty="0" smtClean="0">
                           <a:effectLst/>
                         </a:rPr>
-                        <a:t> las </a:t>
-                      </a:r>
-                      <a:r>
-                        <a:rPr lang="es-CO" sz="1300" dirty="0" smtClean="0">
-                          <a:effectLst/>
-                        </a:rPr>
-                        <a:t>escotillas </a:t>
-                      </a:r>
-                      <a:r>
-                        <a:rPr lang="es-CO" sz="1300" dirty="0">
-                          <a:effectLst/>
-                        </a:rPr>
-                        <a:t>dependiendo de las condiciones que arroje el sistema, para así llevar el material a su respectivo basurero.</a:t>
+                        <a:t> página web deberá contar con un inicio de sesión para los administradores y los empleados </a:t>
                       </a:r>
                       <a:endParaRPr lang="en-US" sz="1300" dirty="0">
                         <a:effectLst/>
@@ -6438,7 +6578,7 @@
                           </a:solidFill>
                           <a:effectLst/>
                         </a:rPr>
-                        <a:t>#4</a:t>
+                        <a:t>#8.1</a:t>
                       </a:r>
                       <a:endParaRPr lang="en-US" sz="1300" dirty="0">
                         <a:solidFill>
@@ -6464,10 +6604,16 @@
                         </a:spcAft>
                       </a:pPr>
                       <a:r>
-                        <a:rPr lang="es-CO" sz="1300" dirty="0">
-                          <a:effectLst/>
-                        </a:rPr>
-                        <a:t>01 Sistema</a:t>
+                        <a:rPr lang="es-CO" sz="1300" dirty="0" smtClean="0">
+                          <a:effectLst/>
+                        </a:rPr>
+                        <a:t>02</a:t>
+                      </a:r>
+                      <a:r>
+                        <a:rPr lang="es-CO" sz="1300" baseline="0" dirty="0" smtClean="0">
+                          <a:effectLst/>
+                        </a:rPr>
+                        <a:t> Página web</a:t>
                       </a:r>
                       <a:endParaRPr lang="en-US" sz="1300" dirty="0">
                         <a:effectLst/>
@@ -6497,13 +6643,16 @@
                         </a:spcAft>
                       </a:pPr>
                       <a:r>
-                        <a:rPr lang="es-CO" sz="1300" dirty="0">
+                        <a:rPr lang="es-CO" sz="1300" dirty="0" smtClean="0">
                           <a:solidFill>
                             <a:schemeClr val="tx1"/>
                           </a:solidFill>
                           <a:effectLst/>
-                        </a:rPr>
-                        <a:t>Análisis</a:t>
+                          <a:latin typeface="+mn-lt"/>
+                          <a:ea typeface="+mn-ea"/>
+                          <a:cs typeface="+mn-cs"/>
+                        </a:rPr>
+                        <a:t>Filtro de opciones</a:t>
                       </a:r>
                       <a:endParaRPr lang="en-US" sz="1300" dirty="0">
                         <a:solidFill>
@@ -6529,28 +6678,82 @@
                         </a:spcAft>
                       </a:pPr>
                       <a:r>
-                        <a:rPr lang="es-CO" sz="1300" dirty="0">
-                          <a:effectLst/>
-                        </a:rPr>
-                        <a:t> El sistema debe analizar el material usando la API de Google llamada </a:t>
-                      </a:r>
-                      <a:r>
-                        <a:rPr lang="es-CO" sz="1300" dirty="0" err="1">
-                          <a:effectLst/>
-                        </a:rPr>
-                        <a:t>Vision</a:t>
-                      </a:r>
-                      <a:r>
-                        <a:rPr lang="es-CO" sz="1300" dirty="0">
-                          <a:effectLst/>
-                        </a:rPr>
-                        <a:t> para así determinar el nombre del objeto que está en la foto.</a:t>
-                      </a:r>
-                      <a:endParaRPr lang="en-US" sz="1300" dirty="0">
+                        <a:rPr lang="en-US" sz="1300" b="0" dirty="0" smtClean="0">
+                          <a:effectLst/>
+                          <a:latin typeface="+mn-lt"/>
+                          <a:ea typeface="Times New Roman" panose="02020603050405020304" pitchFamily="18" charset="0"/>
+                          <a:cs typeface="Segoe UI Semibold" panose="020B0702040204020203" pitchFamily="34" charset="0"/>
+                        </a:rPr>
+                        <a:t>La página</a:t>
+                      </a:r>
+                      <a:r>
+                        <a:rPr lang="en-US" sz="1300" b="0" baseline="0" dirty="0" smtClean="0">
+                          <a:effectLst/>
+                          <a:latin typeface="+mn-lt"/>
+                          <a:ea typeface="Times New Roman" panose="02020603050405020304" pitchFamily="18" charset="0"/>
+                          <a:cs typeface="Segoe UI Semibold" panose="020B0702040204020203" pitchFamily="34" charset="0"/>
+                        </a:rPr>
+                        <a:t> </a:t>
+                      </a:r>
+                      <a:r>
+                        <a:rPr lang="es-CO" sz="1300" b="0" baseline="0" noProof="0" dirty="0" smtClean="0">
+                          <a:effectLst/>
+                          <a:latin typeface="+mn-lt"/>
+                          <a:ea typeface="Times New Roman" panose="02020603050405020304" pitchFamily="18" charset="0"/>
+                          <a:cs typeface="Segoe UI Semibold" panose="020B0702040204020203" pitchFamily="34" charset="0"/>
+                        </a:rPr>
+                        <a:t>web</a:t>
+                      </a:r>
+                      <a:r>
+                        <a:rPr lang="en-US" sz="1300" b="0" baseline="0" dirty="0" smtClean="0">
+                          <a:effectLst/>
+                          <a:latin typeface="+mn-lt"/>
+                          <a:ea typeface="Times New Roman" panose="02020603050405020304" pitchFamily="18" charset="0"/>
+                          <a:cs typeface="Segoe UI Semibold" panose="020B0702040204020203" pitchFamily="34" charset="0"/>
+                        </a:rPr>
+                        <a:t> </a:t>
+                      </a:r>
+                      <a:r>
+                        <a:rPr lang="es-419" sz="1300" b="0" baseline="0" noProof="0" dirty="0" smtClean="0">
+                          <a:effectLst/>
+                          <a:latin typeface="+mn-lt"/>
+                          <a:ea typeface="Times New Roman" panose="02020603050405020304" pitchFamily="18" charset="0"/>
+                          <a:cs typeface="Segoe UI Semibold" panose="020B0702040204020203" pitchFamily="34" charset="0"/>
+                        </a:rPr>
+                        <a:t>deberá</a:t>
+                      </a:r>
+                      <a:r>
+                        <a:rPr lang="en-US" sz="1300" b="0" baseline="0" noProof="0" dirty="0" smtClean="0">
+                          <a:effectLst/>
+                          <a:latin typeface="+mn-lt"/>
+                          <a:ea typeface="Times New Roman" panose="02020603050405020304" pitchFamily="18" charset="0"/>
+                          <a:cs typeface="Segoe UI Semibold" panose="020B0702040204020203" pitchFamily="34" charset="0"/>
+                        </a:rPr>
+                        <a:t>, según quién inicie sesión, habilitar y deshabilitar ciertas </a:t>
+                      </a:r>
+                      <a:r>
+                        <a:rPr lang="es-CO" sz="1300" b="0" baseline="0" noProof="0" dirty="0" smtClean="0">
+                          <a:effectLst/>
+                          <a:latin typeface="+mn-lt"/>
+                          <a:ea typeface="Times New Roman" panose="02020603050405020304" pitchFamily="18" charset="0"/>
+                          <a:cs typeface="Segoe UI Semibold" panose="020B0702040204020203" pitchFamily="34" charset="0"/>
+                        </a:rPr>
+                        <a:t>opciones</a:t>
+                      </a:r>
+                      <a:r>
+                        <a:rPr lang="en-US" sz="1300" b="0" baseline="0" noProof="0" dirty="0" smtClean="0">
+                          <a:effectLst/>
+                          <a:latin typeface="+mn-lt"/>
+                          <a:ea typeface="Times New Roman" panose="02020603050405020304" pitchFamily="18" charset="0"/>
+                          <a:cs typeface="Segoe UI Semibold" panose="020B0702040204020203" pitchFamily="34" charset="0"/>
+                        </a:rPr>
+                        <a:t>.</a:t>
+                      </a:r>
+                      <a:endParaRPr lang="en-US" sz="1300" b="0" dirty="0">
                         <a:effectLst/>
-                        <a:latin typeface="Times New Roman" panose="02020603050405020304" pitchFamily="18" charset="0"/>
+                        <a:latin typeface="+mn-lt"/>
                         <a:ea typeface="Times New Roman" panose="02020603050405020304" pitchFamily="18" charset="0"/>
-                        <a:cs typeface="Times New Roman" panose="02020603050405020304" pitchFamily="18" charset="0"/>
+                        <a:cs typeface="Segoe UI Semibold" panose="020B0702040204020203" pitchFamily="34" charset="0"/>
                       </a:endParaRPr>
                     </a:p>
                   </a:txBody>
@@ -6589,7 +6792,7 @@
                           </a:solidFill>
                           <a:effectLst/>
                         </a:rPr>
-                        <a:t>#5</a:t>
+                        <a:t>#8.2</a:t>
                       </a:r>
                       <a:endParaRPr lang="en-US" sz="1300" dirty="0">
                         <a:solidFill>
@@ -6615,10 +6818,16 @@
                         </a:spcAft>
                       </a:pPr>
                       <a:r>
-                        <a:rPr lang="es-CO" sz="1300" dirty="0">
-                          <a:effectLst/>
-                        </a:rPr>
-                        <a:t>02 Sistema</a:t>
+                        <a:rPr lang="es-CO" sz="1300" dirty="0" smtClean="0">
+                          <a:effectLst/>
+                        </a:rPr>
+                        <a:t>03</a:t>
+                      </a:r>
+                      <a:r>
+                        <a:rPr lang="es-CO" sz="1300" baseline="0" dirty="0" smtClean="0">
+                          <a:effectLst/>
+                        </a:rPr>
+                        <a:t> Página web</a:t>
                       </a:r>
                       <a:endParaRPr lang="en-US" sz="1300" dirty="0">
                         <a:effectLst/>
@@ -6648,13 +6857,16 @@
                         </a:spcAft>
                       </a:pPr>
                       <a:r>
-                        <a:rPr lang="es-CO" sz="1300" dirty="0">
+                        <a:rPr lang="es-CO" sz="1300" dirty="0" smtClean="0">
                           <a:solidFill>
                             <a:schemeClr val="tx1"/>
                           </a:solidFill>
                           <a:effectLst/>
-                        </a:rPr>
-                        <a:t>Filtro</a:t>
+                          <a:latin typeface="+mn-lt"/>
+                          <a:ea typeface="+mn-ea"/>
+                          <a:cs typeface="+mn-cs"/>
+                        </a:rPr>
+                        <a:t>Reportes</a:t>
                       </a:r>
                       <a:endParaRPr lang="en-US" sz="1300" dirty="0">
                         <a:solidFill>
@@ -6683,55 +6895,19 @@
                         <a:rPr lang="es-CO" sz="1300" dirty="0">
                           <a:effectLst/>
                         </a:rPr>
-                        <a:t> El sistema debe tomar el </a:t>
+                        <a:t> </a:t>
                       </a:r>
                       <a:r>
                         <a:rPr lang="es-CO" sz="1300" dirty="0" smtClean="0">
                           <a:effectLst/>
                         </a:rPr>
-                        <a:t>nombre </a:t>
-                      </a:r>
-                      <a:r>
-                        <a:rPr lang="es-CO" sz="1300" dirty="0">
-                          <a:effectLst/>
-                        </a:rPr>
-                        <a:t>del objeto de la foto para buscar en la base de datos </a:t>
-                      </a:r>
-                      <a:r>
-                        <a:rPr lang="es-CO" sz="1300" dirty="0" smtClean="0">
-                          <a:effectLst/>
-                        </a:rPr>
-                        <a:t>la</a:t>
+                        <a:t>La</a:t>
                       </a:r>
                       <a:r>
                         <a:rPr lang="es-CO" sz="1300" baseline="0" dirty="0" smtClean="0">
                           <a:effectLst/>
                         </a:rPr>
-                        <a:t> categoría</a:t>
-                      </a:r>
-                      <a:r>
-                        <a:rPr lang="es-CO" sz="1300" dirty="0" smtClean="0">
-                          <a:effectLst/>
-                        </a:rPr>
-                        <a:t> a</a:t>
-                      </a:r>
-                      <a:r>
-                        <a:rPr lang="es-CO" sz="1300" baseline="0" dirty="0" smtClean="0">
-                          <a:effectLst/>
-                        </a:rPr>
-                        <a:t> la</a:t>
-                      </a:r>
-                      <a:r>
-                        <a:rPr lang="es-CO" sz="1300" dirty="0" smtClean="0">
-                          <a:effectLst/>
-                        </a:rPr>
-                        <a:t> </a:t>
-                      </a:r>
-                      <a:r>
-                        <a:rPr lang="es-CO" sz="1300" dirty="0">
-                          <a:effectLst/>
-                        </a:rPr>
-                        <a:t>que pertenece.</a:t>
+                        <a:t> página web deberá mostrar reportes de las basuras ingresadas.</a:t>
                       </a:r>
                       <a:endParaRPr lang="en-US" sz="1300" dirty="0">
                         <a:effectLst/>
@@ -6746,169 +6922,6 @@
                 <a:extLst>
                   <a:ext uri="{0D108BD9-81ED-4DB2-BD59-A6C34878D82A}">
                     <a16:rowId xmlns:a16="http://schemas.microsoft.com/office/drawing/2014/main" val="149762803"/>
-                  </a:ext>
-                </a:extLst>
-              </a:tr>
-              <a:tr h="162933">
-                <a:tc>
-                  <a:txBody>
-                    <a:bodyPr/>
-                    <a:lstStyle/>
-                    <a:p>
-                      <a:pPr>
-                        <a:spcAft>
-                          <a:spcPts val="0"/>
-                        </a:spcAft>
-                      </a:pPr>
-                      <a:r>
-                        <a:rPr lang="es-CO" sz="1300" dirty="0">
-                          <a:solidFill>
-                            <a:schemeClr val="tx1"/>
-                          </a:solidFill>
-                          <a:effectLst/>
-                        </a:rPr>
-                        <a:t>RF </a:t>
-                      </a:r>
-                      <a:r>
-                        <a:rPr lang="es-CO" sz="1300" dirty="0" smtClean="0">
-                          <a:solidFill>
-                            <a:schemeClr val="tx1"/>
-                          </a:solidFill>
-                          <a:effectLst/>
-                        </a:rPr>
-                        <a:t>#6</a:t>
-                      </a:r>
-                      <a:endParaRPr lang="en-US" sz="1300" dirty="0">
-                        <a:solidFill>
-                          <a:schemeClr val="tx1"/>
-                        </a:solidFill>
-                        <a:effectLst/>
-                        <a:latin typeface="Times New Roman" panose="02020603050405020304" pitchFamily="18" charset="0"/>
-                        <a:ea typeface="Times New Roman" panose="02020603050405020304" pitchFamily="18" charset="0"/>
-                        <a:cs typeface="Times New Roman" panose="02020603050405020304" pitchFamily="18" charset="0"/>
-                      </a:endParaRPr>
-                    </a:p>
-                  </a:txBody>
-                  <a:tcPr marL="43417" marR="43417" marT="0" marB="0"/>
-                </a:tc>
-                <a:tc>
-                  <a:txBody>
-                    <a:bodyPr/>
-                    <a:lstStyle/>
-                    <a:p>
-                      <a:pPr>
-                        <a:spcAft>
-                          <a:spcPts val="0"/>
-                        </a:spcAft>
-                      </a:pPr>
-                      <a:r>
-                        <a:rPr lang="es-CO" sz="1300" dirty="0">
-                          <a:effectLst/>
-                        </a:rPr>
-                        <a:t>03 Sistema</a:t>
-                      </a:r>
-                      <a:endParaRPr lang="en-US" sz="1300" dirty="0">
-                        <a:effectLst/>
-                        <a:latin typeface="Times New Roman" panose="02020603050405020304" pitchFamily="18" charset="0"/>
-                        <a:ea typeface="Times New Roman" panose="02020603050405020304" pitchFamily="18" charset="0"/>
-                        <a:cs typeface="Times New Roman" panose="02020603050405020304" pitchFamily="18" charset="0"/>
-                      </a:endParaRPr>
-                    </a:p>
-                  </a:txBody>
-                  <a:tcPr marL="43417" marR="43417" marT="0" marB="0"/>
-                </a:tc>
-                <a:extLst>
-                  <a:ext uri="{0D108BD9-81ED-4DB2-BD59-A6C34878D82A}">
-                    <a16:rowId xmlns:a16="http://schemas.microsoft.com/office/drawing/2014/main" val="330776940"/>
-                  </a:ext>
-                </a:extLst>
-              </a:tr>
-              <a:tr h="325865">
-                <a:tc>
-                  <a:txBody>
-                    <a:bodyPr/>
-                    <a:lstStyle/>
-                    <a:p>
-                      <a:pPr>
-                        <a:spcAft>
-                          <a:spcPts val="0"/>
-                        </a:spcAft>
-                      </a:pPr>
-                      <a:r>
-                        <a:rPr lang="es-CO" sz="1300" dirty="0">
-                          <a:solidFill>
-                            <a:schemeClr val="tx1"/>
-                          </a:solidFill>
-                          <a:effectLst/>
-                        </a:rPr>
-                        <a:t>Condiciones</a:t>
-                      </a:r>
-                      <a:endParaRPr lang="en-US" sz="1300" dirty="0">
-                        <a:solidFill>
-                          <a:schemeClr val="tx1"/>
-                        </a:solidFill>
-                        <a:effectLst/>
-                        <a:latin typeface="Times New Roman" panose="02020603050405020304" pitchFamily="18" charset="0"/>
-                        <a:ea typeface="Times New Roman" panose="02020603050405020304" pitchFamily="18" charset="0"/>
-                        <a:cs typeface="Times New Roman" panose="02020603050405020304" pitchFamily="18" charset="0"/>
-                      </a:endParaRPr>
-                    </a:p>
-                  </a:txBody>
-                  <a:tcPr marL="43417" marR="43417" marT="0" marB="0"/>
-                </a:tc>
-                <a:tc>
-                  <a:txBody>
-                    <a:bodyPr/>
-                    <a:lstStyle/>
-                    <a:p>
-                      <a:pPr>
-                        <a:spcAft>
-                          <a:spcPts val="0"/>
-                        </a:spcAft>
-                      </a:pPr>
-                      <a:r>
-                        <a:rPr lang="es-CO" sz="1300" dirty="0">
-                          <a:effectLst/>
-                        </a:rPr>
-                        <a:t> El sistema debe realizar unas condiciones para determinar </a:t>
-                      </a:r>
-                      <a:r>
-                        <a:rPr lang="es-CO" sz="1300" dirty="0" smtClean="0">
-                          <a:effectLst/>
-                        </a:rPr>
-                        <a:t>hacia</a:t>
-                      </a:r>
-                      <a:r>
-                        <a:rPr lang="es-CO" sz="1300" baseline="0" dirty="0" smtClean="0">
-                          <a:effectLst/>
-                        </a:rPr>
-                        <a:t> que lugar mover los</a:t>
-                      </a:r>
-                      <a:r>
-                        <a:rPr lang="es-CO" sz="1300" dirty="0" smtClean="0">
-                          <a:effectLst/>
-                        </a:rPr>
-                        <a:t> servomotores </a:t>
-                      </a:r>
-                      <a:r>
-                        <a:rPr lang="es-CO" sz="1300" dirty="0">
-                          <a:effectLst/>
-                        </a:rPr>
-                        <a:t>para llevar el objeto a su respectivo basurero.</a:t>
-                      </a:r>
-                      <a:endParaRPr lang="en-US" sz="1300" dirty="0">
-                        <a:effectLst/>
-                        <a:latin typeface="Times New Roman" panose="02020603050405020304" pitchFamily="18" charset="0"/>
-                        <a:ea typeface="Times New Roman" panose="02020603050405020304" pitchFamily="18" charset="0"/>
-                        <a:cs typeface="Times New Roman" panose="02020603050405020304" pitchFamily="18" charset="0"/>
-                      </a:endParaRPr>
-                    </a:p>
-                  </a:txBody>
-                  <a:tcPr marL="43417" marR="43417" marT="0" marB="0"/>
-                </a:tc>
-                <a:extLst>
-                  <a:ext uri="{0D108BD9-81ED-4DB2-BD59-A6C34878D82A}">
-                    <a16:rowId xmlns:a16="http://schemas.microsoft.com/office/drawing/2014/main" val="4258149965"/>
                   </a:ext>
                 </a:extLst>
               </a:tr>
@@ -7042,7 +7055,11 @@
           </p:cNvGraphicFramePr>
           <p:nvPr>
             <p:ph idx="1"/>
-            <p:extLst/>
+            <p:extLst>
+              <p:ext uri="{D42A27DB-BD31-4B8C-83A1-F6EECF244321}">
+                <p14:modId xmlns:p14="http://schemas.microsoft.com/office/powerpoint/2010/main" val="3427632898"/>
+              </p:ext>
+            </p:extLst>
           </p:nvPr>
         </p:nvGraphicFramePr>
         <p:xfrm>
@@ -7182,7 +7199,16 @@
                           </a:solidFill>
                           <a:effectLst/>
                         </a:rPr>
-                        <a:t>#1.2 </a:t>
+                        <a:t>#</a:t>
+                      </a:r>
+                      <a:r>
+                        <a:rPr lang="es-419" sz="2000" dirty="0" smtClean="0">
+                          <a:solidFill>
+                            <a:schemeClr val="tx1"/>
+                          </a:solidFill>
+                          <a:effectLst/>
+                        </a:rPr>
+                        <a:t>1.1</a:t>
                       </a:r>
                       <a:endParaRPr lang="en-US" sz="2400" dirty="0">
                         <a:solidFill>
@@ -7364,7 +7390,7 @@
                           </a:solidFill>
                           <a:effectLst/>
                         </a:rPr>
-                        <a:t>#3</a:t>
+                        <a:t>#2.1</a:t>
                       </a:r>
                       <a:endParaRPr lang="en-US" sz="2400" dirty="0">
                         <a:solidFill>
@@ -7471,7 +7497,7 @@
       </p:grpSpPr>
       <p:pic>
         <p:nvPicPr>
-          <p:cNvPr id="4" name="Imagen 3"/>
+          <p:cNvPr id="6" name="Imagen 5"/>
           <p:cNvPicPr>
             <a:picLocks noChangeAspect="1"/>
           </p:cNvPicPr>
@@ -7499,40 +7525,526 @@
           </a:prstGeom>
         </p:spPr>
       </p:pic>
-      <p:pic>
-        <p:nvPicPr>
-          <p:cNvPr id="5" name="Imagen 4"/>
-          <p:cNvPicPr>
-            <a:picLocks noChangeAspect="1"/>
-          </p:cNvPicPr>
-          <p:nvPr/>
-        </p:nvPicPr>
-        <p:blipFill>
-          <a:blip r:embed="rId3" cstate="print">
-            <a:extLst>
-              <a:ext uri="{28A0092B-C50C-407E-A947-70E740481C1C}">
-                <a14:useLocalDpi xmlns:a14="http://schemas.microsoft.com/office/drawing/2010/main" val="0"/>
-              </a:ext>
-            </a:extLst>
-          </a:blip>
-          <a:stretch>
-            <a:fillRect/>
-          </a:stretch>
-        </p:blipFill>
-        <p:spPr>
-          <a:xfrm>
-            <a:off x="1658983" y="-1"/>
-            <a:ext cx="8373291" cy="6858000"/>
-          </a:xfrm>
-          <a:prstGeom prst="rect">
-            <a:avLst/>
-          </a:prstGeom>
-        </p:spPr>
-      </p:pic>
+      <p:sp>
+        <p:nvSpPr>
+          <p:cNvPr id="2" name="Título 1"/>
+          <p:cNvSpPr>
+            <a:spLocks noGrp="1"/>
+          </p:cNvSpPr>
+          <p:nvPr>
+            <p:ph type="title"/>
+          </p:nvPr>
+        </p:nvSpPr>
+        <p:spPr/>
+        <p:txBody>
+          <a:bodyPr/>
+          <a:lstStyle/>
+          <a:p>
+            <a:pPr algn="ctr"/>
+            <a:r>
+              <a:rPr lang="es-CO" b="1" dirty="0" smtClean="0">
+                <a:ln w="12700">
+                  <a:solidFill>
+                    <a:schemeClr val="tx2">
+                      <a:lumMod val="75000"/>
+                    </a:schemeClr>
+                  </a:solidFill>
+                  <a:prstDash val="solid"/>
+                </a:ln>
+                <a:pattFill prst="dkUpDiag">
+                  <a:fgClr>
+                    <a:schemeClr val="tx2"/>
+                  </a:fgClr>
+                  <a:bgClr>
+                    <a:schemeClr val="tx2">
+                      <a:lumMod val="20000"/>
+                      <a:lumOff val="80000"/>
+                    </a:schemeClr>
+                  </a:bgClr>
+                </a:pattFill>
+                <a:effectLst>
+                  <a:outerShdw dist="38100" dir="2640000" algn="bl" rotWithShape="0">
+                    <a:schemeClr val="tx2">
+                      <a:lumMod val="75000"/>
+                    </a:schemeClr>
+                  </a:outerShdw>
+                </a:effectLst>
+              </a:rPr>
+              <a:t>REQUERIMIENTOS NO FUNCIONALES</a:t>
+            </a:r>
+            <a:endParaRPr lang="en-US" dirty="0"/>
+          </a:p>
+        </p:txBody>
+      </p:sp>
+      <p:graphicFrame>
+        <p:nvGraphicFramePr>
+          <p:cNvPr id="7" name="Marcador de contenido 6"/>
+          <p:cNvGraphicFramePr>
+            <a:graphicFrameLocks noGrp="1"/>
+          </p:cNvGraphicFramePr>
+          <p:nvPr>
+            <p:ph idx="1"/>
+            <p:extLst>
+              <p:ext uri="{D42A27DB-BD31-4B8C-83A1-F6EECF244321}">
+                <p14:modId xmlns:p14="http://schemas.microsoft.com/office/powerpoint/2010/main" val="2660410362"/>
+              </p:ext>
+            </p:extLst>
+          </p:nvPr>
+        </p:nvGraphicFramePr>
+        <p:xfrm>
+          <a:off x="1254034" y="1815736"/>
+          <a:ext cx="9509759" cy="4917439"/>
+        </p:xfrm>
+        <a:graphic>
+          <a:graphicData uri="http://schemas.openxmlformats.org/drawingml/2006/table">
+            <a:tbl>
+              <a:tblPr firstRow="1" firstCol="1" bandRow="1">
+                <a:tableStyleId>{5C22544A-7EE6-4342-B048-85BDC9FD1C3A}</a:tableStyleId>
+              </a:tblPr>
+              <a:tblGrid>
+                <a:gridCol w="9509759">
+                  <a:extLst>
+                    <a:ext uri="{9D8B030D-6E8A-4147-A177-3AD203B41FA5}">
+                      <a16:colId xmlns:a16="http://schemas.microsoft.com/office/drawing/2014/main" val="1474160906"/>
+                    </a:ext>
+                  </a:extLst>
+                </a:gridCol>
+              </a:tblGrid>
+              <a:tr h="538480">
+                <a:tc>
+                  <a:txBody>
+                    <a:bodyPr/>
+                    <a:lstStyle/>
+                    <a:p>
+                      <a:pPr>
+                        <a:spcAft>
+                          <a:spcPts val="0"/>
+                        </a:spcAft>
+                      </a:pPr>
+                      <a:r>
+                        <a:rPr lang="es-419" sz="2000" dirty="0">
+                          <a:solidFill>
+                            <a:schemeClr val="tx1"/>
+                          </a:solidFill>
+                          <a:effectLst/>
+                        </a:rPr>
+                        <a:t>RNF </a:t>
+                      </a:r>
+                      <a:r>
+                        <a:rPr lang="es-419" sz="2000" dirty="0" smtClean="0">
+                          <a:solidFill>
+                            <a:schemeClr val="tx1"/>
+                          </a:solidFill>
+                          <a:effectLst/>
+                        </a:rPr>
+                        <a:t>#3</a:t>
+                      </a:r>
+                      <a:endParaRPr lang="en-US" sz="2400" dirty="0">
+                        <a:solidFill>
+                          <a:schemeClr val="tx1"/>
+                        </a:solidFill>
+                        <a:effectLst/>
+                        <a:latin typeface="Times New Roman" panose="02020603050405020304" pitchFamily="18" charset="0"/>
+                        <a:ea typeface="Times New Roman" panose="02020603050405020304" pitchFamily="18" charset="0"/>
+                        <a:cs typeface="Times New Roman" panose="02020603050405020304" pitchFamily="18" charset="0"/>
+                      </a:endParaRPr>
+                    </a:p>
+                  </a:txBody>
+                  <a:tcPr marL="68580" marR="68580" marT="0" marB="0"/>
+                </a:tc>
+                <a:extLst>
+                  <a:ext uri="{0D108BD9-81ED-4DB2-BD59-A6C34878D82A}">
+                    <a16:rowId xmlns:a16="http://schemas.microsoft.com/office/drawing/2014/main" val="3939597330"/>
+                  </a:ext>
+                </a:extLst>
+              </a:tr>
+              <a:tr h="538480">
+                <a:tc>
+                  <a:txBody>
+                    <a:bodyPr/>
+                    <a:lstStyle/>
+                    <a:p>
+                      <a:pPr>
+                        <a:spcAft>
+                          <a:spcPts val="0"/>
+                        </a:spcAft>
+                      </a:pPr>
+                      <a:r>
+                        <a:rPr lang="es-CO" sz="2000" dirty="0" smtClean="0">
+                          <a:solidFill>
+                            <a:schemeClr val="tx1"/>
+                          </a:solidFill>
+                          <a:effectLst/>
+                          <a:latin typeface="+mn-lt"/>
+                          <a:ea typeface="+mn-ea"/>
+                          <a:cs typeface="+mn-cs"/>
+                        </a:rPr>
+                        <a:t>La</a:t>
+                      </a:r>
+                      <a:r>
+                        <a:rPr lang="es-CO" sz="2000" baseline="0" dirty="0" smtClean="0">
+                          <a:solidFill>
+                            <a:schemeClr val="tx1"/>
+                          </a:solidFill>
+                          <a:effectLst/>
+                          <a:latin typeface="+mn-lt"/>
+                          <a:ea typeface="+mn-ea"/>
+                          <a:cs typeface="+mn-cs"/>
+                        </a:rPr>
+                        <a:t> página web deberá permitir hacer filtros en sus reportes.</a:t>
+                      </a:r>
+                      <a:endParaRPr lang="en-US" sz="2400" dirty="0">
+                        <a:solidFill>
+                          <a:schemeClr val="tx1"/>
+                        </a:solidFill>
+                        <a:effectLst/>
+                        <a:latin typeface="Times New Roman" panose="02020603050405020304" pitchFamily="18" charset="0"/>
+                        <a:ea typeface="Times New Roman" panose="02020603050405020304" pitchFamily="18" charset="0"/>
+                        <a:cs typeface="Times New Roman" panose="02020603050405020304" pitchFamily="18" charset="0"/>
+                      </a:endParaRPr>
+                    </a:p>
+                  </a:txBody>
+                  <a:tcPr marL="68580" marR="68580" marT="0" marB="0">
+                    <a:solidFill>
+                      <a:schemeClr val="bg1"/>
+                    </a:solidFill>
+                  </a:tcPr>
+                </a:tc>
+                <a:extLst>
+                  <a:ext uri="{0D108BD9-81ED-4DB2-BD59-A6C34878D82A}">
+                    <a16:rowId xmlns:a16="http://schemas.microsoft.com/office/drawing/2014/main" val="3416318852"/>
+                  </a:ext>
+                </a:extLst>
+              </a:tr>
+              <a:tr h="538480">
+                <a:tc>
+                  <a:txBody>
+                    <a:bodyPr/>
+                    <a:lstStyle/>
+                    <a:p>
+                      <a:pPr>
+                        <a:spcAft>
+                          <a:spcPts val="0"/>
+                        </a:spcAft>
+                      </a:pPr>
+                      <a:r>
+                        <a:rPr lang="es-419" sz="2000" dirty="0">
+                          <a:solidFill>
+                            <a:schemeClr val="tx1"/>
+                          </a:solidFill>
+                          <a:effectLst/>
+                        </a:rPr>
+                        <a:t> RNF </a:t>
+                      </a:r>
+                      <a:r>
+                        <a:rPr lang="es-419" sz="2000" dirty="0" smtClean="0">
+                          <a:solidFill>
+                            <a:schemeClr val="tx1"/>
+                          </a:solidFill>
+                          <a:effectLst/>
+                        </a:rPr>
+                        <a:t>#3.1</a:t>
+                      </a:r>
+                      <a:endParaRPr lang="en-US" sz="2400" dirty="0">
+                        <a:solidFill>
+                          <a:schemeClr val="tx1"/>
+                        </a:solidFill>
+                        <a:effectLst/>
+                        <a:latin typeface="Times New Roman" panose="02020603050405020304" pitchFamily="18" charset="0"/>
+                        <a:ea typeface="Times New Roman" panose="02020603050405020304" pitchFamily="18" charset="0"/>
+                        <a:cs typeface="Times New Roman" panose="02020603050405020304" pitchFamily="18" charset="0"/>
+                      </a:endParaRPr>
+                    </a:p>
+                  </a:txBody>
+                  <a:tcPr marL="68580" marR="68580" marT="0" marB="0"/>
+                </a:tc>
+                <a:extLst>
+                  <a:ext uri="{0D108BD9-81ED-4DB2-BD59-A6C34878D82A}">
+                    <a16:rowId xmlns:a16="http://schemas.microsoft.com/office/drawing/2014/main" val="3081683307"/>
+                  </a:ext>
+                </a:extLst>
+              </a:tr>
+              <a:tr h="538480">
+                <a:tc>
+                  <a:txBody>
+                    <a:bodyPr/>
+                    <a:lstStyle/>
+                    <a:p>
+                      <a:pPr>
+                        <a:spcAft>
+                          <a:spcPts val="0"/>
+                        </a:spcAft>
+                      </a:pPr>
+                      <a:r>
+                        <a:rPr lang="es-CO" sz="2000" dirty="0" smtClean="0">
+                          <a:solidFill>
+                            <a:schemeClr val="tx1"/>
+                          </a:solidFill>
+                          <a:effectLst/>
+                          <a:latin typeface="+mn-lt"/>
+                          <a:ea typeface="+mn-ea"/>
+                          <a:cs typeface="+mn-cs"/>
+                        </a:rPr>
+                        <a:t>Los</a:t>
+                      </a:r>
+                      <a:r>
+                        <a:rPr lang="es-CO" sz="2000" baseline="0" dirty="0" smtClean="0">
+                          <a:solidFill>
+                            <a:schemeClr val="tx1"/>
+                          </a:solidFill>
+                          <a:effectLst/>
+                          <a:latin typeface="+mn-lt"/>
+                          <a:ea typeface="+mn-ea"/>
+                          <a:cs typeface="+mn-cs"/>
+                        </a:rPr>
+                        <a:t> reportes deberán estar bien presentados y en un tipo de letra legible</a:t>
+                      </a:r>
+                      <a:endParaRPr lang="en-US" sz="2400" dirty="0">
+                        <a:solidFill>
+                          <a:schemeClr val="tx1"/>
+                        </a:solidFill>
+                        <a:effectLst/>
+                        <a:latin typeface="Times New Roman" panose="02020603050405020304" pitchFamily="18" charset="0"/>
+                        <a:ea typeface="Times New Roman" panose="02020603050405020304" pitchFamily="18" charset="0"/>
+                        <a:cs typeface="Times New Roman" panose="02020603050405020304" pitchFamily="18" charset="0"/>
+                      </a:endParaRPr>
+                    </a:p>
+                  </a:txBody>
+                  <a:tcPr marL="68580" marR="68580" marT="0" marB="0">
+                    <a:solidFill>
+                      <a:schemeClr val="bg1"/>
+                    </a:solidFill>
+                  </a:tcPr>
+                </a:tc>
+                <a:extLst>
+                  <a:ext uri="{0D108BD9-81ED-4DB2-BD59-A6C34878D82A}">
+                    <a16:rowId xmlns:a16="http://schemas.microsoft.com/office/drawing/2014/main" val="4171854245"/>
+                  </a:ext>
+                </a:extLst>
+              </a:tr>
+              <a:tr h="538480">
+                <a:tc>
+                  <a:txBody>
+                    <a:bodyPr/>
+                    <a:lstStyle/>
+                    <a:p>
+                      <a:pPr>
+                        <a:spcAft>
+                          <a:spcPts val="0"/>
+                        </a:spcAft>
+                      </a:pPr>
+                      <a:r>
+                        <a:rPr lang="es-419" sz="2000" dirty="0">
+                          <a:solidFill>
+                            <a:schemeClr val="tx1"/>
+                          </a:solidFill>
+                          <a:effectLst/>
+                        </a:rPr>
+                        <a:t>RNF </a:t>
+                      </a:r>
+                      <a:r>
+                        <a:rPr lang="es-419" sz="2000" dirty="0" smtClean="0">
+                          <a:solidFill>
+                            <a:schemeClr val="tx1"/>
+                          </a:solidFill>
+                          <a:effectLst/>
+                        </a:rPr>
+                        <a:t>#4</a:t>
+                      </a:r>
+                      <a:endParaRPr lang="en-US" sz="2400" dirty="0">
+                        <a:solidFill>
+                          <a:schemeClr val="tx1"/>
+                        </a:solidFill>
+                        <a:effectLst/>
+                        <a:latin typeface="Times New Roman" panose="02020603050405020304" pitchFamily="18" charset="0"/>
+                        <a:ea typeface="Times New Roman" panose="02020603050405020304" pitchFamily="18" charset="0"/>
+                        <a:cs typeface="Times New Roman" panose="02020603050405020304" pitchFamily="18" charset="0"/>
+                      </a:endParaRPr>
+                    </a:p>
+                  </a:txBody>
+                  <a:tcPr marL="68580" marR="68580" marT="0" marB="0"/>
+                </a:tc>
+                <a:extLst>
+                  <a:ext uri="{0D108BD9-81ED-4DB2-BD59-A6C34878D82A}">
+                    <a16:rowId xmlns:a16="http://schemas.microsoft.com/office/drawing/2014/main" val="3502950850"/>
+                  </a:ext>
+                </a:extLst>
+              </a:tr>
+              <a:tr h="538480">
+                <a:tc>
+                  <a:txBody>
+                    <a:bodyPr/>
+                    <a:lstStyle/>
+                    <a:p>
+                      <a:pPr>
+                        <a:spcAft>
+                          <a:spcPts val="0"/>
+                        </a:spcAft>
+                      </a:pPr>
+                      <a:r>
+                        <a:rPr lang="es-CO" sz="2000" dirty="0" smtClean="0">
+                          <a:solidFill>
+                            <a:schemeClr val="tx1"/>
+                          </a:solidFill>
+                          <a:effectLst/>
+                          <a:latin typeface="+mn-lt"/>
+                          <a:ea typeface="+mn-ea"/>
+                          <a:cs typeface="+mn-cs"/>
+                        </a:rPr>
+                        <a:t>La</a:t>
+                      </a:r>
+                      <a:r>
+                        <a:rPr lang="es-CO" sz="2000" baseline="0" dirty="0" smtClean="0">
+                          <a:solidFill>
+                            <a:schemeClr val="tx1"/>
+                          </a:solidFill>
+                          <a:effectLst/>
+                          <a:latin typeface="+mn-lt"/>
+                          <a:ea typeface="+mn-ea"/>
+                          <a:cs typeface="+mn-cs"/>
+                        </a:rPr>
+                        <a:t> página web no debe contar con más de 2 tipos de letras y debe tener buena presentación.</a:t>
+                      </a:r>
+                      <a:endParaRPr lang="en-US" sz="2400" dirty="0">
+                        <a:solidFill>
+                          <a:schemeClr val="tx1"/>
+                        </a:solidFill>
+                        <a:effectLst/>
+                        <a:latin typeface="Times New Roman" panose="02020603050405020304" pitchFamily="18" charset="0"/>
+                        <a:ea typeface="Times New Roman" panose="02020603050405020304" pitchFamily="18" charset="0"/>
+                        <a:cs typeface="Times New Roman" panose="02020603050405020304" pitchFamily="18" charset="0"/>
+                      </a:endParaRPr>
+                    </a:p>
+                  </a:txBody>
+                  <a:tcPr marL="68580" marR="68580" marT="0" marB="0">
+                    <a:solidFill>
+                      <a:schemeClr val="bg1"/>
+                    </a:solidFill>
+                  </a:tcPr>
+                </a:tc>
+                <a:extLst>
+                  <a:ext uri="{0D108BD9-81ED-4DB2-BD59-A6C34878D82A}">
+                    <a16:rowId xmlns:a16="http://schemas.microsoft.com/office/drawing/2014/main" val="537855034"/>
+                  </a:ext>
+                </a:extLst>
+              </a:tr>
+              <a:tr h="538480">
+                <a:tc>
+                  <a:txBody>
+                    <a:bodyPr/>
+                    <a:lstStyle/>
+                    <a:p>
+                      <a:pPr>
+                        <a:spcAft>
+                          <a:spcPts val="0"/>
+                        </a:spcAft>
+                      </a:pPr>
+                      <a:r>
+                        <a:rPr lang="es-419" sz="2000" dirty="0">
+                          <a:solidFill>
+                            <a:schemeClr val="tx1"/>
+                          </a:solidFill>
+                          <a:effectLst/>
+                        </a:rPr>
+                        <a:t>RNF </a:t>
+                      </a:r>
+                      <a:r>
+                        <a:rPr lang="es-419" sz="2000" dirty="0" smtClean="0">
+                          <a:solidFill>
+                            <a:schemeClr val="tx1"/>
+                          </a:solidFill>
+                          <a:effectLst/>
+                        </a:rPr>
+                        <a:t>#4.1</a:t>
+                      </a:r>
+                      <a:endParaRPr lang="en-US" sz="2400" dirty="0">
+                        <a:solidFill>
+                          <a:schemeClr val="tx1"/>
+                        </a:solidFill>
+                        <a:effectLst/>
+                        <a:latin typeface="Times New Roman" panose="02020603050405020304" pitchFamily="18" charset="0"/>
+                        <a:ea typeface="Times New Roman" panose="02020603050405020304" pitchFamily="18" charset="0"/>
+                        <a:cs typeface="Times New Roman" panose="02020603050405020304" pitchFamily="18" charset="0"/>
+                      </a:endParaRPr>
+                    </a:p>
+                  </a:txBody>
+                  <a:tcPr marL="68580" marR="68580" marT="0" marB="0"/>
+                </a:tc>
+                <a:extLst>
+                  <a:ext uri="{0D108BD9-81ED-4DB2-BD59-A6C34878D82A}">
+                    <a16:rowId xmlns:a16="http://schemas.microsoft.com/office/drawing/2014/main" val="2749552784"/>
+                  </a:ext>
+                </a:extLst>
+              </a:tr>
+              <a:tr h="1076959">
+                <a:tc>
+                  <a:txBody>
+                    <a:bodyPr/>
+                    <a:lstStyle/>
+                    <a:p>
+                      <a:pPr>
+                        <a:spcAft>
+                          <a:spcPts val="0"/>
+                        </a:spcAft>
+                      </a:pPr>
+                      <a:r>
+                        <a:rPr lang="es-419" sz="2000" dirty="0">
+                          <a:solidFill>
+                            <a:schemeClr val="tx1"/>
+                          </a:solidFill>
+                          <a:effectLst/>
+                        </a:rPr>
+                        <a:t> </a:t>
+                      </a:r>
+                      <a:r>
+                        <a:rPr lang="es-419" sz="2000" dirty="0" smtClean="0">
+                          <a:solidFill>
+                            <a:schemeClr val="tx1"/>
+                          </a:solidFill>
+                          <a:effectLst/>
+                        </a:rPr>
+                        <a:t>La</a:t>
+                      </a:r>
+                      <a:r>
+                        <a:rPr lang="es-419" sz="2000" baseline="0" dirty="0" smtClean="0">
+                          <a:solidFill>
+                            <a:schemeClr val="tx1"/>
+                          </a:solidFill>
+                          <a:effectLst/>
+                        </a:rPr>
+                        <a:t> página web deberá contar con secciones públicas para las personas comunes que entren.</a:t>
+                      </a:r>
+                      <a:endParaRPr lang="en-US" sz="2400" dirty="0">
+                        <a:solidFill>
+                          <a:schemeClr val="tx1"/>
+                        </a:solidFill>
+                        <a:effectLst/>
+                        <a:latin typeface="Times New Roman" panose="02020603050405020304" pitchFamily="18" charset="0"/>
+                        <a:ea typeface="Times New Roman" panose="02020603050405020304" pitchFamily="18" charset="0"/>
+                        <a:cs typeface="Times New Roman" panose="02020603050405020304" pitchFamily="18" charset="0"/>
+                      </a:endParaRPr>
+                    </a:p>
+                  </a:txBody>
+                  <a:tcPr marL="68580" marR="68580" marT="0" marB="0">
+                    <a:solidFill>
+                      <a:schemeClr val="bg1"/>
+                    </a:solidFill>
+                  </a:tcPr>
+                </a:tc>
+                <a:extLst>
+                  <a:ext uri="{0D108BD9-81ED-4DB2-BD59-A6C34878D82A}">
+                    <a16:rowId xmlns:a16="http://schemas.microsoft.com/office/drawing/2014/main" val="1851602698"/>
+                  </a:ext>
+                </a:extLst>
+              </a:tr>
+            </a:tbl>
+          </a:graphicData>
+        </a:graphic>
+      </p:graphicFrame>
     </p:spTree>
     <p:extLst>
       <p:ext uri="{BB962C8B-B14F-4D97-AF65-F5344CB8AC3E}">
-        <p14:creationId xmlns:p14="http://schemas.microsoft.com/office/powerpoint/2010/main" val="3066148774"/>
+        <p14:creationId xmlns:p14="http://schemas.microsoft.com/office/powerpoint/2010/main" val="803007280"/>
       </p:ext>
     </p:extLst>
   </p:cSld>

</xml_diff>

<commit_message>
Presentación con lista de chequeo
</commit_message>
<xml_diff>
--- a/Documentos/RECICLAJE INTELIGENTE.pptx
+++ b/Documentos/RECICLAJE INTELIGENTE.pptx
@@ -14,9 +14,13 @@
     <p:sldId id="270" r:id="rId8"/>
     <p:sldId id="269" r:id="rId9"/>
     <p:sldId id="271" r:id="rId10"/>
-    <p:sldId id="264" r:id="rId11"/>
-    <p:sldId id="265" r:id="rId12"/>
-    <p:sldId id="266" r:id="rId13"/>
+    <p:sldId id="272" r:id="rId11"/>
+    <p:sldId id="273" r:id="rId12"/>
+    <p:sldId id="274" r:id="rId13"/>
+    <p:sldId id="275" r:id="rId14"/>
+    <p:sldId id="264" r:id="rId15"/>
+    <p:sldId id="265" r:id="rId16"/>
+    <p:sldId id="266" r:id="rId17"/>
   </p:sldIdLst>
   <p:sldSz cx="12192000" cy="6858000"/>
   <p:notesSz cx="6858000" cy="9144000"/>
@@ -254,7 +258,7 @@
           <a:p>
             <a:fld id="{6111638D-ECAC-4911-BF78-2D55BB98130A}" type="datetimeFigureOut">
               <a:rPr lang="en-US" smtClean="0"/>
-              <a:t>3/6/2019</a:t>
+              <a:t>3/11/2019</a:t>
             </a:fld>
             <a:endParaRPr lang="en-US" dirty="0"/>
           </a:p>
@@ -424,7 +428,7 @@
           <a:p>
             <a:fld id="{6111638D-ECAC-4911-BF78-2D55BB98130A}" type="datetimeFigureOut">
               <a:rPr lang="en-US" smtClean="0"/>
-              <a:t>3/6/2019</a:t>
+              <a:t>3/11/2019</a:t>
             </a:fld>
             <a:endParaRPr lang="en-US" dirty="0"/>
           </a:p>
@@ -604,7 +608,7 @@
           <a:p>
             <a:fld id="{6111638D-ECAC-4911-BF78-2D55BB98130A}" type="datetimeFigureOut">
               <a:rPr lang="en-US" smtClean="0"/>
-              <a:t>3/6/2019</a:t>
+              <a:t>3/11/2019</a:t>
             </a:fld>
             <a:endParaRPr lang="en-US" dirty="0"/>
           </a:p>
@@ -774,7 +778,7 @@
           <a:p>
             <a:fld id="{6111638D-ECAC-4911-BF78-2D55BB98130A}" type="datetimeFigureOut">
               <a:rPr lang="en-US" smtClean="0"/>
-              <a:t>3/6/2019</a:t>
+              <a:t>3/11/2019</a:t>
             </a:fld>
             <a:endParaRPr lang="en-US" dirty="0"/>
           </a:p>
@@ -1020,7 +1024,7 @@
           <a:p>
             <a:fld id="{6111638D-ECAC-4911-BF78-2D55BB98130A}" type="datetimeFigureOut">
               <a:rPr lang="en-US" smtClean="0"/>
-              <a:t>3/6/2019</a:t>
+              <a:t>3/11/2019</a:t>
             </a:fld>
             <a:endParaRPr lang="en-US" dirty="0"/>
           </a:p>
@@ -1252,7 +1256,7 @@
           <a:p>
             <a:fld id="{6111638D-ECAC-4911-BF78-2D55BB98130A}" type="datetimeFigureOut">
               <a:rPr lang="en-US" smtClean="0"/>
-              <a:t>3/6/2019</a:t>
+              <a:t>3/11/2019</a:t>
             </a:fld>
             <a:endParaRPr lang="en-US" dirty="0"/>
           </a:p>
@@ -1619,7 +1623,7 @@
           <a:p>
             <a:fld id="{6111638D-ECAC-4911-BF78-2D55BB98130A}" type="datetimeFigureOut">
               <a:rPr lang="en-US" smtClean="0"/>
-              <a:t>3/6/2019</a:t>
+              <a:t>3/11/2019</a:t>
             </a:fld>
             <a:endParaRPr lang="en-US" dirty="0"/>
           </a:p>
@@ -1737,7 +1741,7 @@
           <a:p>
             <a:fld id="{6111638D-ECAC-4911-BF78-2D55BB98130A}" type="datetimeFigureOut">
               <a:rPr lang="en-US" smtClean="0"/>
-              <a:t>3/6/2019</a:t>
+              <a:t>3/11/2019</a:t>
             </a:fld>
             <a:endParaRPr lang="en-US" dirty="0"/>
           </a:p>
@@ -1832,7 +1836,7 @@
           <a:p>
             <a:fld id="{6111638D-ECAC-4911-BF78-2D55BB98130A}" type="datetimeFigureOut">
               <a:rPr lang="en-US" smtClean="0"/>
-              <a:t>3/6/2019</a:t>
+              <a:t>3/11/2019</a:t>
             </a:fld>
             <a:endParaRPr lang="en-US" dirty="0"/>
           </a:p>
@@ -2109,7 +2113,7 @@
           <a:p>
             <a:fld id="{6111638D-ECAC-4911-BF78-2D55BB98130A}" type="datetimeFigureOut">
               <a:rPr lang="en-US" smtClean="0"/>
-              <a:t>3/6/2019</a:t>
+              <a:t>3/11/2019</a:t>
             </a:fld>
             <a:endParaRPr lang="en-US" dirty="0"/>
           </a:p>
@@ -2362,7 +2366,7 @@
           <a:p>
             <a:fld id="{6111638D-ECAC-4911-BF78-2D55BB98130A}" type="datetimeFigureOut">
               <a:rPr lang="en-US" smtClean="0"/>
-              <a:t>3/6/2019</a:t>
+              <a:t>3/11/2019</a:t>
             </a:fld>
             <a:endParaRPr lang="en-US" dirty="0"/>
           </a:p>
@@ -2575,7 +2579,7 @@
           <a:p>
             <a:fld id="{6111638D-ECAC-4911-BF78-2D55BB98130A}" type="datetimeFigureOut">
               <a:rPr lang="en-US" smtClean="0"/>
-              <a:t>3/6/2019</a:t>
+              <a:t>3/11/2019</a:t>
             </a:fld>
             <a:endParaRPr lang="en-US" dirty="0"/>
           </a:p>
@@ -3217,6 +3221,3647 @@
       </p:grpSpPr>
       <p:pic>
         <p:nvPicPr>
+          <p:cNvPr id="6" name="Imagen 5"/>
+          <p:cNvPicPr>
+            <a:picLocks noChangeAspect="1"/>
+          </p:cNvPicPr>
+          <p:nvPr/>
+        </p:nvPicPr>
+        <p:blipFill>
+          <a:blip r:embed="rId2" cstate="print">
+            <a:extLst>
+              <a:ext uri="{28A0092B-C50C-407E-A947-70E740481C1C}">
+                <a14:useLocalDpi xmlns:a14="http://schemas.microsoft.com/office/drawing/2010/main" val="0"/>
+              </a:ext>
+            </a:extLst>
+          </a:blip>
+          <a:stretch>
+            <a:fillRect/>
+          </a:stretch>
+        </p:blipFill>
+        <p:spPr>
+          <a:xfrm>
+            <a:off x="0" y="0"/>
+            <a:ext cx="12192000" cy="6858000"/>
+          </a:xfrm>
+          <a:prstGeom prst="rect">
+            <a:avLst/>
+          </a:prstGeom>
+        </p:spPr>
+      </p:pic>
+      <p:sp>
+        <p:nvSpPr>
+          <p:cNvPr id="2" name="Título 1"/>
+          <p:cNvSpPr>
+            <a:spLocks noGrp="1"/>
+          </p:cNvSpPr>
+          <p:nvPr>
+            <p:ph type="title"/>
+          </p:nvPr>
+        </p:nvSpPr>
+        <p:spPr>
+          <a:xfrm>
+            <a:off x="668383" y="103868"/>
+            <a:ext cx="10515600" cy="1325563"/>
+          </a:xfrm>
+        </p:spPr>
+        <p:txBody>
+          <a:bodyPr>
+            <a:normAutofit/>
+          </a:bodyPr>
+          <a:lstStyle/>
+          <a:p>
+            <a:pPr algn="ctr"/>
+            <a:r>
+              <a:rPr lang="es-CO" sz="4000" b="1" dirty="0">
+                <a:ln w="12700">
+                  <a:solidFill>
+                    <a:schemeClr val="tx2">
+                      <a:lumMod val="75000"/>
+                    </a:schemeClr>
+                  </a:solidFill>
+                  <a:prstDash val="solid"/>
+                </a:ln>
+                <a:pattFill prst="dkUpDiag">
+                  <a:fgClr>
+                    <a:schemeClr val="tx2"/>
+                  </a:fgClr>
+                  <a:bgClr>
+                    <a:schemeClr val="tx2">
+                      <a:lumMod val="20000"/>
+                      <a:lumOff val="80000"/>
+                    </a:schemeClr>
+                  </a:bgClr>
+                </a:pattFill>
+                <a:effectLst>
+                  <a:outerShdw dist="38100" dir="2640000" algn="bl" rotWithShape="0">
+                    <a:schemeClr val="tx2">
+                      <a:lumMod val="75000"/>
+                    </a:schemeClr>
+                  </a:outerShdw>
+                </a:effectLst>
+              </a:rPr>
+              <a:t>L</a:t>
+            </a:r>
+            <a:r>
+              <a:rPr lang="es-CO" sz="4000" b="1" dirty="0" smtClean="0">
+                <a:ln w="12700">
+                  <a:solidFill>
+                    <a:schemeClr val="tx2">
+                      <a:lumMod val="75000"/>
+                    </a:schemeClr>
+                  </a:solidFill>
+                  <a:prstDash val="solid"/>
+                </a:ln>
+                <a:pattFill prst="dkUpDiag">
+                  <a:fgClr>
+                    <a:schemeClr val="tx2"/>
+                  </a:fgClr>
+                  <a:bgClr>
+                    <a:schemeClr val="tx2">
+                      <a:lumMod val="20000"/>
+                      <a:lumOff val="80000"/>
+                    </a:schemeClr>
+                  </a:bgClr>
+                </a:pattFill>
+                <a:effectLst>
+                  <a:outerShdw dist="38100" dir="2640000" algn="bl" rotWithShape="0">
+                    <a:schemeClr val="tx2">
+                      <a:lumMod val="75000"/>
+                    </a:schemeClr>
+                  </a:outerShdw>
+                </a:effectLst>
+              </a:rPr>
+              <a:t>ista de chequeo</a:t>
+            </a:r>
+            <a:endParaRPr lang="en-US" sz="4000" dirty="0"/>
+          </a:p>
+        </p:txBody>
+      </p:sp>
+      <p:graphicFrame>
+        <p:nvGraphicFramePr>
+          <p:cNvPr id="4" name="Marcador de contenido 3"/>
+          <p:cNvGraphicFramePr>
+            <a:graphicFrameLocks noGrp="1"/>
+          </p:cNvGraphicFramePr>
+          <p:nvPr>
+            <p:ph idx="1"/>
+            <p:extLst>
+              <p:ext uri="{D42A27DB-BD31-4B8C-83A1-F6EECF244321}">
+                <p14:modId xmlns:p14="http://schemas.microsoft.com/office/powerpoint/2010/main" val="2760491292"/>
+              </p:ext>
+            </p:extLst>
+          </p:nvPr>
+        </p:nvGraphicFramePr>
+        <p:xfrm>
+          <a:off x="3083321" y="1048772"/>
+          <a:ext cx="5685723" cy="5463173"/>
+        </p:xfrm>
+        <a:graphic>
+          <a:graphicData uri="http://schemas.openxmlformats.org/drawingml/2006/table">
+            <a:tbl>
+              <a:tblPr firstRow="1" bandRow="1">
+                <a:tableStyleId>{5C22544A-7EE6-4342-B048-85BDC9FD1C3A}</a:tableStyleId>
+              </a:tblPr>
+              <a:tblGrid>
+                <a:gridCol w="3505200">
+                  <a:extLst>
+                    <a:ext uri="{9D8B030D-6E8A-4147-A177-3AD203B41FA5}">
+                      <a16:colId xmlns:a16="http://schemas.microsoft.com/office/drawing/2014/main" val="683261864"/>
+                    </a:ext>
+                  </a:extLst>
+                </a:gridCol>
+                <a:gridCol w="955993">
+                  <a:extLst>
+                    <a:ext uri="{9D8B030D-6E8A-4147-A177-3AD203B41FA5}">
+                      <a16:colId xmlns:a16="http://schemas.microsoft.com/office/drawing/2014/main" val="2734139358"/>
+                    </a:ext>
+                  </a:extLst>
+                </a:gridCol>
+                <a:gridCol w="1224530">
+                  <a:extLst>
+                    <a:ext uri="{9D8B030D-6E8A-4147-A177-3AD203B41FA5}">
+                      <a16:colId xmlns:a16="http://schemas.microsoft.com/office/drawing/2014/main" val="3366999503"/>
+                    </a:ext>
+                  </a:extLst>
+                </a:gridCol>
+              </a:tblGrid>
+              <a:tr h="371453">
+                <a:tc>
+                  <a:txBody>
+                    <a:bodyPr/>
+                    <a:lstStyle/>
+                    <a:p>
+                      <a:r>
+                        <a:rPr lang="es-CO" dirty="0" smtClean="0"/>
+                        <a:t>Requerimiento</a:t>
+                      </a:r>
+                      <a:endParaRPr lang="es-419" dirty="0"/>
+                    </a:p>
+                  </a:txBody>
+                  <a:tcPr/>
+                </a:tc>
+                <a:tc>
+                  <a:txBody>
+                    <a:bodyPr/>
+                    <a:lstStyle/>
+                    <a:p>
+                      <a:r>
+                        <a:rPr lang="es-CO" dirty="0" smtClean="0"/>
+                        <a:t>Cumple</a:t>
+                      </a:r>
+                      <a:endParaRPr lang="es-419" dirty="0"/>
+                    </a:p>
+                  </a:txBody>
+                  <a:tcPr/>
+                </a:tc>
+                <a:tc>
+                  <a:txBody>
+                    <a:bodyPr/>
+                    <a:lstStyle/>
+                    <a:p>
+                      <a:r>
+                        <a:rPr lang="es-CO" dirty="0" smtClean="0"/>
+                        <a:t>No cumple</a:t>
+                      </a:r>
+                      <a:endParaRPr lang="es-419" dirty="0"/>
+                    </a:p>
+                  </a:txBody>
+                  <a:tcPr/>
+                </a:tc>
+                <a:extLst>
+                  <a:ext uri="{0D108BD9-81ED-4DB2-BD59-A6C34878D82A}">
+                    <a16:rowId xmlns:a16="http://schemas.microsoft.com/office/drawing/2014/main" val="2328073056"/>
+                  </a:ext>
+                </a:extLst>
+              </a:tr>
+              <a:tr h="650042">
+                <a:tc>
+                  <a:txBody>
+                    <a:bodyPr/>
+                    <a:lstStyle/>
+                    <a:p>
+                      <a:r>
+                        <a:rPr lang="es-CO" sz="1200" dirty="0" smtClean="0">
+                          <a:effectLst/>
+                        </a:rPr>
+                        <a:t>La cámara instalada en la caja deberá tomar la foto del material para ser posteriormente analizada para su respectivo reciclaje.</a:t>
+                      </a:r>
+                      <a:endParaRPr lang="es-419" sz="1200" dirty="0"/>
+                    </a:p>
+                  </a:txBody>
+                  <a:tcPr/>
+                </a:tc>
+                <a:tc>
+                  <a:txBody>
+                    <a:bodyPr/>
+                    <a:lstStyle/>
+                    <a:p>
+                      <a:pPr algn="ctr"/>
+                      <a:endParaRPr lang="es-419" sz="3600" dirty="0"/>
+                    </a:p>
+                  </a:txBody>
+                  <a:tcPr anchor="ctr"/>
+                </a:tc>
+                <a:tc>
+                  <a:txBody>
+                    <a:bodyPr/>
+                    <a:lstStyle/>
+                    <a:p>
+                      <a:pPr algn="ctr"/>
+                      <a:r>
+                        <a:rPr lang="es-CO" sz="2800" dirty="0" smtClean="0"/>
+                        <a:t>X</a:t>
+                      </a:r>
+                      <a:endParaRPr lang="es-419" sz="2800" dirty="0"/>
+                    </a:p>
+                  </a:txBody>
+                  <a:tcPr anchor="ctr"/>
+                </a:tc>
+                <a:extLst>
+                  <a:ext uri="{0D108BD9-81ED-4DB2-BD59-A6C34878D82A}">
+                    <a16:rowId xmlns:a16="http://schemas.microsoft.com/office/drawing/2014/main" val="4047556611"/>
+                  </a:ext>
+                </a:extLst>
+              </a:tr>
+              <a:tr h="729640">
+                <a:tc>
+                  <a:txBody>
+                    <a:bodyPr/>
+                    <a:lstStyle/>
+                    <a:p>
+                      <a:pPr marL="0" marR="0" indent="0" algn="l" defTabSz="914400" rtl="0" eaLnBrk="1" fontAlgn="auto" latinLnBrk="0" hangingPunct="1">
+                        <a:lnSpc>
+                          <a:spcPct val="100000"/>
+                        </a:lnSpc>
+                        <a:spcBef>
+                          <a:spcPts val="0"/>
+                        </a:spcBef>
+                        <a:spcAft>
+                          <a:spcPts val="0"/>
+                        </a:spcAft>
+                        <a:buClrTx/>
+                        <a:buSzTx/>
+                        <a:buFontTx/>
+                        <a:buNone/>
+                        <a:tabLst/>
+                        <a:defRPr/>
+                      </a:pPr>
+                      <a:r>
+                        <a:rPr lang="es-CO" sz="1200" dirty="0" smtClean="0">
+                          <a:effectLst/>
+                        </a:rPr>
+                        <a:t> El Scanner debe cumplir la función de que cuando una persona deposite un material en la caja, se active inmediatamente el sistema.</a:t>
+                      </a:r>
+                      <a:endParaRPr lang="en-US" sz="1200" dirty="0" smtClean="0">
+                        <a:effectLst/>
+                        <a:latin typeface="Times New Roman" panose="02020603050405020304" pitchFamily="18" charset="0"/>
+                        <a:ea typeface="Times New Roman" panose="02020603050405020304" pitchFamily="18" charset="0"/>
+                        <a:cs typeface="Times New Roman" panose="02020603050405020304" pitchFamily="18" charset="0"/>
+                      </a:endParaRPr>
+                    </a:p>
+                  </a:txBody>
+                  <a:tcPr/>
+                </a:tc>
+                <a:tc>
+                  <a:txBody>
+                    <a:bodyPr/>
+                    <a:lstStyle/>
+                    <a:p>
+                      <a:pPr algn="ctr"/>
+                      <a:endParaRPr lang="es-419" sz="3600" dirty="0"/>
+                    </a:p>
+                  </a:txBody>
+                  <a:tcPr anchor="ctr"/>
+                </a:tc>
+                <a:tc>
+                  <a:txBody>
+                    <a:bodyPr/>
+                    <a:lstStyle/>
+                    <a:p>
+                      <a:pPr marL="0" marR="0" indent="0" algn="ctr" defTabSz="914400" rtl="0" eaLnBrk="1" fontAlgn="auto" latinLnBrk="0" hangingPunct="1">
+                        <a:lnSpc>
+                          <a:spcPct val="100000"/>
+                        </a:lnSpc>
+                        <a:spcBef>
+                          <a:spcPts val="0"/>
+                        </a:spcBef>
+                        <a:spcAft>
+                          <a:spcPts val="0"/>
+                        </a:spcAft>
+                        <a:buClrTx/>
+                        <a:buSzTx/>
+                        <a:buFontTx/>
+                        <a:buNone/>
+                        <a:tabLst/>
+                        <a:defRPr/>
+                      </a:pPr>
+                      <a:r>
+                        <a:rPr lang="es-CO" sz="2800" dirty="0" smtClean="0"/>
+                        <a:t>X</a:t>
+                      </a:r>
+                      <a:endParaRPr lang="es-419" sz="2800" dirty="0" smtClean="0"/>
+                    </a:p>
+                  </a:txBody>
+                  <a:tcPr anchor="ctr"/>
+                </a:tc>
+                <a:extLst>
+                  <a:ext uri="{0D108BD9-81ED-4DB2-BD59-A6C34878D82A}">
+                    <a16:rowId xmlns:a16="http://schemas.microsoft.com/office/drawing/2014/main" val="1112101993"/>
+                  </a:ext>
+                </a:extLst>
+              </a:tr>
+              <a:tr h="835769">
+                <a:tc>
+                  <a:txBody>
+                    <a:bodyPr/>
+                    <a:lstStyle/>
+                    <a:p>
+                      <a:pPr marL="0" marR="0" indent="0" algn="l" defTabSz="914400" rtl="0" eaLnBrk="1" fontAlgn="auto" latinLnBrk="0" hangingPunct="1">
+                        <a:lnSpc>
+                          <a:spcPct val="100000"/>
+                        </a:lnSpc>
+                        <a:spcBef>
+                          <a:spcPts val="0"/>
+                        </a:spcBef>
+                        <a:spcAft>
+                          <a:spcPts val="0"/>
+                        </a:spcAft>
+                        <a:buClrTx/>
+                        <a:buSzTx/>
+                        <a:buFontTx/>
+                        <a:buNone/>
+                        <a:tabLst/>
+                        <a:defRPr/>
+                      </a:pPr>
+                      <a:r>
+                        <a:rPr lang="es-CO" sz="1200" dirty="0" smtClean="0">
+                          <a:effectLst/>
+                        </a:rPr>
+                        <a:t>Luego de que el material haya sido analizado, el servomotor debe abrir la escotilla para dejar entrar a este hacia los ductos que posteriormente lo llevarán hacia su respectivo basurero. </a:t>
+                      </a:r>
+                      <a:endParaRPr lang="en-US" sz="1200" dirty="0" smtClean="0">
+                        <a:effectLst/>
+                        <a:latin typeface="Times New Roman" panose="02020603050405020304" pitchFamily="18" charset="0"/>
+                        <a:ea typeface="Times New Roman" panose="02020603050405020304" pitchFamily="18" charset="0"/>
+                        <a:cs typeface="Times New Roman" panose="02020603050405020304" pitchFamily="18" charset="0"/>
+                      </a:endParaRPr>
+                    </a:p>
+                  </a:txBody>
+                  <a:tcPr/>
+                </a:tc>
+                <a:tc>
+                  <a:txBody>
+                    <a:bodyPr/>
+                    <a:lstStyle/>
+                    <a:p>
+                      <a:pPr algn="ctr"/>
+                      <a:endParaRPr lang="es-419" sz="3600" dirty="0"/>
+                    </a:p>
+                  </a:txBody>
+                  <a:tcPr anchor="ctr"/>
+                </a:tc>
+                <a:tc>
+                  <a:txBody>
+                    <a:bodyPr/>
+                    <a:lstStyle/>
+                    <a:p>
+                      <a:pPr algn="ctr"/>
+                      <a:r>
+                        <a:rPr lang="es-CO" sz="2800" dirty="0" smtClean="0"/>
+                        <a:t>X</a:t>
+                      </a:r>
+                      <a:endParaRPr lang="es-419" sz="2800" dirty="0"/>
+                    </a:p>
+                  </a:txBody>
+                  <a:tcPr anchor="ctr"/>
+                </a:tc>
+                <a:extLst>
+                  <a:ext uri="{0D108BD9-81ED-4DB2-BD59-A6C34878D82A}">
+                    <a16:rowId xmlns:a16="http://schemas.microsoft.com/office/drawing/2014/main" val="3969023699"/>
+                  </a:ext>
+                </a:extLst>
+              </a:tr>
+              <a:tr h="844884">
+                <a:tc>
+                  <a:txBody>
+                    <a:bodyPr/>
+                    <a:lstStyle/>
+                    <a:p>
+                      <a:pPr marL="0" marR="0" indent="0" algn="l" defTabSz="914400" rtl="0" eaLnBrk="1" fontAlgn="auto" latinLnBrk="0" hangingPunct="1">
+                        <a:lnSpc>
+                          <a:spcPct val="100000"/>
+                        </a:lnSpc>
+                        <a:spcBef>
+                          <a:spcPts val="0"/>
+                        </a:spcBef>
+                        <a:spcAft>
+                          <a:spcPts val="0"/>
+                        </a:spcAft>
+                        <a:buClrTx/>
+                        <a:buSzTx/>
+                        <a:buFontTx/>
+                        <a:buNone/>
+                        <a:tabLst/>
+                        <a:defRPr/>
+                      </a:pPr>
+                      <a:r>
+                        <a:rPr lang="es-CO" sz="1400" dirty="0" smtClean="0">
+                          <a:effectLst/>
+                        </a:rPr>
+                        <a:t> </a:t>
+                      </a:r>
+                      <a:r>
+                        <a:rPr lang="es-CO" sz="1200" dirty="0" smtClean="0">
+                          <a:effectLst/>
+                        </a:rPr>
+                        <a:t>Los servomotores deben mover</a:t>
+                      </a:r>
+                      <a:r>
+                        <a:rPr lang="es-CO" sz="1200" baseline="0" dirty="0" smtClean="0">
+                          <a:effectLst/>
+                        </a:rPr>
+                        <a:t> las </a:t>
+                      </a:r>
+                      <a:r>
+                        <a:rPr lang="es-CO" sz="1200" dirty="0" smtClean="0">
+                          <a:effectLst/>
+                        </a:rPr>
+                        <a:t>escotillas dependiendo de las condiciones que arroje el sistema, para así llevar el material a su respectivo basurero.</a:t>
+                      </a:r>
+                      <a:endParaRPr lang="en-US" sz="1200" dirty="0" smtClean="0">
+                        <a:effectLst/>
+                        <a:latin typeface="Times New Roman" panose="02020603050405020304" pitchFamily="18" charset="0"/>
+                        <a:ea typeface="Times New Roman" panose="02020603050405020304" pitchFamily="18" charset="0"/>
+                        <a:cs typeface="Times New Roman" panose="02020603050405020304" pitchFamily="18" charset="0"/>
+                      </a:endParaRPr>
+                    </a:p>
+                  </a:txBody>
+                  <a:tcPr/>
+                </a:tc>
+                <a:tc>
+                  <a:txBody>
+                    <a:bodyPr/>
+                    <a:lstStyle/>
+                    <a:p>
+                      <a:pPr algn="ctr"/>
+                      <a:endParaRPr lang="es-419" sz="3600" dirty="0"/>
+                    </a:p>
+                  </a:txBody>
+                  <a:tcPr anchor="ctr"/>
+                </a:tc>
+                <a:tc>
+                  <a:txBody>
+                    <a:bodyPr/>
+                    <a:lstStyle/>
+                    <a:p>
+                      <a:pPr algn="ctr"/>
+                      <a:r>
+                        <a:rPr lang="es-CO" sz="2800" dirty="0" smtClean="0"/>
+                        <a:t>X</a:t>
+                      </a:r>
+                      <a:endParaRPr lang="es-419" sz="2800" dirty="0"/>
+                    </a:p>
+                  </a:txBody>
+                  <a:tcPr anchor="ctr"/>
+                </a:tc>
+                <a:extLst>
+                  <a:ext uri="{0D108BD9-81ED-4DB2-BD59-A6C34878D82A}">
+                    <a16:rowId xmlns:a16="http://schemas.microsoft.com/office/drawing/2014/main" val="1412900898"/>
+                  </a:ext>
+                </a:extLst>
+              </a:tr>
+              <a:tr h="722745">
+                <a:tc>
+                  <a:txBody>
+                    <a:bodyPr/>
+                    <a:lstStyle/>
+                    <a:p>
+                      <a:pPr marL="0" marR="0" indent="0" algn="l" defTabSz="914400" rtl="0" eaLnBrk="1" fontAlgn="auto" latinLnBrk="0" hangingPunct="1">
+                        <a:lnSpc>
+                          <a:spcPct val="100000"/>
+                        </a:lnSpc>
+                        <a:spcBef>
+                          <a:spcPts val="0"/>
+                        </a:spcBef>
+                        <a:spcAft>
+                          <a:spcPts val="0"/>
+                        </a:spcAft>
+                        <a:buClrTx/>
+                        <a:buSzTx/>
+                        <a:buFontTx/>
+                        <a:buNone/>
+                        <a:tabLst/>
+                        <a:defRPr/>
+                      </a:pPr>
+                      <a:r>
+                        <a:rPr lang="es-CO" sz="1200" dirty="0" smtClean="0">
+                          <a:effectLst/>
+                        </a:rPr>
+                        <a:t>El sistema debe analizar el material usando la API de Google llamada </a:t>
+                      </a:r>
+                      <a:r>
+                        <a:rPr lang="es-CO" sz="1200" dirty="0" err="1" smtClean="0">
+                          <a:effectLst/>
+                        </a:rPr>
+                        <a:t>Vision</a:t>
+                      </a:r>
+                      <a:r>
+                        <a:rPr lang="es-CO" sz="1200" dirty="0" smtClean="0">
+                          <a:effectLst/>
+                        </a:rPr>
+                        <a:t> para así determinar el nombre del objeto que está en la foto.</a:t>
+                      </a:r>
+                      <a:endParaRPr lang="en-US" sz="1200" dirty="0" smtClean="0">
+                        <a:effectLst/>
+                        <a:latin typeface="Times New Roman" panose="02020603050405020304" pitchFamily="18" charset="0"/>
+                        <a:ea typeface="Times New Roman" panose="02020603050405020304" pitchFamily="18" charset="0"/>
+                        <a:cs typeface="Times New Roman" panose="02020603050405020304" pitchFamily="18" charset="0"/>
+                      </a:endParaRPr>
+                    </a:p>
+                  </a:txBody>
+                  <a:tcPr/>
+                </a:tc>
+                <a:tc>
+                  <a:txBody>
+                    <a:bodyPr/>
+                    <a:lstStyle/>
+                    <a:p>
+                      <a:pPr algn="ctr"/>
+                      <a:r>
+                        <a:rPr lang="es-CO" sz="3600" dirty="0" smtClean="0"/>
+                        <a:t>x</a:t>
+                      </a:r>
+                      <a:endParaRPr lang="es-419" sz="3600" dirty="0"/>
+                    </a:p>
+                  </a:txBody>
+                  <a:tcPr anchor="ctr"/>
+                </a:tc>
+                <a:tc>
+                  <a:txBody>
+                    <a:bodyPr/>
+                    <a:lstStyle/>
+                    <a:p>
+                      <a:pPr algn="ctr"/>
+                      <a:endParaRPr lang="es-419" sz="2800" dirty="0"/>
+                    </a:p>
+                  </a:txBody>
+                  <a:tcPr anchor="ctr"/>
+                </a:tc>
+                <a:extLst>
+                  <a:ext uri="{0D108BD9-81ED-4DB2-BD59-A6C34878D82A}">
+                    <a16:rowId xmlns:a16="http://schemas.microsoft.com/office/drawing/2014/main" val="3612729649"/>
+                  </a:ext>
+                </a:extLst>
+              </a:tr>
+              <a:tr h="650042">
+                <a:tc>
+                  <a:txBody>
+                    <a:bodyPr/>
+                    <a:lstStyle/>
+                    <a:p>
+                      <a:pPr marL="0" marR="0" indent="0" algn="l" defTabSz="914400" rtl="0" eaLnBrk="1" fontAlgn="auto" latinLnBrk="0" hangingPunct="1">
+                        <a:lnSpc>
+                          <a:spcPct val="100000"/>
+                        </a:lnSpc>
+                        <a:spcBef>
+                          <a:spcPts val="0"/>
+                        </a:spcBef>
+                        <a:spcAft>
+                          <a:spcPts val="0"/>
+                        </a:spcAft>
+                        <a:buClrTx/>
+                        <a:buSzTx/>
+                        <a:buFontTx/>
+                        <a:buNone/>
+                        <a:tabLst/>
+                        <a:defRPr/>
+                      </a:pPr>
+                      <a:r>
+                        <a:rPr lang="es-CO" sz="1200" dirty="0" smtClean="0">
+                          <a:effectLst/>
+                        </a:rPr>
+                        <a:t>El sistema debe tomar el nombre del objeto de la foto para buscar en la base de datos la</a:t>
+                      </a:r>
+                      <a:r>
+                        <a:rPr lang="es-CO" sz="1200" baseline="0" dirty="0" smtClean="0">
+                          <a:effectLst/>
+                        </a:rPr>
+                        <a:t> categoría</a:t>
+                      </a:r>
+                      <a:r>
+                        <a:rPr lang="es-CO" sz="1200" dirty="0" smtClean="0">
+                          <a:effectLst/>
+                        </a:rPr>
+                        <a:t> a</a:t>
+                      </a:r>
+                      <a:r>
+                        <a:rPr lang="es-CO" sz="1200" baseline="0" dirty="0" smtClean="0">
+                          <a:effectLst/>
+                        </a:rPr>
+                        <a:t> la</a:t>
+                      </a:r>
+                      <a:r>
+                        <a:rPr lang="es-CO" sz="1200" dirty="0" smtClean="0">
+                          <a:effectLst/>
+                        </a:rPr>
+                        <a:t> que pertenece.</a:t>
+                      </a:r>
+                      <a:endParaRPr lang="en-US" sz="1200" dirty="0" smtClean="0">
+                        <a:effectLst/>
+                        <a:latin typeface="Times New Roman" panose="02020603050405020304" pitchFamily="18" charset="0"/>
+                        <a:ea typeface="Times New Roman" panose="02020603050405020304" pitchFamily="18" charset="0"/>
+                        <a:cs typeface="Times New Roman" panose="02020603050405020304" pitchFamily="18" charset="0"/>
+                      </a:endParaRPr>
+                    </a:p>
+                  </a:txBody>
+                  <a:tcPr/>
+                </a:tc>
+                <a:tc>
+                  <a:txBody>
+                    <a:bodyPr/>
+                    <a:lstStyle/>
+                    <a:p>
+                      <a:pPr algn="ctr"/>
+                      <a:r>
+                        <a:rPr lang="es-CO" sz="3600" dirty="0" smtClean="0"/>
+                        <a:t>x</a:t>
+                      </a:r>
+                      <a:endParaRPr lang="es-419" sz="3600" dirty="0"/>
+                    </a:p>
+                  </a:txBody>
+                  <a:tcPr anchor="ctr"/>
+                </a:tc>
+                <a:tc>
+                  <a:txBody>
+                    <a:bodyPr/>
+                    <a:lstStyle/>
+                    <a:p>
+                      <a:pPr algn="ctr"/>
+                      <a:endParaRPr lang="es-419" sz="2800" dirty="0"/>
+                    </a:p>
+                  </a:txBody>
+                  <a:tcPr anchor="ctr"/>
+                </a:tc>
+                <a:extLst>
+                  <a:ext uri="{0D108BD9-81ED-4DB2-BD59-A6C34878D82A}">
+                    <a16:rowId xmlns:a16="http://schemas.microsoft.com/office/drawing/2014/main" val="1688823906"/>
+                  </a:ext>
+                </a:extLst>
+              </a:tr>
+              <a:tr h="650042">
+                <a:tc>
+                  <a:txBody>
+                    <a:bodyPr/>
+                    <a:lstStyle/>
+                    <a:p>
+                      <a:pPr marL="0" marR="0" indent="0" algn="l" defTabSz="914400" rtl="0" eaLnBrk="1" fontAlgn="auto" latinLnBrk="0" hangingPunct="1">
+                        <a:lnSpc>
+                          <a:spcPct val="100000"/>
+                        </a:lnSpc>
+                        <a:spcBef>
+                          <a:spcPts val="0"/>
+                        </a:spcBef>
+                        <a:spcAft>
+                          <a:spcPts val="0"/>
+                        </a:spcAft>
+                        <a:buClrTx/>
+                        <a:buSzTx/>
+                        <a:buFontTx/>
+                        <a:buNone/>
+                        <a:tabLst/>
+                        <a:defRPr/>
+                      </a:pPr>
+                      <a:r>
+                        <a:rPr lang="es-CO" sz="1200" dirty="0" smtClean="0">
+                          <a:effectLst/>
+                        </a:rPr>
+                        <a:t> El sistema debe realizar unas condiciones para determinar hacia</a:t>
+                      </a:r>
+                      <a:r>
+                        <a:rPr lang="es-CO" sz="1200" baseline="0" dirty="0" smtClean="0">
+                          <a:effectLst/>
+                        </a:rPr>
+                        <a:t> que lugar mover los</a:t>
+                      </a:r>
+                      <a:r>
+                        <a:rPr lang="es-CO" sz="1200" dirty="0" smtClean="0">
+                          <a:effectLst/>
+                        </a:rPr>
+                        <a:t> servomotores para llevar el objeto a su respectivo basurero.</a:t>
+                      </a:r>
+                      <a:endParaRPr lang="en-US" sz="1200" dirty="0" smtClean="0">
+                        <a:effectLst/>
+                        <a:latin typeface="Times New Roman" panose="02020603050405020304" pitchFamily="18" charset="0"/>
+                        <a:ea typeface="Times New Roman" panose="02020603050405020304" pitchFamily="18" charset="0"/>
+                        <a:cs typeface="Times New Roman" panose="02020603050405020304" pitchFamily="18" charset="0"/>
+                      </a:endParaRPr>
+                    </a:p>
+                  </a:txBody>
+                  <a:tcPr/>
+                </a:tc>
+                <a:tc>
+                  <a:txBody>
+                    <a:bodyPr/>
+                    <a:lstStyle/>
+                    <a:p>
+                      <a:pPr algn="ctr"/>
+                      <a:r>
+                        <a:rPr lang="es-CO" sz="3600" dirty="0" smtClean="0"/>
+                        <a:t>x</a:t>
+                      </a:r>
+                      <a:endParaRPr lang="es-419" sz="3600" dirty="0"/>
+                    </a:p>
+                  </a:txBody>
+                  <a:tcPr anchor="ctr"/>
+                </a:tc>
+                <a:tc>
+                  <a:txBody>
+                    <a:bodyPr/>
+                    <a:lstStyle/>
+                    <a:p>
+                      <a:pPr algn="ctr"/>
+                      <a:endParaRPr lang="es-419" sz="2800" dirty="0"/>
+                    </a:p>
+                  </a:txBody>
+                  <a:tcPr anchor="ctr"/>
+                </a:tc>
+                <a:extLst>
+                  <a:ext uri="{0D108BD9-81ED-4DB2-BD59-A6C34878D82A}">
+                    <a16:rowId xmlns:a16="http://schemas.microsoft.com/office/drawing/2014/main" val="2161421661"/>
+                  </a:ext>
+                </a:extLst>
+              </a:tr>
+            </a:tbl>
+          </a:graphicData>
+        </a:graphic>
+      </p:graphicFrame>
+    </p:spTree>
+    <p:extLst>
+      <p:ext uri="{BB962C8B-B14F-4D97-AF65-F5344CB8AC3E}">
+        <p14:creationId xmlns:p14="http://schemas.microsoft.com/office/powerpoint/2010/main" val="823559727"/>
+      </p:ext>
+    </p:extLst>
+  </p:cSld>
+  <p:clrMapOvr>
+    <a:masterClrMapping/>
+  </p:clrMapOvr>
+  <p:timing>
+    <p:tnLst>
+      <p:par>
+        <p:cTn id="1" dur="indefinite" restart="never" nodeType="tmRoot"/>
+      </p:par>
+    </p:tnLst>
+  </p:timing>
+</p:sld>
+</file>
+
+<file path=ppt/slides/slide11.xml><?xml version="1.0" encoding="utf-8"?>
+<p:sld xmlns:a="http://schemas.openxmlformats.org/drawingml/2006/main" xmlns:r="http://schemas.openxmlformats.org/officeDocument/2006/relationships" xmlns:p="http://schemas.openxmlformats.org/presentationml/2006/main">
+  <p:cSld>
+    <p:spTree>
+      <p:nvGrpSpPr>
+        <p:cNvPr id="1" name=""/>
+        <p:cNvGrpSpPr/>
+        <p:nvPr/>
+      </p:nvGrpSpPr>
+      <p:grpSpPr>
+        <a:xfrm>
+          <a:off x="0" y="0"/>
+          <a:ext cx="0" cy="0"/>
+          <a:chOff x="0" y="0"/>
+          <a:chExt cx="0" cy="0"/>
+        </a:xfrm>
+      </p:grpSpPr>
+      <p:pic>
+        <p:nvPicPr>
+          <p:cNvPr id="6" name="Imagen 5"/>
+          <p:cNvPicPr>
+            <a:picLocks noChangeAspect="1"/>
+          </p:cNvPicPr>
+          <p:nvPr/>
+        </p:nvPicPr>
+        <p:blipFill>
+          <a:blip r:embed="rId2" cstate="print">
+            <a:extLst>
+              <a:ext uri="{28A0092B-C50C-407E-A947-70E740481C1C}">
+                <a14:useLocalDpi xmlns:a14="http://schemas.microsoft.com/office/drawing/2010/main" val="0"/>
+              </a:ext>
+            </a:extLst>
+          </a:blip>
+          <a:stretch>
+            <a:fillRect/>
+          </a:stretch>
+        </p:blipFill>
+        <p:spPr>
+          <a:xfrm>
+            <a:off x="0" y="0"/>
+            <a:ext cx="12192000" cy="6858000"/>
+          </a:xfrm>
+          <a:prstGeom prst="rect">
+            <a:avLst/>
+          </a:prstGeom>
+        </p:spPr>
+      </p:pic>
+      <p:sp>
+        <p:nvSpPr>
+          <p:cNvPr id="2" name="Título 1"/>
+          <p:cNvSpPr>
+            <a:spLocks noGrp="1"/>
+          </p:cNvSpPr>
+          <p:nvPr>
+            <p:ph type="title"/>
+          </p:nvPr>
+        </p:nvSpPr>
+        <p:spPr>
+          <a:xfrm>
+            <a:off x="668383" y="103868"/>
+            <a:ext cx="10515600" cy="1325563"/>
+          </a:xfrm>
+        </p:spPr>
+        <p:txBody>
+          <a:bodyPr>
+            <a:normAutofit/>
+          </a:bodyPr>
+          <a:lstStyle/>
+          <a:p>
+            <a:pPr algn="ctr"/>
+            <a:r>
+              <a:rPr lang="es-CO" sz="4000" b="1" dirty="0">
+                <a:ln w="12700">
+                  <a:solidFill>
+                    <a:schemeClr val="tx2">
+                      <a:lumMod val="75000"/>
+                    </a:schemeClr>
+                  </a:solidFill>
+                  <a:prstDash val="solid"/>
+                </a:ln>
+                <a:pattFill prst="dkUpDiag">
+                  <a:fgClr>
+                    <a:schemeClr val="tx2"/>
+                  </a:fgClr>
+                  <a:bgClr>
+                    <a:schemeClr val="tx2">
+                      <a:lumMod val="20000"/>
+                      <a:lumOff val="80000"/>
+                    </a:schemeClr>
+                  </a:bgClr>
+                </a:pattFill>
+                <a:effectLst>
+                  <a:outerShdw dist="38100" dir="2640000" algn="bl" rotWithShape="0">
+                    <a:schemeClr val="tx2">
+                      <a:lumMod val="75000"/>
+                    </a:schemeClr>
+                  </a:outerShdw>
+                </a:effectLst>
+              </a:rPr>
+              <a:t>L</a:t>
+            </a:r>
+            <a:r>
+              <a:rPr lang="es-CO" sz="4000" b="1" dirty="0" smtClean="0">
+                <a:ln w="12700">
+                  <a:solidFill>
+                    <a:schemeClr val="tx2">
+                      <a:lumMod val="75000"/>
+                    </a:schemeClr>
+                  </a:solidFill>
+                  <a:prstDash val="solid"/>
+                </a:ln>
+                <a:pattFill prst="dkUpDiag">
+                  <a:fgClr>
+                    <a:schemeClr val="tx2"/>
+                  </a:fgClr>
+                  <a:bgClr>
+                    <a:schemeClr val="tx2">
+                      <a:lumMod val="20000"/>
+                      <a:lumOff val="80000"/>
+                    </a:schemeClr>
+                  </a:bgClr>
+                </a:pattFill>
+                <a:effectLst>
+                  <a:outerShdw dist="38100" dir="2640000" algn="bl" rotWithShape="0">
+                    <a:schemeClr val="tx2">
+                      <a:lumMod val="75000"/>
+                    </a:schemeClr>
+                  </a:outerShdw>
+                </a:effectLst>
+              </a:rPr>
+              <a:t>ista de chequeo</a:t>
+            </a:r>
+            <a:endParaRPr lang="en-US" sz="4000" dirty="0"/>
+          </a:p>
+        </p:txBody>
+      </p:sp>
+      <p:graphicFrame>
+        <p:nvGraphicFramePr>
+          <p:cNvPr id="4" name="Marcador de contenido 3"/>
+          <p:cNvGraphicFramePr>
+            <a:graphicFrameLocks noGrp="1"/>
+          </p:cNvGraphicFramePr>
+          <p:nvPr>
+            <p:ph idx="1"/>
+            <p:extLst>
+              <p:ext uri="{D42A27DB-BD31-4B8C-83A1-F6EECF244321}">
+                <p14:modId xmlns:p14="http://schemas.microsoft.com/office/powerpoint/2010/main" val="4157614464"/>
+              </p:ext>
+            </p:extLst>
+          </p:nvPr>
+        </p:nvGraphicFramePr>
+        <p:xfrm>
+          <a:off x="3083321" y="1094942"/>
+          <a:ext cx="5685723" cy="4417584"/>
+        </p:xfrm>
+        <a:graphic>
+          <a:graphicData uri="http://schemas.openxmlformats.org/drawingml/2006/table">
+            <a:tbl>
+              <a:tblPr firstRow="1" bandRow="1">
+                <a:tableStyleId>{5C22544A-7EE6-4342-B048-85BDC9FD1C3A}</a:tableStyleId>
+              </a:tblPr>
+              <a:tblGrid>
+                <a:gridCol w="3505200">
+                  <a:extLst>
+                    <a:ext uri="{9D8B030D-6E8A-4147-A177-3AD203B41FA5}">
+                      <a16:colId xmlns:a16="http://schemas.microsoft.com/office/drawing/2014/main" val="683261864"/>
+                    </a:ext>
+                  </a:extLst>
+                </a:gridCol>
+                <a:gridCol w="955993">
+                  <a:extLst>
+                    <a:ext uri="{9D8B030D-6E8A-4147-A177-3AD203B41FA5}">
+                      <a16:colId xmlns:a16="http://schemas.microsoft.com/office/drawing/2014/main" val="2734139358"/>
+                    </a:ext>
+                  </a:extLst>
+                </a:gridCol>
+                <a:gridCol w="1224530">
+                  <a:extLst>
+                    <a:ext uri="{9D8B030D-6E8A-4147-A177-3AD203B41FA5}">
+                      <a16:colId xmlns:a16="http://schemas.microsoft.com/office/drawing/2014/main" val="3366999503"/>
+                    </a:ext>
+                  </a:extLst>
+                </a:gridCol>
+              </a:tblGrid>
+              <a:tr h="371453">
+                <a:tc>
+                  <a:txBody>
+                    <a:bodyPr/>
+                    <a:lstStyle/>
+                    <a:p>
+                      <a:r>
+                        <a:rPr lang="es-CO" dirty="0" smtClean="0"/>
+                        <a:t>Requerimiento</a:t>
+                      </a:r>
+                      <a:endParaRPr lang="es-419" dirty="0"/>
+                    </a:p>
+                  </a:txBody>
+                  <a:tcPr/>
+                </a:tc>
+                <a:tc>
+                  <a:txBody>
+                    <a:bodyPr/>
+                    <a:lstStyle/>
+                    <a:p>
+                      <a:r>
+                        <a:rPr lang="es-CO" dirty="0" smtClean="0"/>
+                        <a:t>Cumple</a:t>
+                      </a:r>
+                      <a:endParaRPr lang="es-419" dirty="0"/>
+                    </a:p>
+                  </a:txBody>
+                  <a:tcPr/>
+                </a:tc>
+                <a:tc>
+                  <a:txBody>
+                    <a:bodyPr/>
+                    <a:lstStyle/>
+                    <a:p>
+                      <a:r>
+                        <a:rPr lang="es-CO" dirty="0" smtClean="0"/>
+                        <a:t>No cumple</a:t>
+                      </a:r>
+                      <a:endParaRPr lang="es-419" dirty="0"/>
+                    </a:p>
+                  </a:txBody>
+                  <a:tcPr/>
+                </a:tc>
+                <a:extLst>
+                  <a:ext uri="{0D108BD9-81ED-4DB2-BD59-A6C34878D82A}">
+                    <a16:rowId xmlns:a16="http://schemas.microsoft.com/office/drawing/2014/main" val="2328073056"/>
+                  </a:ext>
+                </a:extLst>
+              </a:tr>
+              <a:tr h="650042">
+                <a:tc>
+                  <a:txBody>
+                    <a:bodyPr/>
+                    <a:lstStyle/>
+                    <a:p>
+                      <a:pPr marL="0" marR="0" indent="0" algn="l" defTabSz="914400" rtl="0" eaLnBrk="1" fontAlgn="auto" latinLnBrk="0" hangingPunct="1">
+                        <a:lnSpc>
+                          <a:spcPct val="100000"/>
+                        </a:lnSpc>
+                        <a:spcBef>
+                          <a:spcPts val="0"/>
+                        </a:spcBef>
+                        <a:spcAft>
+                          <a:spcPts val="0"/>
+                        </a:spcAft>
+                        <a:buClrTx/>
+                        <a:buSzTx/>
+                        <a:buFontTx/>
+                        <a:buNone/>
+                        <a:tabLst/>
+                        <a:defRPr/>
+                      </a:pPr>
+                      <a:r>
+                        <a:rPr lang="es-CO" sz="1200" dirty="0" smtClean="0">
+                          <a:effectLst/>
+                          <a:latin typeface="+mn-lt"/>
+                          <a:ea typeface="+mn-ea"/>
+                          <a:cs typeface="+mn-cs"/>
+                        </a:rPr>
+                        <a:t>La</a:t>
+                      </a:r>
+                      <a:r>
+                        <a:rPr lang="es-CO" sz="1200" baseline="0" dirty="0" smtClean="0">
+                          <a:effectLst/>
+                          <a:latin typeface="+mn-lt"/>
+                          <a:ea typeface="+mn-ea"/>
+                          <a:cs typeface="+mn-cs"/>
+                        </a:rPr>
+                        <a:t> base de datos debe contar con las tablas de: usuario, basura, </a:t>
+                      </a:r>
+                      <a:r>
+                        <a:rPr lang="es-CO" sz="1200" baseline="0" dirty="0" err="1" smtClean="0">
+                          <a:effectLst/>
+                          <a:latin typeface="+mn-lt"/>
+                          <a:ea typeface="+mn-ea"/>
+                          <a:cs typeface="+mn-cs"/>
+                        </a:rPr>
+                        <a:t>categoria</a:t>
+                      </a:r>
+                      <a:r>
+                        <a:rPr lang="es-CO" sz="1200" baseline="0" dirty="0" smtClean="0">
+                          <a:effectLst/>
+                          <a:latin typeface="+mn-lt"/>
+                          <a:ea typeface="+mn-ea"/>
+                          <a:cs typeface="+mn-cs"/>
+                        </a:rPr>
+                        <a:t>, </a:t>
+                      </a:r>
+                      <a:r>
+                        <a:rPr lang="es-CO" sz="1200" baseline="0" dirty="0" err="1" smtClean="0">
+                          <a:effectLst/>
+                          <a:latin typeface="+mn-lt"/>
+                          <a:ea typeface="+mn-ea"/>
+                          <a:cs typeface="+mn-cs"/>
+                        </a:rPr>
+                        <a:t>empresa,datos</a:t>
+                      </a:r>
+                      <a:r>
+                        <a:rPr lang="es-CO" sz="1200" baseline="0" dirty="0" smtClean="0">
+                          <a:effectLst/>
+                          <a:latin typeface="+mn-lt"/>
+                          <a:ea typeface="+mn-ea"/>
+                          <a:cs typeface="+mn-cs"/>
+                        </a:rPr>
+                        <a:t> de contacto, maquina e historial.</a:t>
+                      </a:r>
+                      <a:endParaRPr lang="en-US" sz="1200" dirty="0" smtClean="0">
+                        <a:effectLst/>
+                        <a:latin typeface="Times New Roman" panose="02020603050405020304" pitchFamily="18" charset="0"/>
+                        <a:ea typeface="Times New Roman" panose="02020603050405020304" pitchFamily="18" charset="0"/>
+                        <a:cs typeface="Times New Roman" panose="02020603050405020304" pitchFamily="18" charset="0"/>
+                      </a:endParaRPr>
+                    </a:p>
+                  </a:txBody>
+                  <a:tcPr/>
+                </a:tc>
+                <a:tc>
+                  <a:txBody>
+                    <a:bodyPr/>
+                    <a:lstStyle/>
+                    <a:p>
+                      <a:pPr algn="ctr"/>
+                      <a:r>
+                        <a:rPr lang="es-CO" sz="3600" dirty="0" smtClean="0"/>
+                        <a:t>x</a:t>
+                      </a:r>
+                      <a:endParaRPr lang="es-419" sz="3600" dirty="0"/>
+                    </a:p>
+                  </a:txBody>
+                  <a:tcPr anchor="ctr"/>
+                </a:tc>
+                <a:tc>
+                  <a:txBody>
+                    <a:bodyPr/>
+                    <a:lstStyle/>
+                    <a:p>
+                      <a:pPr algn="ctr"/>
+                      <a:endParaRPr lang="es-419" sz="3600"/>
+                    </a:p>
+                  </a:txBody>
+                  <a:tcPr anchor="ctr"/>
+                </a:tc>
+                <a:extLst>
+                  <a:ext uri="{0D108BD9-81ED-4DB2-BD59-A6C34878D82A}">
+                    <a16:rowId xmlns:a16="http://schemas.microsoft.com/office/drawing/2014/main" val="4047556611"/>
+                  </a:ext>
+                </a:extLst>
+              </a:tr>
+              <a:tr h="493797">
+                <a:tc>
+                  <a:txBody>
+                    <a:bodyPr/>
+                    <a:lstStyle/>
+                    <a:p>
+                      <a:pPr marL="0" marR="0" indent="0" algn="l" defTabSz="914400" rtl="0" eaLnBrk="1" fontAlgn="auto" latinLnBrk="0" hangingPunct="1">
+                        <a:lnSpc>
+                          <a:spcPct val="100000"/>
+                        </a:lnSpc>
+                        <a:spcBef>
+                          <a:spcPts val="0"/>
+                        </a:spcBef>
+                        <a:spcAft>
+                          <a:spcPts val="0"/>
+                        </a:spcAft>
+                        <a:buClrTx/>
+                        <a:buSzTx/>
+                        <a:buFontTx/>
+                        <a:buNone/>
+                        <a:tabLst/>
+                        <a:defRPr/>
+                      </a:pPr>
+                      <a:r>
+                        <a:rPr lang="es-CO" sz="1200" dirty="0" smtClean="0">
+                          <a:effectLst/>
+                        </a:rPr>
+                        <a:t>La</a:t>
+                      </a:r>
+                      <a:r>
+                        <a:rPr lang="es-CO" sz="1200" baseline="0" dirty="0" smtClean="0">
+                          <a:effectLst/>
+                        </a:rPr>
+                        <a:t> base de datos debe contar con un CRUD para las tablas de basura, </a:t>
+                      </a:r>
+                      <a:r>
+                        <a:rPr lang="es-CO" sz="1200" baseline="0" dirty="0" err="1" smtClean="0">
+                          <a:effectLst/>
+                        </a:rPr>
+                        <a:t>categoría,datos</a:t>
+                      </a:r>
+                      <a:r>
+                        <a:rPr lang="es-CO" sz="1200" baseline="0" dirty="0" smtClean="0">
+                          <a:effectLst/>
+                        </a:rPr>
+                        <a:t> de </a:t>
+                      </a:r>
+                      <a:r>
+                        <a:rPr lang="es-CO" sz="1200" baseline="0" dirty="0" err="1" smtClean="0">
+                          <a:effectLst/>
+                        </a:rPr>
+                        <a:t>contacto,empresa</a:t>
+                      </a:r>
+                      <a:r>
+                        <a:rPr lang="es-CO" sz="1200" baseline="0" dirty="0" smtClean="0">
+                          <a:effectLst/>
+                        </a:rPr>
+                        <a:t>, maquina y usuario.</a:t>
+                      </a:r>
+                      <a:endParaRPr lang="en-US" sz="1200" dirty="0" smtClean="0">
+                        <a:effectLst/>
+                        <a:latin typeface="Times New Roman" panose="02020603050405020304" pitchFamily="18" charset="0"/>
+                        <a:ea typeface="Times New Roman" panose="02020603050405020304" pitchFamily="18" charset="0"/>
+                        <a:cs typeface="Times New Roman" panose="02020603050405020304" pitchFamily="18" charset="0"/>
+                      </a:endParaRPr>
+                    </a:p>
+                  </a:txBody>
+                  <a:tcPr/>
+                </a:tc>
+                <a:tc>
+                  <a:txBody>
+                    <a:bodyPr/>
+                    <a:lstStyle/>
+                    <a:p>
+                      <a:pPr algn="ctr"/>
+                      <a:r>
+                        <a:rPr lang="es-CO" sz="3600" dirty="0" smtClean="0"/>
+                        <a:t>x</a:t>
+                      </a:r>
+                      <a:endParaRPr lang="es-419" sz="3600" dirty="0"/>
+                    </a:p>
+                  </a:txBody>
+                  <a:tcPr anchor="ctr"/>
+                </a:tc>
+                <a:tc>
+                  <a:txBody>
+                    <a:bodyPr/>
+                    <a:lstStyle/>
+                    <a:p>
+                      <a:pPr algn="ctr"/>
+                      <a:endParaRPr lang="es-419" sz="3600" dirty="0"/>
+                    </a:p>
+                  </a:txBody>
+                  <a:tcPr anchor="ctr"/>
+                </a:tc>
+                <a:extLst>
+                  <a:ext uri="{0D108BD9-81ED-4DB2-BD59-A6C34878D82A}">
+                    <a16:rowId xmlns:a16="http://schemas.microsoft.com/office/drawing/2014/main" val="1112101993"/>
+                  </a:ext>
+                </a:extLst>
+              </a:tr>
+              <a:tr h="835769">
+                <a:tc>
+                  <a:txBody>
+                    <a:bodyPr/>
+                    <a:lstStyle/>
+                    <a:p>
+                      <a:pPr marL="0" marR="0" indent="0" algn="l" defTabSz="914400" rtl="0" eaLnBrk="1" fontAlgn="auto" latinLnBrk="0" hangingPunct="1">
+                        <a:lnSpc>
+                          <a:spcPct val="100000"/>
+                        </a:lnSpc>
+                        <a:spcBef>
+                          <a:spcPts val="0"/>
+                        </a:spcBef>
+                        <a:spcAft>
+                          <a:spcPts val="0"/>
+                        </a:spcAft>
+                        <a:buClrTx/>
+                        <a:buSzTx/>
+                        <a:buFontTx/>
+                        <a:buNone/>
+                        <a:tabLst/>
+                        <a:defRPr/>
+                      </a:pPr>
+                      <a:r>
+                        <a:rPr lang="es-CO" sz="1200" dirty="0" smtClean="0">
+                          <a:effectLst/>
+                        </a:rPr>
+                        <a:t>La</a:t>
+                      </a:r>
+                      <a:r>
+                        <a:rPr lang="es-CO" sz="1200" baseline="0" dirty="0" smtClean="0">
+                          <a:effectLst/>
+                        </a:rPr>
+                        <a:t> base de datos debe contar con un procedimiento de almacenado para guardar los historiales de las basuras</a:t>
+                      </a:r>
+                      <a:r>
+                        <a:rPr lang="en-US" sz="1200" baseline="0" dirty="0" smtClean="0">
+                          <a:effectLst/>
+                          <a:latin typeface="Times New Roman" panose="02020603050405020304" pitchFamily="18" charset="0"/>
+                          <a:cs typeface="Times New Roman" panose="02020603050405020304" pitchFamily="18" charset="0"/>
+                        </a:rPr>
+                        <a:t>.</a:t>
+                      </a:r>
+                      <a:endParaRPr lang="en-US" sz="1200" dirty="0" smtClean="0">
+                        <a:effectLst/>
+                        <a:latin typeface="Times New Roman" panose="02020603050405020304" pitchFamily="18" charset="0"/>
+                        <a:ea typeface="Times New Roman" panose="02020603050405020304" pitchFamily="18" charset="0"/>
+                        <a:cs typeface="Times New Roman" panose="02020603050405020304" pitchFamily="18" charset="0"/>
+                      </a:endParaRPr>
+                    </a:p>
+                  </a:txBody>
+                  <a:tcPr/>
+                </a:tc>
+                <a:tc>
+                  <a:txBody>
+                    <a:bodyPr/>
+                    <a:lstStyle/>
+                    <a:p>
+                      <a:pPr algn="ctr"/>
+                      <a:r>
+                        <a:rPr lang="es-CO" sz="3600" dirty="0" smtClean="0"/>
+                        <a:t>x</a:t>
+                      </a:r>
+                      <a:endParaRPr lang="es-419" sz="3600" dirty="0"/>
+                    </a:p>
+                  </a:txBody>
+                  <a:tcPr anchor="ctr"/>
+                </a:tc>
+                <a:tc>
+                  <a:txBody>
+                    <a:bodyPr/>
+                    <a:lstStyle/>
+                    <a:p>
+                      <a:pPr algn="ctr"/>
+                      <a:endParaRPr lang="es-419" sz="3600" dirty="0"/>
+                    </a:p>
+                  </a:txBody>
+                  <a:tcPr anchor="ctr"/>
+                </a:tc>
+                <a:extLst>
+                  <a:ext uri="{0D108BD9-81ED-4DB2-BD59-A6C34878D82A}">
+                    <a16:rowId xmlns:a16="http://schemas.microsoft.com/office/drawing/2014/main" val="3969023699"/>
+                  </a:ext>
+                </a:extLst>
+              </a:tr>
+              <a:tr h="574308">
+                <a:tc>
+                  <a:txBody>
+                    <a:bodyPr/>
+                    <a:lstStyle/>
+                    <a:p>
+                      <a:pPr marL="0" marR="0" indent="0" algn="l" defTabSz="914400" rtl="0" eaLnBrk="1" fontAlgn="auto" latinLnBrk="0" hangingPunct="1">
+                        <a:lnSpc>
+                          <a:spcPct val="100000"/>
+                        </a:lnSpc>
+                        <a:spcBef>
+                          <a:spcPts val="0"/>
+                        </a:spcBef>
+                        <a:spcAft>
+                          <a:spcPts val="0"/>
+                        </a:spcAft>
+                        <a:buClrTx/>
+                        <a:buSzTx/>
+                        <a:buFontTx/>
+                        <a:buNone/>
+                        <a:tabLst/>
+                        <a:defRPr/>
+                      </a:pPr>
+                      <a:r>
+                        <a:rPr lang="es-CO" sz="1200" dirty="0" smtClean="0">
+                          <a:effectLst/>
+                        </a:rPr>
+                        <a:t>La</a:t>
+                      </a:r>
+                      <a:r>
+                        <a:rPr lang="es-CO" sz="1200" baseline="0" dirty="0" smtClean="0">
+                          <a:effectLst/>
+                        </a:rPr>
+                        <a:t> página web deberá contar con un inicio de sesión para los administradores y los empleados.</a:t>
+                      </a:r>
+                      <a:endParaRPr lang="en-US" sz="1200" dirty="0" smtClean="0">
+                        <a:effectLst/>
+                        <a:latin typeface="Times New Roman" panose="02020603050405020304" pitchFamily="18" charset="0"/>
+                        <a:ea typeface="Times New Roman" panose="02020603050405020304" pitchFamily="18" charset="0"/>
+                        <a:cs typeface="Times New Roman" panose="02020603050405020304" pitchFamily="18" charset="0"/>
+                      </a:endParaRPr>
+                    </a:p>
+                  </a:txBody>
+                  <a:tcPr/>
+                </a:tc>
+                <a:tc>
+                  <a:txBody>
+                    <a:bodyPr/>
+                    <a:lstStyle/>
+                    <a:p>
+                      <a:pPr algn="ctr"/>
+                      <a:endParaRPr lang="es-419" sz="3600" dirty="0"/>
+                    </a:p>
+                  </a:txBody>
+                  <a:tcPr anchor="ctr"/>
+                </a:tc>
+                <a:tc>
+                  <a:txBody>
+                    <a:bodyPr/>
+                    <a:lstStyle/>
+                    <a:p>
+                      <a:pPr algn="ctr"/>
+                      <a:r>
+                        <a:rPr lang="es-CO" sz="3600" dirty="0" smtClean="0"/>
+                        <a:t>x</a:t>
+                      </a:r>
+                      <a:endParaRPr lang="es-419" sz="3600" dirty="0"/>
+                    </a:p>
+                  </a:txBody>
+                  <a:tcPr anchor="ctr"/>
+                </a:tc>
+                <a:extLst>
+                  <a:ext uri="{0D108BD9-81ED-4DB2-BD59-A6C34878D82A}">
+                    <a16:rowId xmlns:a16="http://schemas.microsoft.com/office/drawing/2014/main" val="1412900898"/>
+                  </a:ext>
+                </a:extLst>
+              </a:tr>
+              <a:tr h="517483">
+                <a:tc>
+                  <a:txBody>
+                    <a:bodyPr/>
+                    <a:lstStyle/>
+                    <a:p>
+                      <a:pPr marL="0" marR="0" indent="0" algn="l" defTabSz="914400" rtl="0" eaLnBrk="1" fontAlgn="auto" latinLnBrk="0" hangingPunct="1">
+                        <a:lnSpc>
+                          <a:spcPct val="100000"/>
+                        </a:lnSpc>
+                        <a:spcBef>
+                          <a:spcPts val="0"/>
+                        </a:spcBef>
+                        <a:spcAft>
+                          <a:spcPts val="0"/>
+                        </a:spcAft>
+                        <a:buClrTx/>
+                        <a:buSzTx/>
+                        <a:buFontTx/>
+                        <a:buNone/>
+                        <a:tabLst/>
+                        <a:defRPr/>
+                      </a:pPr>
+                      <a:r>
+                        <a:rPr lang="en-US" sz="1200" b="0" dirty="0" smtClean="0">
+                          <a:effectLst/>
+                          <a:latin typeface="+mn-lt"/>
+                          <a:ea typeface="Times New Roman" panose="02020603050405020304" pitchFamily="18" charset="0"/>
+                          <a:cs typeface="Segoe UI Semibold" panose="020B0702040204020203" pitchFamily="34" charset="0"/>
+                        </a:rPr>
+                        <a:t>La </a:t>
+                      </a:r>
+                      <a:r>
+                        <a:rPr lang="en-US" sz="1200" b="0" dirty="0" err="1" smtClean="0">
+                          <a:effectLst/>
+                          <a:latin typeface="+mn-lt"/>
+                          <a:ea typeface="Times New Roman" panose="02020603050405020304" pitchFamily="18" charset="0"/>
+                          <a:cs typeface="Segoe UI Semibold" panose="020B0702040204020203" pitchFamily="34" charset="0"/>
+                        </a:rPr>
+                        <a:t>página</a:t>
+                      </a:r>
+                      <a:r>
+                        <a:rPr lang="en-US" sz="1200" b="0" baseline="0" dirty="0" smtClean="0">
+                          <a:effectLst/>
+                          <a:latin typeface="+mn-lt"/>
+                          <a:ea typeface="Times New Roman" panose="02020603050405020304" pitchFamily="18" charset="0"/>
+                          <a:cs typeface="Segoe UI Semibold" panose="020B0702040204020203" pitchFamily="34" charset="0"/>
+                        </a:rPr>
+                        <a:t> </a:t>
+                      </a:r>
+                      <a:r>
+                        <a:rPr lang="es-CO" sz="1200" b="0" baseline="0" noProof="0" dirty="0" smtClean="0">
+                          <a:effectLst/>
+                          <a:latin typeface="+mn-lt"/>
+                          <a:ea typeface="Times New Roman" panose="02020603050405020304" pitchFamily="18" charset="0"/>
+                          <a:cs typeface="Segoe UI Semibold" panose="020B0702040204020203" pitchFamily="34" charset="0"/>
+                        </a:rPr>
+                        <a:t>web</a:t>
+                      </a:r>
+                      <a:r>
+                        <a:rPr lang="en-US" sz="1200" b="0" baseline="0" dirty="0" smtClean="0">
+                          <a:effectLst/>
+                          <a:latin typeface="+mn-lt"/>
+                          <a:ea typeface="Times New Roman" panose="02020603050405020304" pitchFamily="18" charset="0"/>
+                          <a:cs typeface="Segoe UI Semibold" panose="020B0702040204020203" pitchFamily="34" charset="0"/>
+                        </a:rPr>
+                        <a:t> </a:t>
+                      </a:r>
+                      <a:r>
+                        <a:rPr lang="es-419" sz="1200" b="0" baseline="0" noProof="0" dirty="0" smtClean="0">
+                          <a:effectLst/>
+                          <a:latin typeface="+mn-lt"/>
+                          <a:ea typeface="Times New Roman" panose="02020603050405020304" pitchFamily="18" charset="0"/>
+                          <a:cs typeface="Segoe UI Semibold" panose="020B0702040204020203" pitchFamily="34" charset="0"/>
+                        </a:rPr>
+                        <a:t>deberá</a:t>
+                      </a:r>
+                      <a:r>
+                        <a:rPr lang="en-US" sz="1200" b="0" baseline="0" noProof="0" dirty="0" smtClean="0">
+                          <a:effectLst/>
+                          <a:latin typeface="+mn-lt"/>
+                          <a:ea typeface="Times New Roman" panose="02020603050405020304" pitchFamily="18" charset="0"/>
+                          <a:cs typeface="Segoe UI Semibold" panose="020B0702040204020203" pitchFamily="34" charset="0"/>
+                        </a:rPr>
+                        <a:t>, </a:t>
+                      </a:r>
+                      <a:r>
+                        <a:rPr lang="en-US" sz="1200" b="0" baseline="0" noProof="0" dirty="0" err="1" smtClean="0">
+                          <a:effectLst/>
+                          <a:latin typeface="+mn-lt"/>
+                          <a:ea typeface="Times New Roman" panose="02020603050405020304" pitchFamily="18" charset="0"/>
+                          <a:cs typeface="Segoe UI Semibold" panose="020B0702040204020203" pitchFamily="34" charset="0"/>
+                        </a:rPr>
+                        <a:t>según</a:t>
+                      </a:r>
+                      <a:r>
+                        <a:rPr lang="en-US" sz="1200" b="0" baseline="0" noProof="0" dirty="0" smtClean="0">
+                          <a:effectLst/>
+                          <a:latin typeface="+mn-lt"/>
+                          <a:ea typeface="Times New Roman" panose="02020603050405020304" pitchFamily="18" charset="0"/>
+                          <a:cs typeface="Segoe UI Semibold" panose="020B0702040204020203" pitchFamily="34" charset="0"/>
+                        </a:rPr>
+                        <a:t> </a:t>
+                      </a:r>
+                      <a:r>
+                        <a:rPr lang="en-US" sz="1200" b="0" baseline="0" noProof="0" dirty="0" err="1" smtClean="0">
+                          <a:effectLst/>
+                          <a:latin typeface="+mn-lt"/>
+                          <a:ea typeface="Times New Roman" panose="02020603050405020304" pitchFamily="18" charset="0"/>
+                          <a:cs typeface="Segoe UI Semibold" panose="020B0702040204020203" pitchFamily="34" charset="0"/>
+                        </a:rPr>
+                        <a:t>quién</a:t>
+                      </a:r>
+                      <a:r>
+                        <a:rPr lang="en-US" sz="1200" b="0" baseline="0" noProof="0" dirty="0" smtClean="0">
+                          <a:effectLst/>
+                          <a:latin typeface="+mn-lt"/>
+                          <a:ea typeface="Times New Roman" panose="02020603050405020304" pitchFamily="18" charset="0"/>
+                          <a:cs typeface="Segoe UI Semibold" panose="020B0702040204020203" pitchFamily="34" charset="0"/>
+                        </a:rPr>
+                        <a:t> </a:t>
+                      </a:r>
+                      <a:r>
+                        <a:rPr lang="en-US" sz="1200" b="0" baseline="0" noProof="0" dirty="0" err="1" smtClean="0">
+                          <a:effectLst/>
+                          <a:latin typeface="+mn-lt"/>
+                          <a:ea typeface="Times New Roman" panose="02020603050405020304" pitchFamily="18" charset="0"/>
+                          <a:cs typeface="Segoe UI Semibold" panose="020B0702040204020203" pitchFamily="34" charset="0"/>
+                        </a:rPr>
+                        <a:t>inicie</a:t>
+                      </a:r>
+                      <a:r>
+                        <a:rPr lang="en-US" sz="1200" b="0" baseline="0" noProof="0" dirty="0" smtClean="0">
+                          <a:effectLst/>
+                          <a:latin typeface="+mn-lt"/>
+                          <a:ea typeface="Times New Roman" panose="02020603050405020304" pitchFamily="18" charset="0"/>
+                          <a:cs typeface="Segoe UI Semibold" panose="020B0702040204020203" pitchFamily="34" charset="0"/>
+                        </a:rPr>
+                        <a:t> </a:t>
+                      </a:r>
+                      <a:r>
+                        <a:rPr lang="en-US" sz="1200" b="0" baseline="0" noProof="0" dirty="0" err="1" smtClean="0">
+                          <a:effectLst/>
+                          <a:latin typeface="+mn-lt"/>
+                          <a:ea typeface="Times New Roman" panose="02020603050405020304" pitchFamily="18" charset="0"/>
+                          <a:cs typeface="Segoe UI Semibold" panose="020B0702040204020203" pitchFamily="34" charset="0"/>
+                        </a:rPr>
+                        <a:t>sesión</a:t>
+                      </a:r>
+                      <a:r>
+                        <a:rPr lang="en-US" sz="1200" b="0" baseline="0" noProof="0" dirty="0" smtClean="0">
+                          <a:effectLst/>
+                          <a:latin typeface="+mn-lt"/>
+                          <a:ea typeface="Times New Roman" panose="02020603050405020304" pitchFamily="18" charset="0"/>
+                          <a:cs typeface="Segoe UI Semibold" panose="020B0702040204020203" pitchFamily="34" charset="0"/>
+                        </a:rPr>
+                        <a:t>, </a:t>
+                      </a:r>
+                      <a:r>
+                        <a:rPr lang="en-US" sz="1200" b="0" baseline="0" noProof="0" dirty="0" err="1" smtClean="0">
+                          <a:effectLst/>
+                          <a:latin typeface="+mn-lt"/>
+                          <a:ea typeface="Times New Roman" panose="02020603050405020304" pitchFamily="18" charset="0"/>
+                          <a:cs typeface="Segoe UI Semibold" panose="020B0702040204020203" pitchFamily="34" charset="0"/>
+                        </a:rPr>
+                        <a:t>habilitar</a:t>
+                      </a:r>
+                      <a:r>
+                        <a:rPr lang="en-US" sz="1200" b="0" baseline="0" noProof="0" dirty="0" smtClean="0">
+                          <a:effectLst/>
+                          <a:latin typeface="+mn-lt"/>
+                          <a:ea typeface="Times New Roman" panose="02020603050405020304" pitchFamily="18" charset="0"/>
+                          <a:cs typeface="Segoe UI Semibold" panose="020B0702040204020203" pitchFamily="34" charset="0"/>
+                        </a:rPr>
+                        <a:t> y </a:t>
+                      </a:r>
+                      <a:r>
+                        <a:rPr lang="en-US" sz="1200" b="0" baseline="0" noProof="0" dirty="0" err="1" smtClean="0">
+                          <a:effectLst/>
+                          <a:latin typeface="+mn-lt"/>
+                          <a:ea typeface="Times New Roman" panose="02020603050405020304" pitchFamily="18" charset="0"/>
+                          <a:cs typeface="Segoe UI Semibold" panose="020B0702040204020203" pitchFamily="34" charset="0"/>
+                        </a:rPr>
+                        <a:t>deshabilitar</a:t>
+                      </a:r>
+                      <a:r>
+                        <a:rPr lang="en-US" sz="1200" b="0" baseline="0" noProof="0" dirty="0" smtClean="0">
+                          <a:effectLst/>
+                          <a:latin typeface="+mn-lt"/>
+                          <a:ea typeface="Times New Roman" panose="02020603050405020304" pitchFamily="18" charset="0"/>
+                          <a:cs typeface="Segoe UI Semibold" panose="020B0702040204020203" pitchFamily="34" charset="0"/>
+                        </a:rPr>
+                        <a:t> </a:t>
+                      </a:r>
+                      <a:r>
+                        <a:rPr lang="en-US" sz="1200" b="0" baseline="0" noProof="0" dirty="0" err="1" smtClean="0">
+                          <a:effectLst/>
+                          <a:latin typeface="+mn-lt"/>
+                          <a:ea typeface="Times New Roman" panose="02020603050405020304" pitchFamily="18" charset="0"/>
+                          <a:cs typeface="Segoe UI Semibold" panose="020B0702040204020203" pitchFamily="34" charset="0"/>
+                        </a:rPr>
+                        <a:t>ciertas</a:t>
+                      </a:r>
+                      <a:r>
+                        <a:rPr lang="en-US" sz="1200" b="0" baseline="0" noProof="0" dirty="0" smtClean="0">
+                          <a:effectLst/>
+                          <a:latin typeface="+mn-lt"/>
+                          <a:ea typeface="Times New Roman" panose="02020603050405020304" pitchFamily="18" charset="0"/>
+                          <a:cs typeface="Segoe UI Semibold" panose="020B0702040204020203" pitchFamily="34" charset="0"/>
+                        </a:rPr>
+                        <a:t> </a:t>
+                      </a:r>
+                      <a:r>
+                        <a:rPr lang="es-CO" sz="1200" b="0" baseline="0" noProof="0" dirty="0" smtClean="0">
+                          <a:effectLst/>
+                          <a:latin typeface="+mn-lt"/>
+                          <a:ea typeface="Times New Roman" panose="02020603050405020304" pitchFamily="18" charset="0"/>
+                          <a:cs typeface="Segoe UI Semibold" panose="020B0702040204020203" pitchFamily="34" charset="0"/>
+                        </a:rPr>
+                        <a:t>opciones</a:t>
+                      </a:r>
+                      <a:r>
+                        <a:rPr lang="en-US" sz="1200" b="0" baseline="0" noProof="0" dirty="0" smtClean="0">
+                          <a:effectLst/>
+                          <a:latin typeface="+mn-lt"/>
+                          <a:ea typeface="Times New Roman" panose="02020603050405020304" pitchFamily="18" charset="0"/>
+                          <a:cs typeface="Segoe UI Semibold" panose="020B0702040204020203" pitchFamily="34" charset="0"/>
+                        </a:rPr>
+                        <a:t>.</a:t>
+                      </a:r>
+                      <a:endParaRPr lang="en-US" sz="1200" b="0" dirty="0" smtClean="0">
+                        <a:effectLst/>
+                        <a:latin typeface="+mn-lt"/>
+                        <a:ea typeface="Times New Roman" panose="02020603050405020304" pitchFamily="18" charset="0"/>
+                        <a:cs typeface="Segoe UI Semibold" panose="020B0702040204020203" pitchFamily="34" charset="0"/>
+                      </a:endParaRPr>
+                    </a:p>
+                  </a:txBody>
+                  <a:tcPr/>
+                </a:tc>
+                <a:tc>
+                  <a:txBody>
+                    <a:bodyPr/>
+                    <a:lstStyle/>
+                    <a:p>
+                      <a:pPr algn="ctr"/>
+                      <a:endParaRPr lang="es-419" sz="3600" dirty="0"/>
+                    </a:p>
+                  </a:txBody>
+                  <a:tcPr anchor="ctr"/>
+                </a:tc>
+                <a:tc>
+                  <a:txBody>
+                    <a:bodyPr/>
+                    <a:lstStyle/>
+                    <a:p>
+                      <a:pPr algn="ctr"/>
+                      <a:r>
+                        <a:rPr lang="es-CO" sz="3600" dirty="0" smtClean="0"/>
+                        <a:t>x</a:t>
+                      </a:r>
+                      <a:endParaRPr lang="es-419" sz="3600" dirty="0"/>
+                    </a:p>
+                  </a:txBody>
+                  <a:tcPr anchor="ctr"/>
+                </a:tc>
+                <a:extLst>
+                  <a:ext uri="{0D108BD9-81ED-4DB2-BD59-A6C34878D82A}">
+                    <a16:rowId xmlns:a16="http://schemas.microsoft.com/office/drawing/2014/main" val="3612729649"/>
+                  </a:ext>
+                </a:extLst>
+              </a:tr>
+              <a:tr h="494051">
+                <a:tc>
+                  <a:txBody>
+                    <a:bodyPr/>
+                    <a:lstStyle/>
+                    <a:p>
+                      <a:pPr marL="0" marR="0" indent="0" algn="l" defTabSz="914400" rtl="0" eaLnBrk="1" fontAlgn="auto" latinLnBrk="0" hangingPunct="1">
+                        <a:lnSpc>
+                          <a:spcPct val="100000"/>
+                        </a:lnSpc>
+                        <a:spcBef>
+                          <a:spcPts val="0"/>
+                        </a:spcBef>
+                        <a:spcAft>
+                          <a:spcPts val="0"/>
+                        </a:spcAft>
+                        <a:buClrTx/>
+                        <a:buSzTx/>
+                        <a:buFontTx/>
+                        <a:buNone/>
+                        <a:tabLst/>
+                        <a:defRPr/>
+                      </a:pPr>
+                      <a:r>
+                        <a:rPr lang="es-CO" sz="1200" dirty="0" smtClean="0">
+                          <a:effectLst/>
+                        </a:rPr>
+                        <a:t> La</a:t>
+                      </a:r>
+                      <a:r>
+                        <a:rPr lang="es-CO" sz="1200" baseline="0" dirty="0" smtClean="0">
+                          <a:effectLst/>
+                        </a:rPr>
+                        <a:t> página web deberá mostrar reportes de las basuras ingresadas.</a:t>
+                      </a:r>
+                      <a:endParaRPr lang="en-US" sz="1200" dirty="0" smtClean="0">
+                        <a:effectLst/>
+                        <a:latin typeface="Times New Roman" panose="02020603050405020304" pitchFamily="18" charset="0"/>
+                        <a:ea typeface="Times New Roman" panose="02020603050405020304" pitchFamily="18" charset="0"/>
+                        <a:cs typeface="Times New Roman" panose="02020603050405020304" pitchFamily="18" charset="0"/>
+                      </a:endParaRPr>
+                    </a:p>
+                    <a:p>
+                      <a:pPr marL="0" marR="0" indent="0" algn="l" defTabSz="914400" rtl="0" eaLnBrk="1" fontAlgn="auto" latinLnBrk="0" hangingPunct="1">
+                        <a:lnSpc>
+                          <a:spcPct val="100000"/>
+                        </a:lnSpc>
+                        <a:spcBef>
+                          <a:spcPts val="0"/>
+                        </a:spcBef>
+                        <a:spcAft>
+                          <a:spcPts val="0"/>
+                        </a:spcAft>
+                        <a:buClrTx/>
+                        <a:buSzTx/>
+                        <a:buFontTx/>
+                        <a:buNone/>
+                        <a:tabLst/>
+                        <a:defRPr/>
+                      </a:pPr>
+                      <a:endParaRPr lang="en-US" sz="1200" dirty="0" smtClean="0">
+                        <a:effectLst/>
+                        <a:latin typeface="Times New Roman" panose="02020603050405020304" pitchFamily="18" charset="0"/>
+                        <a:ea typeface="Times New Roman" panose="02020603050405020304" pitchFamily="18" charset="0"/>
+                        <a:cs typeface="Times New Roman" panose="02020603050405020304" pitchFamily="18" charset="0"/>
+                      </a:endParaRPr>
+                    </a:p>
+                  </a:txBody>
+                  <a:tcPr/>
+                </a:tc>
+                <a:tc>
+                  <a:txBody>
+                    <a:bodyPr/>
+                    <a:lstStyle/>
+                    <a:p>
+                      <a:pPr algn="ctr"/>
+                      <a:endParaRPr lang="es-419" sz="3600" dirty="0"/>
+                    </a:p>
+                  </a:txBody>
+                  <a:tcPr anchor="ctr"/>
+                </a:tc>
+                <a:tc>
+                  <a:txBody>
+                    <a:bodyPr/>
+                    <a:lstStyle/>
+                    <a:p>
+                      <a:pPr algn="ctr"/>
+                      <a:r>
+                        <a:rPr lang="es-CO" sz="3600" dirty="0" smtClean="0"/>
+                        <a:t>x</a:t>
+                      </a:r>
+                      <a:endParaRPr lang="es-419" sz="3600" dirty="0"/>
+                    </a:p>
+                  </a:txBody>
+                  <a:tcPr anchor="ctr"/>
+                </a:tc>
+                <a:extLst>
+                  <a:ext uri="{0D108BD9-81ED-4DB2-BD59-A6C34878D82A}">
+                    <a16:rowId xmlns:a16="http://schemas.microsoft.com/office/drawing/2014/main" val="1688823906"/>
+                  </a:ext>
+                </a:extLst>
+              </a:tr>
+            </a:tbl>
+          </a:graphicData>
+        </a:graphic>
+      </p:graphicFrame>
+    </p:spTree>
+    <p:extLst>
+      <p:ext uri="{BB962C8B-B14F-4D97-AF65-F5344CB8AC3E}">
+        <p14:creationId xmlns:p14="http://schemas.microsoft.com/office/powerpoint/2010/main" val="2817366591"/>
+      </p:ext>
+    </p:extLst>
+  </p:cSld>
+  <p:clrMapOvr>
+    <a:masterClrMapping/>
+  </p:clrMapOvr>
+  <p:timing>
+    <p:tnLst>
+      <p:par>
+        <p:cTn id="1" dur="indefinite" restart="never" nodeType="tmRoot"/>
+      </p:par>
+    </p:tnLst>
+  </p:timing>
+</p:sld>
+</file>
+
+<file path=ppt/slides/slide12.xml><?xml version="1.0" encoding="utf-8"?>
+<p:sld xmlns:a="http://schemas.openxmlformats.org/drawingml/2006/main" xmlns:r="http://schemas.openxmlformats.org/officeDocument/2006/relationships" xmlns:p="http://schemas.openxmlformats.org/presentationml/2006/main">
+  <p:cSld>
+    <p:spTree>
+      <p:nvGrpSpPr>
+        <p:cNvPr id="1" name=""/>
+        <p:cNvGrpSpPr/>
+        <p:nvPr/>
+      </p:nvGrpSpPr>
+      <p:grpSpPr>
+        <a:xfrm>
+          <a:off x="0" y="0"/>
+          <a:ext cx="0" cy="0"/>
+          <a:chOff x="0" y="0"/>
+          <a:chExt cx="0" cy="0"/>
+        </a:xfrm>
+      </p:grpSpPr>
+      <p:pic>
+        <p:nvPicPr>
+          <p:cNvPr id="6" name="Imagen 5"/>
+          <p:cNvPicPr>
+            <a:picLocks noChangeAspect="1"/>
+          </p:cNvPicPr>
+          <p:nvPr/>
+        </p:nvPicPr>
+        <p:blipFill>
+          <a:blip r:embed="rId2" cstate="print">
+            <a:extLst>
+              <a:ext uri="{28A0092B-C50C-407E-A947-70E740481C1C}">
+                <a14:useLocalDpi xmlns:a14="http://schemas.microsoft.com/office/drawing/2010/main" val="0"/>
+              </a:ext>
+            </a:extLst>
+          </a:blip>
+          <a:stretch>
+            <a:fillRect/>
+          </a:stretch>
+        </p:blipFill>
+        <p:spPr>
+          <a:xfrm>
+            <a:off x="0" y="0"/>
+            <a:ext cx="12192000" cy="6858000"/>
+          </a:xfrm>
+          <a:prstGeom prst="rect">
+            <a:avLst/>
+          </a:prstGeom>
+        </p:spPr>
+      </p:pic>
+      <p:sp>
+        <p:nvSpPr>
+          <p:cNvPr id="2" name="Título 1"/>
+          <p:cNvSpPr>
+            <a:spLocks noGrp="1"/>
+          </p:cNvSpPr>
+          <p:nvPr>
+            <p:ph type="title"/>
+          </p:nvPr>
+        </p:nvSpPr>
+        <p:spPr>
+          <a:xfrm>
+            <a:off x="668383" y="103868"/>
+            <a:ext cx="10515600" cy="1325563"/>
+          </a:xfrm>
+        </p:spPr>
+        <p:txBody>
+          <a:bodyPr>
+            <a:normAutofit/>
+          </a:bodyPr>
+          <a:lstStyle/>
+          <a:p>
+            <a:pPr algn="ctr"/>
+            <a:r>
+              <a:rPr lang="es-CO" sz="4000" b="1" dirty="0" smtClean="0">
+                <a:ln w="12700">
+                  <a:solidFill>
+                    <a:schemeClr val="tx2">
+                      <a:lumMod val="75000"/>
+                    </a:schemeClr>
+                  </a:solidFill>
+                  <a:prstDash val="solid"/>
+                </a:ln>
+                <a:pattFill prst="dkUpDiag">
+                  <a:fgClr>
+                    <a:schemeClr val="tx2"/>
+                  </a:fgClr>
+                  <a:bgClr>
+                    <a:schemeClr val="tx2">
+                      <a:lumMod val="20000"/>
+                      <a:lumOff val="80000"/>
+                    </a:schemeClr>
+                  </a:bgClr>
+                </a:pattFill>
+                <a:effectLst>
+                  <a:outerShdw dist="38100" dir="2640000" algn="bl" rotWithShape="0">
+                    <a:schemeClr val="tx2">
+                      <a:lumMod val="75000"/>
+                    </a:schemeClr>
+                  </a:outerShdw>
+                </a:effectLst>
+              </a:rPr>
+              <a:t>Evaluación</a:t>
+            </a:r>
+            <a:endParaRPr lang="en-US" sz="4000" dirty="0"/>
+          </a:p>
+        </p:txBody>
+      </p:sp>
+      <p:graphicFrame>
+        <p:nvGraphicFramePr>
+          <p:cNvPr id="4" name="Marcador de contenido 3"/>
+          <p:cNvGraphicFramePr>
+            <a:graphicFrameLocks noGrp="1"/>
+          </p:cNvGraphicFramePr>
+          <p:nvPr>
+            <p:ph idx="1"/>
+            <p:extLst>
+              <p:ext uri="{D42A27DB-BD31-4B8C-83A1-F6EECF244321}">
+                <p14:modId xmlns:p14="http://schemas.microsoft.com/office/powerpoint/2010/main" val="3221898247"/>
+              </p:ext>
+            </p:extLst>
+          </p:nvPr>
+        </p:nvGraphicFramePr>
+        <p:xfrm>
+          <a:off x="3083321" y="1048772"/>
+          <a:ext cx="7157959" cy="5463173"/>
+        </p:xfrm>
+        <a:graphic>
+          <a:graphicData uri="http://schemas.openxmlformats.org/drawingml/2006/table">
+            <a:tbl>
+              <a:tblPr firstRow="1" bandRow="1">
+                <a:tableStyleId>{5C22544A-7EE6-4342-B048-85BDC9FD1C3A}</a:tableStyleId>
+              </a:tblPr>
+              <a:tblGrid>
+                <a:gridCol w="3505200">
+                  <a:extLst>
+                    <a:ext uri="{9D8B030D-6E8A-4147-A177-3AD203B41FA5}">
+                      <a16:colId xmlns:a16="http://schemas.microsoft.com/office/drawing/2014/main" val="683261864"/>
+                    </a:ext>
+                  </a:extLst>
+                </a:gridCol>
+                <a:gridCol w="3652759">
+                  <a:extLst>
+                    <a:ext uri="{9D8B030D-6E8A-4147-A177-3AD203B41FA5}">
+                      <a16:colId xmlns:a16="http://schemas.microsoft.com/office/drawing/2014/main" val="2734139358"/>
+                    </a:ext>
+                  </a:extLst>
+                </a:gridCol>
+              </a:tblGrid>
+              <a:tr h="371453">
+                <a:tc>
+                  <a:txBody>
+                    <a:bodyPr/>
+                    <a:lstStyle/>
+                    <a:p>
+                      <a:r>
+                        <a:rPr lang="es-CO" dirty="0" smtClean="0"/>
+                        <a:t>Requerimiento</a:t>
+                      </a:r>
+                      <a:endParaRPr lang="es-419" dirty="0"/>
+                    </a:p>
+                  </a:txBody>
+                  <a:tcPr/>
+                </a:tc>
+                <a:tc>
+                  <a:txBody>
+                    <a:bodyPr/>
+                    <a:lstStyle/>
+                    <a:p>
+                      <a:r>
+                        <a:rPr lang="es-CO" dirty="0" smtClean="0"/>
+                        <a:t>Justificación</a:t>
+                      </a:r>
+                      <a:endParaRPr lang="es-419" dirty="0"/>
+                    </a:p>
+                  </a:txBody>
+                  <a:tcPr/>
+                </a:tc>
+                <a:extLst>
+                  <a:ext uri="{0D108BD9-81ED-4DB2-BD59-A6C34878D82A}">
+                    <a16:rowId xmlns:a16="http://schemas.microsoft.com/office/drawing/2014/main" val="2328073056"/>
+                  </a:ext>
+                </a:extLst>
+              </a:tr>
+              <a:tr h="650042">
+                <a:tc>
+                  <a:txBody>
+                    <a:bodyPr/>
+                    <a:lstStyle/>
+                    <a:p>
+                      <a:r>
+                        <a:rPr lang="es-CO" sz="1200" dirty="0" smtClean="0">
+                          <a:effectLst/>
+                        </a:rPr>
+                        <a:t>La cámara instalada en la caja deberá tomar la foto del material para ser posteriormente analizada para su respectivo reciclaje.</a:t>
+                      </a:r>
+                      <a:endParaRPr lang="es-419" sz="1200" dirty="0"/>
+                    </a:p>
+                  </a:txBody>
+                  <a:tcPr/>
+                </a:tc>
+                <a:tc>
+                  <a:txBody>
+                    <a:bodyPr/>
+                    <a:lstStyle/>
+                    <a:p>
+                      <a:pPr algn="l"/>
+                      <a:r>
+                        <a:rPr lang="es-CO" sz="1200" dirty="0" smtClean="0">
+                          <a:latin typeface="+mn-lt"/>
+                        </a:rPr>
+                        <a:t>No cumple porque aún no se ha desarrollado el</a:t>
+                      </a:r>
+                      <a:r>
+                        <a:rPr lang="es-CO" sz="1200" baseline="0" dirty="0" smtClean="0">
+                          <a:latin typeface="+mn-lt"/>
+                        </a:rPr>
+                        <a:t> hardware para realizar las pruebas</a:t>
+                      </a:r>
+                      <a:endParaRPr lang="es-419" sz="1200" dirty="0">
+                        <a:latin typeface="+mn-lt"/>
+                      </a:endParaRPr>
+                    </a:p>
+                  </a:txBody>
+                  <a:tcPr/>
+                </a:tc>
+                <a:extLst>
+                  <a:ext uri="{0D108BD9-81ED-4DB2-BD59-A6C34878D82A}">
+                    <a16:rowId xmlns:a16="http://schemas.microsoft.com/office/drawing/2014/main" val="4047556611"/>
+                  </a:ext>
+                </a:extLst>
+              </a:tr>
+              <a:tr h="729640">
+                <a:tc>
+                  <a:txBody>
+                    <a:bodyPr/>
+                    <a:lstStyle/>
+                    <a:p>
+                      <a:pPr marL="0" marR="0" indent="0" algn="l" defTabSz="914400" rtl="0" eaLnBrk="1" fontAlgn="auto" latinLnBrk="0" hangingPunct="1">
+                        <a:lnSpc>
+                          <a:spcPct val="100000"/>
+                        </a:lnSpc>
+                        <a:spcBef>
+                          <a:spcPts val="0"/>
+                        </a:spcBef>
+                        <a:spcAft>
+                          <a:spcPts val="0"/>
+                        </a:spcAft>
+                        <a:buClrTx/>
+                        <a:buSzTx/>
+                        <a:buFontTx/>
+                        <a:buNone/>
+                        <a:tabLst/>
+                        <a:defRPr/>
+                      </a:pPr>
+                      <a:r>
+                        <a:rPr lang="es-CO" sz="1200" dirty="0" smtClean="0">
+                          <a:effectLst/>
+                        </a:rPr>
+                        <a:t> El Scanner debe cumplir la función de que cuando una persona deposite un material en la caja, se active inmediatamente el sistema.</a:t>
+                      </a:r>
+                      <a:endParaRPr lang="en-US" sz="1200" dirty="0" smtClean="0">
+                        <a:effectLst/>
+                        <a:latin typeface="Times New Roman" panose="02020603050405020304" pitchFamily="18" charset="0"/>
+                        <a:ea typeface="Times New Roman" panose="02020603050405020304" pitchFamily="18" charset="0"/>
+                        <a:cs typeface="Times New Roman" panose="02020603050405020304" pitchFamily="18" charset="0"/>
+                      </a:endParaRPr>
+                    </a:p>
+                  </a:txBody>
+                  <a:tcPr/>
+                </a:tc>
+                <a:tc>
+                  <a:txBody>
+                    <a:bodyPr/>
+                    <a:lstStyle/>
+                    <a:p>
+                      <a:pPr marL="0" marR="0" indent="0" algn="l" defTabSz="914400" rtl="0" eaLnBrk="1" fontAlgn="auto" latinLnBrk="0" hangingPunct="1">
+                        <a:lnSpc>
+                          <a:spcPct val="100000"/>
+                        </a:lnSpc>
+                        <a:spcBef>
+                          <a:spcPts val="0"/>
+                        </a:spcBef>
+                        <a:spcAft>
+                          <a:spcPts val="0"/>
+                        </a:spcAft>
+                        <a:buClrTx/>
+                        <a:buSzTx/>
+                        <a:buFontTx/>
+                        <a:buNone/>
+                        <a:tabLst/>
+                        <a:defRPr/>
+                      </a:pPr>
+                      <a:r>
+                        <a:rPr lang="es-CO" sz="1200" dirty="0" smtClean="0"/>
+                        <a:t>No cumple porque aún no se ha desarrollado el</a:t>
+                      </a:r>
+                      <a:r>
+                        <a:rPr lang="es-CO" sz="1200" baseline="0" dirty="0" smtClean="0"/>
+                        <a:t> hardware para realizar las pruebas</a:t>
+                      </a:r>
+                      <a:endParaRPr lang="es-419" sz="1200" dirty="0" smtClean="0"/>
+                    </a:p>
+                    <a:p>
+                      <a:pPr marL="0" marR="0" indent="0" algn="l" defTabSz="914400" rtl="0" eaLnBrk="1" fontAlgn="auto" latinLnBrk="0" hangingPunct="1">
+                        <a:lnSpc>
+                          <a:spcPct val="100000"/>
+                        </a:lnSpc>
+                        <a:spcBef>
+                          <a:spcPts val="0"/>
+                        </a:spcBef>
+                        <a:spcAft>
+                          <a:spcPts val="0"/>
+                        </a:spcAft>
+                        <a:buClrTx/>
+                        <a:buSzTx/>
+                        <a:buFontTx/>
+                        <a:buNone/>
+                        <a:tabLst/>
+                        <a:defRPr/>
+                      </a:pPr>
+                      <a:endParaRPr lang="es-419" sz="1200" dirty="0" smtClean="0">
+                        <a:latin typeface="+mn-lt"/>
+                      </a:endParaRPr>
+                    </a:p>
+                  </a:txBody>
+                  <a:tcPr/>
+                </a:tc>
+                <a:extLst>
+                  <a:ext uri="{0D108BD9-81ED-4DB2-BD59-A6C34878D82A}">
+                    <a16:rowId xmlns:a16="http://schemas.microsoft.com/office/drawing/2014/main" val="1112101993"/>
+                  </a:ext>
+                </a:extLst>
+              </a:tr>
+              <a:tr h="835769">
+                <a:tc>
+                  <a:txBody>
+                    <a:bodyPr/>
+                    <a:lstStyle/>
+                    <a:p>
+                      <a:pPr marL="0" marR="0" indent="0" algn="l" defTabSz="914400" rtl="0" eaLnBrk="1" fontAlgn="auto" latinLnBrk="0" hangingPunct="1">
+                        <a:lnSpc>
+                          <a:spcPct val="100000"/>
+                        </a:lnSpc>
+                        <a:spcBef>
+                          <a:spcPts val="0"/>
+                        </a:spcBef>
+                        <a:spcAft>
+                          <a:spcPts val="0"/>
+                        </a:spcAft>
+                        <a:buClrTx/>
+                        <a:buSzTx/>
+                        <a:buFontTx/>
+                        <a:buNone/>
+                        <a:tabLst/>
+                        <a:defRPr/>
+                      </a:pPr>
+                      <a:r>
+                        <a:rPr lang="es-CO" sz="1200" dirty="0" smtClean="0">
+                          <a:effectLst/>
+                        </a:rPr>
+                        <a:t>Luego de que el material haya sido analizado, el servomotor debe abrir la escotilla para dejar entrar a este hacia los ductos que posteriormente lo llevarán hacia su respectivo basurero. </a:t>
+                      </a:r>
+                      <a:endParaRPr lang="en-US" sz="1200" dirty="0" smtClean="0">
+                        <a:effectLst/>
+                        <a:latin typeface="Times New Roman" panose="02020603050405020304" pitchFamily="18" charset="0"/>
+                        <a:ea typeface="Times New Roman" panose="02020603050405020304" pitchFamily="18" charset="0"/>
+                        <a:cs typeface="Times New Roman" panose="02020603050405020304" pitchFamily="18" charset="0"/>
+                      </a:endParaRPr>
+                    </a:p>
+                  </a:txBody>
+                  <a:tcPr/>
+                </a:tc>
+                <a:tc>
+                  <a:txBody>
+                    <a:bodyPr/>
+                    <a:lstStyle/>
+                    <a:p>
+                      <a:pPr marL="0" marR="0" indent="0" algn="l" defTabSz="914400" rtl="0" eaLnBrk="1" fontAlgn="auto" latinLnBrk="0" hangingPunct="1">
+                        <a:lnSpc>
+                          <a:spcPct val="100000"/>
+                        </a:lnSpc>
+                        <a:spcBef>
+                          <a:spcPts val="0"/>
+                        </a:spcBef>
+                        <a:spcAft>
+                          <a:spcPts val="0"/>
+                        </a:spcAft>
+                        <a:buClrTx/>
+                        <a:buSzTx/>
+                        <a:buFontTx/>
+                        <a:buNone/>
+                        <a:tabLst/>
+                        <a:defRPr/>
+                      </a:pPr>
+                      <a:r>
+                        <a:rPr lang="es-CO" sz="1200" dirty="0" smtClean="0"/>
+                        <a:t>No cumple porque aún no se ha desarrollado el</a:t>
+                      </a:r>
+                      <a:r>
+                        <a:rPr lang="es-CO" sz="1200" baseline="0" dirty="0" smtClean="0"/>
+                        <a:t> hardware para realizar las pruebas</a:t>
+                      </a:r>
+                      <a:endParaRPr lang="es-419" sz="1200" dirty="0" smtClean="0"/>
+                    </a:p>
+                    <a:p>
+                      <a:pPr algn="l"/>
+                      <a:endParaRPr lang="es-419" sz="1200" dirty="0">
+                        <a:latin typeface="+mn-lt"/>
+                      </a:endParaRPr>
+                    </a:p>
+                  </a:txBody>
+                  <a:tcPr/>
+                </a:tc>
+                <a:extLst>
+                  <a:ext uri="{0D108BD9-81ED-4DB2-BD59-A6C34878D82A}">
+                    <a16:rowId xmlns:a16="http://schemas.microsoft.com/office/drawing/2014/main" val="3969023699"/>
+                  </a:ext>
+                </a:extLst>
+              </a:tr>
+              <a:tr h="844884">
+                <a:tc>
+                  <a:txBody>
+                    <a:bodyPr/>
+                    <a:lstStyle/>
+                    <a:p>
+                      <a:pPr marL="0" marR="0" indent="0" algn="l" defTabSz="914400" rtl="0" eaLnBrk="1" fontAlgn="auto" latinLnBrk="0" hangingPunct="1">
+                        <a:lnSpc>
+                          <a:spcPct val="100000"/>
+                        </a:lnSpc>
+                        <a:spcBef>
+                          <a:spcPts val="0"/>
+                        </a:spcBef>
+                        <a:spcAft>
+                          <a:spcPts val="0"/>
+                        </a:spcAft>
+                        <a:buClrTx/>
+                        <a:buSzTx/>
+                        <a:buFontTx/>
+                        <a:buNone/>
+                        <a:tabLst/>
+                        <a:defRPr/>
+                      </a:pPr>
+                      <a:r>
+                        <a:rPr lang="es-CO" sz="1400" dirty="0" smtClean="0">
+                          <a:effectLst/>
+                        </a:rPr>
+                        <a:t> </a:t>
+                      </a:r>
+                      <a:r>
+                        <a:rPr lang="es-CO" sz="1200" dirty="0" smtClean="0">
+                          <a:effectLst/>
+                        </a:rPr>
+                        <a:t>Los servomotores deben mover</a:t>
+                      </a:r>
+                      <a:r>
+                        <a:rPr lang="es-CO" sz="1200" baseline="0" dirty="0" smtClean="0">
+                          <a:effectLst/>
+                        </a:rPr>
+                        <a:t> las </a:t>
+                      </a:r>
+                      <a:r>
+                        <a:rPr lang="es-CO" sz="1200" dirty="0" smtClean="0">
+                          <a:effectLst/>
+                        </a:rPr>
+                        <a:t>escotillas dependiendo de las condiciones que arroje el sistema, para así llevar el material a su respectivo basurero.</a:t>
+                      </a:r>
+                      <a:endParaRPr lang="en-US" sz="1200" dirty="0" smtClean="0">
+                        <a:effectLst/>
+                        <a:latin typeface="Times New Roman" panose="02020603050405020304" pitchFamily="18" charset="0"/>
+                        <a:ea typeface="Times New Roman" panose="02020603050405020304" pitchFamily="18" charset="0"/>
+                        <a:cs typeface="Times New Roman" panose="02020603050405020304" pitchFamily="18" charset="0"/>
+                      </a:endParaRPr>
+                    </a:p>
+                  </a:txBody>
+                  <a:tcPr/>
+                </a:tc>
+                <a:tc>
+                  <a:txBody>
+                    <a:bodyPr/>
+                    <a:lstStyle/>
+                    <a:p>
+                      <a:pPr marL="0" marR="0" indent="0" algn="l" defTabSz="914400" rtl="0" eaLnBrk="1" fontAlgn="auto" latinLnBrk="0" hangingPunct="1">
+                        <a:lnSpc>
+                          <a:spcPct val="100000"/>
+                        </a:lnSpc>
+                        <a:spcBef>
+                          <a:spcPts val="0"/>
+                        </a:spcBef>
+                        <a:spcAft>
+                          <a:spcPts val="0"/>
+                        </a:spcAft>
+                        <a:buClrTx/>
+                        <a:buSzTx/>
+                        <a:buFontTx/>
+                        <a:buNone/>
+                        <a:tabLst/>
+                        <a:defRPr/>
+                      </a:pPr>
+                      <a:r>
+                        <a:rPr lang="es-CO" sz="1200" dirty="0" smtClean="0"/>
+                        <a:t>No cumple porque aún no se ha desarrollado el</a:t>
+                      </a:r>
+                      <a:r>
+                        <a:rPr lang="es-CO" sz="1200" baseline="0" dirty="0" smtClean="0"/>
+                        <a:t> hardware para realizar las pruebas</a:t>
+                      </a:r>
+                      <a:endParaRPr lang="es-419" sz="1200" dirty="0" smtClean="0"/>
+                    </a:p>
+                    <a:p>
+                      <a:pPr algn="l"/>
+                      <a:endParaRPr lang="es-419" sz="1200" dirty="0">
+                        <a:latin typeface="+mn-lt"/>
+                      </a:endParaRPr>
+                    </a:p>
+                  </a:txBody>
+                  <a:tcPr/>
+                </a:tc>
+                <a:extLst>
+                  <a:ext uri="{0D108BD9-81ED-4DB2-BD59-A6C34878D82A}">
+                    <a16:rowId xmlns:a16="http://schemas.microsoft.com/office/drawing/2014/main" val="1412900898"/>
+                  </a:ext>
+                </a:extLst>
+              </a:tr>
+              <a:tr h="722745">
+                <a:tc>
+                  <a:txBody>
+                    <a:bodyPr/>
+                    <a:lstStyle/>
+                    <a:p>
+                      <a:pPr marL="0" marR="0" indent="0" algn="l" defTabSz="914400" rtl="0" eaLnBrk="1" fontAlgn="auto" latinLnBrk="0" hangingPunct="1">
+                        <a:lnSpc>
+                          <a:spcPct val="100000"/>
+                        </a:lnSpc>
+                        <a:spcBef>
+                          <a:spcPts val="0"/>
+                        </a:spcBef>
+                        <a:spcAft>
+                          <a:spcPts val="0"/>
+                        </a:spcAft>
+                        <a:buClrTx/>
+                        <a:buSzTx/>
+                        <a:buFontTx/>
+                        <a:buNone/>
+                        <a:tabLst/>
+                        <a:defRPr/>
+                      </a:pPr>
+                      <a:r>
+                        <a:rPr lang="es-CO" sz="1200" dirty="0" smtClean="0">
+                          <a:effectLst/>
+                        </a:rPr>
+                        <a:t>El sistema debe analizar el material usando la API de Google llamada </a:t>
+                      </a:r>
+                      <a:r>
+                        <a:rPr lang="es-CO" sz="1200" dirty="0" err="1" smtClean="0">
+                          <a:effectLst/>
+                        </a:rPr>
+                        <a:t>Vision</a:t>
+                      </a:r>
+                      <a:r>
+                        <a:rPr lang="es-CO" sz="1200" dirty="0" smtClean="0">
+                          <a:effectLst/>
+                        </a:rPr>
+                        <a:t> para así determinar el nombre del objeto que está en la foto.</a:t>
+                      </a:r>
+                      <a:endParaRPr lang="en-US" sz="1200" dirty="0" smtClean="0">
+                        <a:effectLst/>
+                        <a:latin typeface="Times New Roman" panose="02020603050405020304" pitchFamily="18" charset="0"/>
+                        <a:ea typeface="Times New Roman" panose="02020603050405020304" pitchFamily="18" charset="0"/>
+                        <a:cs typeface="Times New Roman" panose="02020603050405020304" pitchFamily="18" charset="0"/>
+                      </a:endParaRPr>
+                    </a:p>
+                  </a:txBody>
+                  <a:tcPr/>
+                </a:tc>
+                <a:tc>
+                  <a:txBody>
+                    <a:bodyPr/>
+                    <a:lstStyle/>
+                    <a:p>
+                      <a:pPr algn="l"/>
+                      <a:r>
+                        <a:rPr lang="es-CO" sz="1200" dirty="0" smtClean="0">
+                          <a:latin typeface="+mn-lt"/>
+                        </a:rPr>
+                        <a:t>Se realizaron</a:t>
+                      </a:r>
+                      <a:r>
+                        <a:rPr lang="es-CO" sz="1200" baseline="0" dirty="0" smtClean="0">
+                          <a:latin typeface="+mn-lt"/>
+                        </a:rPr>
+                        <a:t> pruebas y la API </a:t>
+                      </a:r>
+                      <a:r>
+                        <a:rPr lang="es-CO" sz="1200" baseline="0" dirty="0" err="1" smtClean="0">
+                          <a:latin typeface="+mn-lt"/>
+                        </a:rPr>
+                        <a:t>Vision</a:t>
+                      </a:r>
+                      <a:r>
+                        <a:rPr lang="es-CO" sz="1200" baseline="0" dirty="0" smtClean="0">
+                          <a:latin typeface="+mn-lt"/>
+                        </a:rPr>
+                        <a:t> nos devuelve, con un alto porcentaje de acierto, qué objeto es él que está en la imagen o foto.</a:t>
+                      </a:r>
+                      <a:endParaRPr lang="es-419" sz="1200" dirty="0">
+                        <a:latin typeface="+mn-lt"/>
+                      </a:endParaRPr>
+                    </a:p>
+                  </a:txBody>
+                  <a:tcPr/>
+                </a:tc>
+                <a:extLst>
+                  <a:ext uri="{0D108BD9-81ED-4DB2-BD59-A6C34878D82A}">
+                    <a16:rowId xmlns:a16="http://schemas.microsoft.com/office/drawing/2014/main" val="3612729649"/>
+                  </a:ext>
+                </a:extLst>
+              </a:tr>
+              <a:tr h="650042">
+                <a:tc>
+                  <a:txBody>
+                    <a:bodyPr/>
+                    <a:lstStyle/>
+                    <a:p>
+                      <a:pPr marL="0" marR="0" indent="0" algn="l" defTabSz="914400" rtl="0" eaLnBrk="1" fontAlgn="auto" latinLnBrk="0" hangingPunct="1">
+                        <a:lnSpc>
+                          <a:spcPct val="100000"/>
+                        </a:lnSpc>
+                        <a:spcBef>
+                          <a:spcPts val="0"/>
+                        </a:spcBef>
+                        <a:spcAft>
+                          <a:spcPts val="0"/>
+                        </a:spcAft>
+                        <a:buClrTx/>
+                        <a:buSzTx/>
+                        <a:buFontTx/>
+                        <a:buNone/>
+                        <a:tabLst/>
+                        <a:defRPr/>
+                      </a:pPr>
+                      <a:r>
+                        <a:rPr lang="es-CO" sz="1200" dirty="0" smtClean="0">
+                          <a:effectLst/>
+                        </a:rPr>
+                        <a:t>El sistema debe tomar el nombre del objeto de la foto para buscar en la base de datos la</a:t>
+                      </a:r>
+                      <a:r>
+                        <a:rPr lang="es-CO" sz="1200" baseline="0" dirty="0" smtClean="0">
+                          <a:effectLst/>
+                        </a:rPr>
+                        <a:t> categoría</a:t>
+                      </a:r>
+                      <a:r>
+                        <a:rPr lang="es-CO" sz="1200" dirty="0" smtClean="0">
+                          <a:effectLst/>
+                        </a:rPr>
+                        <a:t> a</a:t>
+                      </a:r>
+                      <a:r>
+                        <a:rPr lang="es-CO" sz="1200" baseline="0" dirty="0" smtClean="0">
+                          <a:effectLst/>
+                        </a:rPr>
+                        <a:t> la</a:t>
+                      </a:r>
+                      <a:r>
+                        <a:rPr lang="es-CO" sz="1200" dirty="0" smtClean="0">
+                          <a:effectLst/>
+                        </a:rPr>
+                        <a:t> que pertenece.</a:t>
+                      </a:r>
+                      <a:endParaRPr lang="en-US" sz="1200" dirty="0" smtClean="0">
+                        <a:effectLst/>
+                        <a:latin typeface="Times New Roman" panose="02020603050405020304" pitchFamily="18" charset="0"/>
+                        <a:ea typeface="Times New Roman" panose="02020603050405020304" pitchFamily="18" charset="0"/>
+                        <a:cs typeface="Times New Roman" panose="02020603050405020304" pitchFamily="18" charset="0"/>
+                      </a:endParaRPr>
+                    </a:p>
+                  </a:txBody>
+                  <a:tcPr/>
+                </a:tc>
+                <a:tc>
+                  <a:txBody>
+                    <a:bodyPr/>
+                    <a:lstStyle/>
+                    <a:p>
+                      <a:pPr algn="l"/>
+                      <a:r>
+                        <a:rPr lang="es-CO" sz="1200" dirty="0" smtClean="0">
+                          <a:latin typeface="+mn-lt"/>
+                        </a:rPr>
+                        <a:t>Se</a:t>
+                      </a:r>
+                      <a:r>
+                        <a:rPr lang="es-CO" sz="1200" baseline="0" dirty="0" smtClean="0">
+                          <a:latin typeface="+mn-lt"/>
+                        </a:rPr>
+                        <a:t> realizaron pruebas con un algoritmo temporal y la base de datos y el algoritmo nos mostraba en pantalla la categoría correcta de la basura.</a:t>
+                      </a:r>
+                      <a:endParaRPr lang="es-419" sz="1200" dirty="0">
+                        <a:latin typeface="+mn-lt"/>
+                      </a:endParaRPr>
+                    </a:p>
+                  </a:txBody>
+                  <a:tcPr/>
+                </a:tc>
+                <a:extLst>
+                  <a:ext uri="{0D108BD9-81ED-4DB2-BD59-A6C34878D82A}">
+                    <a16:rowId xmlns:a16="http://schemas.microsoft.com/office/drawing/2014/main" val="1688823906"/>
+                  </a:ext>
+                </a:extLst>
+              </a:tr>
+              <a:tr h="650042">
+                <a:tc>
+                  <a:txBody>
+                    <a:bodyPr/>
+                    <a:lstStyle/>
+                    <a:p>
+                      <a:pPr marL="0" marR="0" indent="0" algn="l" defTabSz="914400" rtl="0" eaLnBrk="1" fontAlgn="auto" latinLnBrk="0" hangingPunct="1">
+                        <a:lnSpc>
+                          <a:spcPct val="100000"/>
+                        </a:lnSpc>
+                        <a:spcBef>
+                          <a:spcPts val="0"/>
+                        </a:spcBef>
+                        <a:spcAft>
+                          <a:spcPts val="0"/>
+                        </a:spcAft>
+                        <a:buClrTx/>
+                        <a:buSzTx/>
+                        <a:buFontTx/>
+                        <a:buNone/>
+                        <a:tabLst/>
+                        <a:defRPr/>
+                      </a:pPr>
+                      <a:r>
+                        <a:rPr lang="es-CO" sz="1200" dirty="0" smtClean="0">
+                          <a:effectLst/>
+                        </a:rPr>
+                        <a:t> El sistema debe realizar unas condiciones para determinar hacia</a:t>
+                      </a:r>
+                      <a:r>
+                        <a:rPr lang="es-CO" sz="1200" baseline="0" dirty="0" smtClean="0">
+                          <a:effectLst/>
+                        </a:rPr>
+                        <a:t> que lugar mover los</a:t>
+                      </a:r>
+                      <a:r>
+                        <a:rPr lang="es-CO" sz="1200" dirty="0" smtClean="0">
+                          <a:effectLst/>
+                        </a:rPr>
+                        <a:t> servomotores para llevar el objeto a su respectivo basurero.</a:t>
+                      </a:r>
+                      <a:endParaRPr lang="en-US" sz="1200" dirty="0" smtClean="0">
+                        <a:effectLst/>
+                        <a:latin typeface="Times New Roman" panose="02020603050405020304" pitchFamily="18" charset="0"/>
+                        <a:ea typeface="Times New Roman" panose="02020603050405020304" pitchFamily="18" charset="0"/>
+                        <a:cs typeface="Times New Roman" panose="02020603050405020304" pitchFamily="18" charset="0"/>
+                      </a:endParaRPr>
+                    </a:p>
+                  </a:txBody>
+                  <a:tcPr/>
+                </a:tc>
+                <a:tc>
+                  <a:txBody>
+                    <a:bodyPr/>
+                    <a:lstStyle/>
+                    <a:p>
+                      <a:pPr algn="l"/>
+                      <a:r>
+                        <a:rPr lang="es-CO" sz="1200" dirty="0" smtClean="0">
+                          <a:latin typeface="+mn-lt"/>
+                        </a:rPr>
+                        <a:t>Se</a:t>
+                      </a:r>
+                      <a:r>
+                        <a:rPr lang="es-CO" sz="1200" baseline="0" dirty="0" smtClean="0">
+                          <a:latin typeface="+mn-lt"/>
+                        </a:rPr>
+                        <a:t> realizaron pruebas con un algoritmo y un hardware temporal y los servomotores se movían correctamente según las condiciones.</a:t>
+                      </a:r>
+                      <a:endParaRPr lang="es-419" sz="1200" dirty="0">
+                        <a:latin typeface="+mn-lt"/>
+                      </a:endParaRPr>
+                    </a:p>
+                  </a:txBody>
+                  <a:tcPr/>
+                </a:tc>
+                <a:extLst>
+                  <a:ext uri="{0D108BD9-81ED-4DB2-BD59-A6C34878D82A}">
+                    <a16:rowId xmlns:a16="http://schemas.microsoft.com/office/drawing/2014/main" val="2161421661"/>
+                  </a:ext>
+                </a:extLst>
+              </a:tr>
+            </a:tbl>
+          </a:graphicData>
+        </a:graphic>
+      </p:graphicFrame>
+    </p:spTree>
+    <p:extLst>
+      <p:ext uri="{BB962C8B-B14F-4D97-AF65-F5344CB8AC3E}">
+        <p14:creationId xmlns:p14="http://schemas.microsoft.com/office/powerpoint/2010/main" val="3976314713"/>
+      </p:ext>
+    </p:extLst>
+  </p:cSld>
+  <p:clrMapOvr>
+    <a:masterClrMapping/>
+  </p:clrMapOvr>
+  <p:timing>
+    <p:tnLst>
+      <p:par>
+        <p:cTn id="1" dur="indefinite" restart="never" nodeType="tmRoot"/>
+      </p:par>
+    </p:tnLst>
+  </p:timing>
+</p:sld>
+</file>
+
+<file path=ppt/slides/slide13.xml><?xml version="1.0" encoding="utf-8"?>
+<p:sld xmlns:a="http://schemas.openxmlformats.org/drawingml/2006/main" xmlns:r="http://schemas.openxmlformats.org/officeDocument/2006/relationships" xmlns:p="http://schemas.openxmlformats.org/presentationml/2006/main">
+  <p:cSld>
+    <p:spTree>
+      <p:nvGrpSpPr>
+        <p:cNvPr id="1" name=""/>
+        <p:cNvGrpSpPr/>
+        <p:nvPr/>
+      </p:nvGrpSpPr>
+      <p:grpSpPr>
+        <a:xfrm>
+          <a:off x="0" y="0"/>
+          <a:ext cx="0" cy="0"/>
+          <a:chOff x="0" y="0"/>
+          <a:chExt cx="0" cy="0"/>
+        </a:xfrm>
+      </p:grpSpPr>
+      <p:pic>
+        <p:nvPicPr>
+          <p:cNvPr id="6" name="Imagen 5"/>
+          <p:cNvPicPr>
+            <a:picLocks noChangeAspect="1"/>
+          </p:cNvPicPr>
+          <p:nvPr/>
+        </p:nvPicPr>
+        <p:blipFill>
+          <a:blip r:embed="rId2" cstate="print">
+            <a:extLst>
+              <a:ext uri="{28A0092B-C50C-407E-A947-70E740481C1C}">
+                <a14:useLocalDpi xmlns:a14="http://schemas.microsoft.com/office/drawing/2010/main" val="0"/>
+              </a:ext>
+            </a:extLst>
+          </a:blip>
+          <a:stretch>
+            <a:fillRect/>
+          </a:stretch>
+        </p:blipFill>
+        <p:spPr>
+          <a:xfrm>
+            <a:off x="0" y="0"/>
+            <a:ext cx="12192000" cy="6858000"/>
+          </a:xfrm>
+          <a:prstGeom prst="rect">
+            <a:avLst/>
+          </a:prstGeom>
+        </p:spPr>
+      </p:pic>
+      <p:sp>
+        <p:nvSpPr>
+          <p:cNvPr id="2" name="Título 1"/>
+          <p:cNvSpPr>
+            <a:spLocks noGrp="1"/>
+          </p:cNvSpPr>
+          <p:nvPr>
+            <p:ph type="title"/>
+          </p:nvPr>
+        </p:nvSpPr>
+        <p:spPr>
+          <a:xfrm>
+            <a:off x="668383" y="103868"/>
+            <a:ext cx="10515600" cy="1325563"/>
+          </a:xfrm>
+        </p:spPr>
+        <p:txBody>
+          <a:bodyPr>
+            <a:normAutofit/>
+          </a:bodyPr>
+          <a:lstStyle/>
+          <a:p>
+            <a:pPr algn="ctr"/>
+            <a:r>
+              <a:rPr lang="es-CO" sz="4000" b="1" dirty="0" smtClean="0">
+                <a:ln w="12700">
+                  <a:solidFill>
+                    <a:schemeClr val="tx2">
+                      <a:lumMod val="75000"/>
+                    </a:schemeClr>
+                  </a:solidFill>
+                  <a:prstDash val="solid"/>
+                </a:ln>
+                <a:pattFill prst="dkUpDiag">
+                  <a:fgClr>
+                    <a:schemeClr val="tx2"/>
+                  </a:fgClr>
+                  <a:bgClr>
+                    <a:schemeClr val="tx2">
+                      <a:lumMod val="20000"/>
+                      <a:lumOff val="80000"/>
+                    </a:schemeClr>
+                  </a:bgClr>
+                </a:pattFill>
+                <a:effectLst>
+                  <a:outerShdw dist="38100" dir="2640000" algn="bl" rotWithShape="0">
+                    <a:schemeClr val="tx2">
+                      <a:lumMod val="75000"/>
+                    </a:schemeClr>
+                  </a:outerShdw>
+                </a:effectLst>
+              </a:rPr>
+              <a:t>Evaluación</a:t>
+            </a:r>
+            <a:endParaRPr lang="en-US" sz="4000" dirty="0"/>
+          </a:p>
+        </p:txBody>
+      </p:sp>
+      <p:graphicFrame>
+        <p:nvGraphicFramePr>
+          <p:cNvPr id="4" name="Marcador de contenido 3"/>
+          <p:cNvGraphicFramePr>
+            <a:graphicFrameLocks noGrp="1"/>
+          </p:cNvGraphicFramePr>
+          <p:nvPr>
+            <p:ph idx="1"/>
+            <p:extLst>
+              <p:ext uri="{D42A27DB-BD31-4B8C-83A1-F6EECF244321}">
+                <p14:modId xmlns:p14="http://schemas.microsoft.com/office/powerpoint/2010/main" val="2671517573"/>
+              </p:ext>
+            </p:extLst>
+          </p:nvPr>
+        </p:nvGraphicFramePr>
+        <p:xfrm>
+          <a:off x="3083321" y="1094942"/>
+          <a:ext cx="5685723" cy="4351812"/>
+        </p:xfrm>
+        <a:graphic>
+          <a:graphicData uri="http://schemas.openxmlformats.org/drawingml/2006/table">
+            <a:tbl>
+              <a:tblPr firstRow="1" bandRow="1">
+                <a:tableStyleId>{5C22544A-7EE6-4342-B048-85BDC9FD1C3A}</a:tableStyleId>
+              </a:tblPr>
+              <a:tblGrid>
+                <a:gridCol w="3505200">
+                  <a:extLst>
+                    <a:ext uri="{9D8B030D-6E8A-4147-A177-3AD203B41FA5}">
+                      <a16:colId xmlns:a16="http://schemas.microsoft.com/office/drawing/2014/main" val="683261864"/>
+                    </a:ext>
+                  </a:extLst>
+                </a:gridCol>
+                <a:gridCol w="2180523">
+                  <a:extLst>
+                    <a:ext uri="{9D8B030D-6E8A-4147-A177-3AD203B41FA5}">
+                      <a16:colId xmlns:a16="http://schemas.microsoft.com/office/drawing/2014/main" val="2734139358"/>
+                    </a:ext>
+                  </a:extLst>
+                </a:gridCol>
+              </a:tblGrid>
+              <a:tr h="371453">
+                <a:tc>
+                  <a:txBody>
+                    <a:bodyPr/>
+                    <a:lstStyle/>
+                    <a:p>
+                      <a:r>
+                        <a:rPr lang="es-CO" dirty="0" smtClean="0"/>
+                        <a:t>Requerimiento</a:t>
+                      </a:r>
+                      <a:endParaRPr lang="es-419" dirty="0"/>
+                    </a:p>
+                  </a:txBody>
+                  <a:tcPr/>
+                </a:tc>
+                <a:tc>
+                  <a:txBody>
+                    <a:bodyPr/>
+                    <a:lstStyle/>
+                    <a:p>
+                      <a:r>
+                        <a:rPr lang="es-CO" dirty="0" smtClean="0"/>
+                        <a:t>Justificación</a:t>
+                      </a:r>
+                      <a:endParaRPr lang="es-419" dirty="0"/>
+                    </a:p>
+                  </a:txBody>
+                  <a:tcPr/>
+                </a:tc>
+                <a:extLst>
+                  <a:ext uri="{0D108BD9-81ED-4DB2-BD59-A6C34878D82A}">
+                    <a16:rowId xmlns:a16="http://schemas.microsoft.com/office/drawing/2014/main" val="2328073056"/>
+                  </a:ext>
+                </a:extLst>
+              </a:tr>
+              <a:tr h="650042">
+                <a:tc>
+                  <a:txBody>
+                    <a:bodyPr/>
+                    <a:lstStyle/>
+                    <a:p>
+                      <a:pPr marL="0" marR="0" indent="0" algn="l" defTabSz="914400" rtl="0" eaLnBrk="1" fontAlgn="auto" latinLnBrk="0" hangingPunct="1">
+                        <a:lnSpc>
+                          <a:spcPct val="100000"/>
+                        </a:lnSpc>
+                        <a:spcBef>
+                          <a:spcPts val="0"/>
+                        </a:spcBef>
+                        <a:spcAft>
+                          <a:spcPts val="0"/>
+                        </a:spcAft>
+                        <a:buClrTx/>
+                        <a:buSzTx/>
+                        <a:buFontTx/>
+                        <a:buNone/>
+                        <a:tabLst/>
+                        <a:defRPr/>
+                      </a:pPr>
+                      <a:r>
+                        <a:rPr lang="es-CO" sz="1200" dirty="0" smtClean="0">
+                          <a:effectLst/>
+                          <a:latin typeface="+mn-lt"/>
+                          <a:ea typeface="+mn-ea"/>
+                          <a:cs typeface="+mn-cs"/>
+                        </a:rPr>
+                        <a:t>La</a:t>
+                      </a:r>
+                      <a:r>
+                        <a:rPr lang="es-CO" sz="1200" baseline="0" dirty="0" smtClean="0">
+                          <a:effectLst/>
+                          <a:latin typeface="+mn-lt"/>
+                          <a:ea typeface="+mn-ea"/>
+                          <a:cs typeface="+mn-cs"/>
+                        </a:rPr>
+                        <a:t> base de datos debe contar con las tablas de: usuario, basura, </a:t>
+                      </a:r>
+                      <a:r>
+                        <a:rPr lang="es-CO" sz="1200" baseline="0" dirty="0" err="1" smtClean="0">
+                          <a:effectLst/>
+                          <a:latin typeface="+mn-lt"/>
+                          <a:ea typeface="+mn-ea"/>
+                          <a:cs typeface="+mn-cs"/>
+                        </a:rPr>
+                        <a:t>categoria</a:t>
+                      </a:r>
+                      <a:r>
+                        <a:rPr lang="es-CO" sz="1200" baseline="0" dirty="0" smtClean="0">
+                          <a:effectLst/>
+                          <a:latin typeface="+mn-lt"/>
+                          <a:ea typeface="+mn-ea"/>
+                          <a:cs typeface="+mn-cs"/>
+                        </a:rPr>
+                        <a:t>, </a:t>
+                      </a:r>
+                      <a:r>
+                        <a:rPr lang="es-CO" sz="1200" baseline="0" dirty="0" err="1" smtClean="0">
+                          <a:effectLst/>
+                          <a:latin typeface="+mn-lt"/>
+                          <a:ea typeface="+mn-ea"/>
+                          <a:cs typeface="+mn-cs"/>
+                        </a:rPr>
+                        <a:t>empresa,datos</a:t>
+                      </a:r>
+                      <a:r>
+                        <a:rPr lang="es-CO" sz="1200" baseline="0" dirty="0" smtClean="0">
+                          <a:effectLst/>
+                          <a:latin typeface="+mn-lt"/>
+                          <a:ea typeface="+mn-ea"/>
+                          <a:cs typeface="+mn-cs"/>
+                        </a:rPr>
+                        <a:t> de contacto, maquina e historial.</a:t>
+                      </a:r>
+                      <a:endParaRPr lang="en-US" sz="1200" dirty="0" smtClean="0">
+                        <a:effectLst/>
+                        <a:latin typeface="Times New Roman" panose="02020603050405020304" pitchFamily="18" charset="0"/>
+                        <a:ea typeface="Times New Roman" panose="02020603050405020304" pitchFamily="18" charset="0"/>
+                        <a:cs typeface="Times New Roman" panose="02020603050405020304" pitchFamily="18" charset="0"/>
+                      </a:endParaRPr>
+                    </a:p>
+                  </a:txBody>
+                  <a:tcPr/>
+                </a:tc>
+                <a:tc>
+                  <a:txBody>
+                    <a:bodyPr/>
+                    <a:lstStyle/>
+                    <a:p>
+                      <a:pPr algn="l"/>
+                      <a:r>
+                        <a:rPr lang="es-CO" sz="1200" dirty="0" smtClean="0"/>
+                        <a:t>Se creó</a:t>
+                      </a:r>
+                      <a:r>
+                        <a:rPr lang="es-CO" sz="1200" baseline="0" dirty="0" smtClean="0"/>
+                        <a:t> la base de datos y sus respectivas tablas en </a:t>
+                      </a:r>
+                      <a:r>
+                        <a:rPr lang="es-CO" sz="1200" baseline="0" dirty="0" err="1" smtClean="0"/>
+                        <a:t>MySQL</a:t>
+                      </a:r>
+                      <a:r>
+                        <a:rPr lang="es-CO" sz="1200" baseline="0" dirty="0" smtClean="0"/>
+                        <a:t>.</a:t>
+                      </a:r>
+                      <a:endParaRPr lang="es-419" sz="1200" dirty="0"/>
+                    </a:p>
+                  </a:txBody>
+                  <a:tcPr/>
+                </a:tc>
+                <a:extLst>
+                  <a:ext uri="{0D108BD9-81ED-4DB2-BD59-A6C34878D82A}">
+                    <a16:rowId xmlns:a16="http://schemas.microsoft.com/office/drawing/2014/main" val="4047556611"/>
+                  </a:ext>
+                </a:extLst>
+              </a:tr>
+              <a:tr h="493797">
+                <a:tc>
+                  <a:txBody>
+                    <a:bodyPr/>
+                    <a:lstStyle/>
+                    <a:p>
+                      <a:pPr marL="0" marR="0" indent="0" algn="l" defTabSz="914400" rtl="0" eaLnBrk="1" fontAlgn="auto" latinLnBrk="0" hangingPunct="1">
+                        <a:lnSpc>
+                          <a:spcPct val="100000"/>
+                        </a:lnSpc>
+                        <a:spcBef>
+                          <a:spcPts val="0"/>
+                        </a:spcBef>
+                        <a:spcAft>
+                          <a:spcPts val="0"/>
+                        </a:spcAft>
+                        <a:buClrTx/>
+                        <a:buSzTx/>
+                        <a:buFontTx/>
+                        <a:buNone/>
+                        <a:tabLst/>
+                        <a:defRPr/>
+                      </a:pPr>
+                      <a:r>
+                        <a:rPr lang="es-CO" sz="1200" dirty="0" smtClean="0">
+                          <a:effectLst/>
+                        </a:rPr>
+                        <a:t>La</a:t>
+                      </a:r>
+                      <a:r>
+                        <a:rPr lang="es-CO" sz="1200" baseline="0" dirty="0" smtClean="0">
+                          <a:effectLst/>
+                        </a:rPr>
+                        <a:t> base de datos debe contar con un CRUD para las tablas de basura, </a:t>
+                      </a:r>
+                      <a:r>
+                        <a:rPr lang="es-CO" sz="1200" baseline="0" dirty="0" err="1" smtClean="0">
+                          <a:effectLst/>
+                        </a:rPr>
+                        <a:t>categoría,datos</a:t>
+                      </a:r>
+                      <a:r>
+                        <a:rPr lang="es-CO" sz="1200" baseline="0" dirty="0" smtClean="0">
+                          <a:effectLst/>
+                        </a:rPr>
+                        <a:t> de </a:t>
+                      </a:r>
+                      <a:r>
+                        <a:rPr lang="es-CO" sz="1200" baseline="0" dirty="0" err="1" smtClean="0">
+                          <a:effectLst/>
+                        </a:rPr>
+                        <a:t>contacto,empresa</a:t>
+                      </a:r>
+                      <a:r>
+                        <a:rPr lang="es-CO" sz="1200" baseline="0" dirty="0" smtClean="0">
+                          <a:effectLst/>
+                        </a:rPr>
+                        <a:t>, maquina y usuario.</a:t>
+                      </a:r>
+                      <a:endParaRPr lang="en-US" sz="1200" dirty="0" smtClean="0">
+                        <a:effectLst/>
+                        <a:latin typeface="Times New Roman" panose="02020603050405020304" pitchFamily="18" charset="0"/>
+                        <a:ea typeface="Times New Roman" panose="02020603050405020304" pitchFamily="18" charset="0"/>
+                        <a:cs typeface="Times New Roman" panose="02020603050405020304" pitchFamily="18" charset="0"/>
+                      </a:endParaRPr>
+                    </a:p>
+                  </a:txBody>
+                  <a:tcPr/>
+                </a:tc>
+                <a:tc>
+                  <a:txBody>
+                    <a:bodyPr/>
+                    <a:lstStyle/>
+                    <a:p>
+                      <a:pPr algn="l"/>
+                      <a:r>
+                        <a:rPr lang="es-CO" sz="1200" dirty="0" smtClean="0"/>
+                        <a:t>Se crearon los procedimientos</a:t>
+                      </a:r>
+                      <a:r>
+                        <a:rPr lang="es-CO" sz="1200" baseline="0" dirty="0" smtClean="0"/>
+                        <a:t> de almacenados y se realizaron sus respectivas pruebas.</a:t>
+                      </a:r>
+                      <a:endParaRPr lang="es-419" sz="1200" dirty="0"/>
+                    </a:p>
+                  </a:txBody>
+                  <a:tcPr/>
+                </a:tc>
+                <a:extLst>
+                  <a:ext uri="{0D108BD9-81ED-4DB2-BD59-A6C34878D82A}">
+                    <a16:rowId xmlns:a16="http://schemas.microsoft.com/office/drawing/2014/main" val="1112101993"/>
+                  </a:ext>
+                </a:extLst>
+              </a:tr>
+              <a:tr h="835769">
+                <a:tc>
+                  <a:txBody>
+                    <a:bodyPr/>
+                    <a:lstStyle/>
+                    <a:p>
+                      <a:pPr marL="0" marR="0" indent="0" algn="l" defTabSz="914400" rtl="0" eaLnBrk="1" fontAlgn="auto" latinLnBrk="0" hangingPunct="1">
+                        <a:lnSpc>
+                          <a:spcPct val="100000"/>
+                        </a:lnSpc>
+                        <a:spcBef>
+                          <a:spcPts val="0"/>
+                        </a:spcBef>
+                        <a:spcAft>
+                          <a:spcPts val="0"/>
+                        </a:spcAft>
+                        <a:buClrTx/>
+                        <a:buSzTx/>
+                        <a:buFontTx/>
+                        <a:buNone/>
+                        <a:tabLst/>
+                        <a:defRPr/>
+                      </a:pPr>
+                      <a:r>
+                        <a:rPr lang="es-CO" sz="1200" dirty="0" smtClean="0">
+                          <a:effectLst/>
+                        </a:rPr>
+                        <a:t>La</a:t>
+                      </a:r>
+                      <a:r>
+                        <a:rPr lang="es-CO" sz="1200" baseline="0" dirty="0" smtClean="0">
+                          <a:effectLst/>
+                        </a:rPr>
+                        <a:t> base de datos debe contar con un procedimiento de almacenado para guardar los historiales de las basuras</a:t>
+                      </a:r>
+                      <a:r>
+                        <a:rPr lang="en-US" sz="1200" baseline="0" dirty="0" smtClean="0">
+                          <a:effectLst/>
+                          <a:latin typeface="Times New Roman" panose="02020603050405020304" pitchFamily="18" charset="0"/>
+                          <a:cs typeface="Times New Roman" panose="02020603050405020304" pitchFamily="18" charset="0"/>
+                        </a:rPr>
+                        <a:t>.</a:t>
+                      </a:r>
+                      <a:endParaRPr lang="en-US" sz="1200" dirty="0" smtClean="0">
+                        <a:effectLst/>
+                        <a:latin typeface="Times New Roman" panose="02020603050405020304" pitchFamily="18" charset="0"/>
+                        <a:ea typeface="Times New Roman" panose="02020603050405020304" pitchFamily="18" charset="0"/>
+                        <a:cs typeface="Times New Roman" panose="02020603050405020304" pitchFamily="18" charset="0"/>
+                      </a:endParaRPr>
+                    </a:p>
+                  </a:txBody>
+                  <a:tcPr/>
+                </a:tc>
+                <a:tc>
+                  <a:txBody>
+                    <a:bodyPr/>
+                    <a:lstStyle/>
+                    <a:p>
+                      <a:pPr algn="l"/>
+                      <a:r>
+                        <a:rPr lang="es-CO" sz="1200" dirty="0" smtClean="0"/>
+                        <a:t>Se creó el procedimiento de almacenado y se realizaron varias pruebas para revisar su correcta funcionalidad.</a:t>
+                      </a:r>
+                      <a:endParaRPr lang="es-419" sz="1200" dirty="0"/>
+                    </a:p>
+                  </a:txBody>
+                  <a:tcPr/>
+                </a:tc>
+                <a:extLst>
+                  <a:ext uri="{0D108BD9-81ED-4DB2-BD59-A6C34878D82A}">
+                    <a16:rowId xmlns:a16="http://schemas.microsoft.com/office/drawing/2014/main" val="3969023699"/>
+                  </a:ext>
+                </a:extLst>
+              </a:tr>
+              <a:tr h="574308">
+                <a:tc>
+                  <a:txBody>
+                    <a:bodyPr/>
+                    <a:lstStyle/>
+                    <a:p>
+                      <a:pPr marL="0" marR="0" indent="0" algn="l" defTabSz="914400" rtl="0" eaLnBrk="1" fontAlgn="auto" latinLnBrk="0" hangingPunct="1">
+                        <a:lnSpc>
+                          <a:spcPct val="100000"/>
+                        </a:lnSpc>
+                        <a:spcBef>
+                          <a:spcPts val="0"/>
+                        </a:spcBef>
+                        <a:spcAft>
+                          <a:spcPts val="0"/>
+                        </a:spcAft>
+                        <a:buClrTx/>
+                        <a:buSzTx/>
+                        <a:buFontTx/>
+                        <a:buNone/>
+                        <a:tabLst/>
+                        <a:defRPr/>
+                      </a:pPr>
+                      <a:r>
+                        <a:rPr lang="es-CO" sz="1200" dirty="0" smtClean="0">
+                          <a:effectLst/>
+                        </a:rPr>
+                        <a:t>La</a:t>
+                      </a:r>
+                      <a:r>
+                        <a:rPr lang="es-CO" sz="1200" baseline="0" dirty="0" smtClean="0">
+                          <a:effectLst/>
+                        </a:rPr>
+                        <a:t> página web deberá contar con un inicio de sesión para los administradores y los empleados.</a:t>
+                      </a:r>
+                      <a:endParaRPr lang="en-US" sz="1200" dirty="0" smtClean="0">
+                        <a:effectLst/>
+                        <a:latin typeface="Times New Roman" panose="02020603050405020304" pitchFamily="18" charset="0"/>
+                        <a:ea typeface="Times New Roman" panose="02020603050405020304" pitchFamily="18" charset="0"/>
+                        <a:cs typeface="Times New Roman" panose="02020603050405020304" pitchFamily="18" charset="0"/>
+                      </a:endParaRPr>
+                    </a:p>
+                  </a:txBody>
+                  <a:tcPr/>
+                </a:tc>
+                <a:tc>
+                  <a:txBody>
+                    <a:bodyPr/>
+                    <a:lstStyle/>
+                    <a:p>
+                      <a:pPr algn="l"/>
+                      <a:r>
+                        <a:rPr lang="es-CO" sz="1200" dirty="0" smtClean="0"/>
+                        <a:t>Aún no se ha creado el</a:t>
+                      </a:r>
+                      <a:r>
+                        <a:rPr lang="es-CO" sz="1200" baseline="0" dirty="0" smtClean="0"/>
+                        <a:t> back-</a:t>
+                      </a:r>
+                      <a:r>
+                        <a:rPr lang="es-CO" sz="1200" baseline="0" dirty="0" err="1" smtClean="0"/>
+                        <a:t>end</a:t>
+                      </a:r>
+                      <a:r>
+                        <a:rPr lang="es-CO" sz="1200" dirty="0" smtClean="0"/>
+                        <a:t> de</a:t>
+                      </a:r>
+                      <a:r>
+                        <a:rPr lang="es-CO" sz="1200" baseline="0" dirty="0" smtClean="0"/>
+                        <a:t> la página web.</a:t>
+                      </a:r>
+                      <a:endParaRPr lang="es-419" sz="1200" dirty="0"/>
+                    </a:p>
+                  </a:txBody>
+                  <a:tcPr/>
+                </a:tc>
+                <a:extLst>
+                  <a:ext uri="{0D108BD9-81ED-4DB2-BD59-A6C34878D82A}">
+                    <a16:rowId xmlns:a16="http://schemas.microsoft.com/office/drawing/2014/main" val="1412900898"/>
+                  </a:ext>
+                </a:extLst>
+              </a:tr>
+              <a:tr h="517483">
+                <a:tc>
+                  <a:txBody>
+                    <a:bodyPr/>
+                    <a:lstStyle/>
+                    <a:p>
+                      <a:pPr marL="0" marR="0" indent="0" algn="l" defTabSz="914400" rtl="0" eaLnBrk="1" fontAlgn="auto" latinLnBrk="0" hangingPunct="1">
+                        <a:lnSpc>
+                          <a:spcPct val="100000"/>
+                        </a:lnSpc>
+                        <a:spcBef>
+                          <a:spcPts val="0"/>
+                        </a:spcBef>
+                        <a:spcAft>
+                          <a:spcPts val="0"/>
+                        </a:spcAft>
+                        <a:buClrTx/>
+                        <a:buSzTx/>
+                        <a:buFontTx/>
+                        <a:buNone/>
+                        <a:tabLst/>
+                        <a:defRPr/>
+                      </a:pPr>
+                      <a:r>
+                        <a:rPr lang="en-US" sz="1200" b="0" dirty="0" smtClean="0">
+                          <a:effectLst/>
+                          <a:latin typeface="+mn-lt"/>
+                          <a:ea typeface="Times New Roman" panose="02020603050405020304" pitchFamily="18" charset="0"/>
+                          <a:cs typeface="Segoe UI Semibold" panose="020B0702040204020203" pitchFamily="34" charset="0"/>
+                        </a:rPr>
+                        <a:t>La </a:t>
+                      </a:r>
+                      <a:r>
+                        <a:rPr lang="en-US" sz="1200" b="0" dirty="0" err="1" smtClean="0">
+                          <a:effectLst/>
+                          <a:latin typeface="+mn-lt"/>
+                          <a:ea typeface="Times New Roman" panose="02020603050405020304" pitchFamily="18" charset="0"/>
+                          <a:cs typeface="Segoe UI Semibold" panose="020B0702040204020203" pitchFamily="34" charset="0"/>
+                        </a:rPr>
+                        <a:t>página</a:t>
+                      </a:r>
+                      <a:r>
+                        <a:rPr lang="en-US" sz="1200" b="0" baseline="0" dirty="0" smtClean="0">
+                          <a:effectLst/>
+                          <a:latin typeface="+mn-lt"/>
+                          <a:ea typeface="Times New Roman" panose="02020603050405020304" pitchFamily="18" charset="0"/>
+                          <a:cs typeface="Segoe UI Semibold" panose="020B0702040204020203" pitchFamily="34" charset="0"/>
+                        </a:rPr>
+                        <a:t> </a:t>
+                      </a:r>
+                      <a:r>
+                        <a:rPr lang="es-CO" sz="1200" b="0" baseline="0" noProof="0" dirty="0" smtClean="0">
+                          <a:effectLst/>
+                          <a:latin typeface="+mn-lt"/>
+                          <a:ea typeface="Times New Roman" panose="02020603050405020304" pitchFamily="18" charset="0"/>
+                          <a:cs typeface="Segoe UI Semibold" panose="020B0702040204020203" pitchFamily="34" charset="0"/>
+                        </a:rPr>
+                        <a:t>web</a:t>
+                      </a:r>
+                      <a:r>
+                        <a:rPr lang="en-US" sz="1200" b="0" baseline="0" dirty="0" smtClean="0">
+                          <a:effectLst/>
+                          <a:latin typeface="+mn-lt"/>
+                          <a:ea typeface="Times New Roman" panose="02020603050405020304" pitchFamily="18" charset="0"/>
+                          <a:cs typeface="Segoe UI Semibold" panose="020B0702040204020203" pitchFamily="34" charset="0"/>
+                        </a:rPr>
+                        <a:t> </a:t>
+                      </a:r>
+                      <a:r>
+                        <a:rPr lang="es-419" sz="1200" b="0" baseline="0" noProof="0" dirty="0" smtClean="0">
+                          <a:effectLst/>
+                          <a:latin typeface="+mn-lt"/>
+                          <a:ea typeface="Times New Roman" panose="02020603050405020304" pitchFamily="18" charset="0"/>
+                          <a:cs typeface="Segoe UI Semibold" panose="020B0702040204020203" pitchFamily="34" charset="0"/>
+                        </a:rPr>
+                        <a:t>deberá</a:t>
+                      </a:r>
+                      <a:r>
+                        <a:rPr lang="en-US" sz="1200" b="0" baseline="0" noProof="0" dirty="0" smtClean="0">
+                          <a:effectLst/>
+                          <a:latin typeface="+mn-lt"/>
+                          <a:ea typeface="Times New Roman" panose="02020603050405020304" pitchFamily="18" charset="0"/>
+                          <a:cs typeface="Segoe UI Semibold" panose="020B0702040204020203" pitchFamily="34" charset="0"/>
+                        </a:rPr>
+                        <a:t>, </a:t>
+                      </a:r>
+                      <a:r>
+                        <a:rPr lang="en-US" sz="1200" b="0" baseline="0" noProof="0" dirty="0" err="1" smtClean="0">
+                          <a:effectLst/>
+                          <a:latin typeface="+mn-lt"/>
+                          <a:ea typeface="Times New Roman" panose="02020603050405020304" pitchFamily="18" charset="0"/>
+                          <a:cs typeface="Segoe UI Semibold" panose="020B0702040204020203" pitchFamily="34" charset="0"/>
+                        </a:rPr>
+                        <a:t>según</a:t>
+                      </a:r>
+                      <a:r>
+                        <a:rPr lang="en-US" sz="1200" b="0" baseline="0" noProof="0" dirty="0" smtClean="0">
+                          <a:effectLst/>
+                          <a:latin typeface="+mn-lt"/>
+                          <a:ea typeface="Times New Roman" panose="02020603050405020304" pitchFamily="18" charset="0"/>
+                          <a:cs typeface="Segoe UI Semibold" panose="020B0702040204020203" pitchFamily="34" charset="0"/>
+                        </a:rPr>
+                        <a:t> </a:t>
+                      </a:r>
+                      <a:r>
+                        <a:rPr lang="en-US" sz="1200" b="0" baseline="0" noProof="0" dirty="0" err="1" smtClean="0">
+                          <a:effectLst/>
+                          <a:latin typeface="+mn-lt"/>
+                          <a:ea typeface="Times New Roman" panose="02020603050405020304" pitchFamily="18" charset="0"/>
+                          <a:cs typeface="Segoe UI Semibold" panose="020B0702040204020203" pitchFamily="34" charset="0"/>
+                        </a:rPr>
+                        <a:t>quién</a:t>
+                      </a:r>
+                      <a:r>
+                        <a:rPr lang="en-US" sz="1200" b="0" baseline="0" noProof="0" dirty="0" smtClean="0">
+                          <a:effectLst/>
+                          <a:latin typeface="+mn-lt"/>
+                          <a:ea typeface="Times New Roman" panose="02020603050405020304" pitchFamily="18" charset="0"/>
+                          <a:cs typeface="Segoe UI Semibold" panose="020B0702040204020203" pitchFamily="34" charset="0"/>
+                        </a:rPr>
+                        <a:t> </a:t>
+                      </a:r>
+                      <a:r>
+                        <a:rPr lang="en-US" sz="1200" b="0" baseline="0" noProof="0" dirty="0" err="1" smtClean="0">
+                          <a:effectLst/>
+                          <a:latin typeface="+mn-lt"/>
+                          <a:ea typeface="Times New Roman" panose="02020603050405020304" pitchFamily="18" charset="0"/>
+                          <a:cs typeface="Segoe UI Semibold" panose="020B0702040204020203" pitchFamily="34" charset="0"/>
+                        </a:rPr>
+                        <a:t>inicie</a:t>
+                      </a:r>
+                      <a:r>
+                        <a:rPr lang="en-US" sz="1200" b="0" baseline="0" noProof="0" dirty="0" smtClean="0">
+                          <a:effectLst/>
+                          <a:latin typeface="+mn-lt"/>
+                          <a:ea typeface="Times New Roman" panose="02020603050405020304" pitchFamily="18" charset="0"/>
+                          <a:cs typeface="Segoe UI Semibold" panose="020B0702040204020203" pitchFamily="34" charset="0"/>
+                        </a:rPr>
+                        <a:t> </a:t>
+                      </a:r>
+                      <a:r>
+                        <a:rPr lang="en-US" sz="1200" b="0" baseline="0" noProof="0" dirty="0" err="1" smtClean="0">
+                          <a:effectLst/>
+                          <a:latin typeface="+mn-lt"/>
+                          <a:ea typeface="Times New Roman" panose="02020603050405020304" pitchFamily="18" charset="0"/>
+                          <a:cs typeface="Segoe UI Semibold" panose="020B0702040204020203" pitchFamily="34" charset="0"/>
+                        </a:rPr>
+                        <a:t>sesión</a:t>
+                      </a:r>
+                      <a:r>
+                        <a:rPr lang="en-US" sz="1200" b="0" baseline="0" noProof="0" dirty="0" smtClean="0">
+                          <a:effectLst/>
+                          <a:latin typeface="+mn-lt"/>
+                          <a:ea typeface="Times New Roman" panose="02020603050405020304" pitchFamily="18" charset="0"/>
+                          <a:cs typeface="Segoe UI Semibold" panose="020B0702040204020203" pitchFamily="34" charset="0"/>
+                        </a:rPr>
+                        <a:t>, </a:t>
+                      </a:r>
+                      <a:r>
+                        <a:rPr lang="en-US" sz="1200" b="0" baseline="0" noProof="0" dirty="0" err="1" smtClean="0">
+                          <a:effectLst/>
+                          <a:latin typeface="+mn-lt"/>
+                          <a:ea typeface="Times New Roman" panose="02020603050405020304" pitchFamily="18" charset="0"/>
+                          <a:cs typeface="Segoe UI Semibold" panose="020B0702040204020203" pitchFamily="34" charset="0"/>
+                        </a:rPr>
+                        <a:t>habilitar</a:t>
+                      </a:r>
+                      <a:r>
+                        <a:rPr lang="en-US" sz="1200" b="0" baseline="0" noProof="0" dirty="0" smtClean="0">
+                          <a:effectLst/>
+                          <a:latin typeface="+mn-lt"/>
+                          <a:ea typeface="Times New Roman" panose="02020603050405020304" pitchFamily="18" charset="0"/>
+                          <a:cs typeface="Segoe UI Semibold" panose="020B0702040204020203" pitchFamily="34" charset="0"/>
+                        </a:rPr>
+                        <a:t> y </a:t>
+                      </a:r>
+                      <a:r>
+                        <a:rPr lang="en-US" sz="1200" b="0" baseline="0" noProof="0" dirty="0" err="1" smtClean="0">
+                          <a:effectLst/>
+                          <a:latin typeface="+mn-lt"/>
+                          <a:ea typeface="Times New Roman" panose="02020603050405020304" pitchFamily="18" charset="0"/>
+                          <a:cs typeface="Segoe UI Semibold" panose="020B0702040204020203" pitchFamily="34" charset="0"/>
+                        </a:rPr>
+                        <a:t>deshabilitar</a:t>
+                      </a:r>
+                      <a:r>
+                        <a:rPr lang="en-US" sz="1200" b="0" baseline="0" noProof="0" dirty="0" smtClean="0">
+                          <a:effectLst/>
+                          <a:latin typeface="+mn-lt"/>
+                          <a:ea typeface="Times New Roman" panose="02020603050405020304" pitchFamily="18" charset="0"/>
+                          <a:cs typeface="Segoe UI Semibold" panose="020B0702040204020203" pitchFamily="34" charset="0"/>
+                        </a:rPr>
+                        <a:t> </a:t>
+                      </a:r>
+                      <a:r>
+                        <a:rPr lang="en-US" sz="1200" b="0" baseline="0" noProof="0" dirty="0" err="1" smtClean="0">
+                          <a:effectLst/>
+                          <a:latin typeface="+mn-lt"/>
+                          <a:ea typeface="Times New Roman" panose="02020603050405020304" pitchFamily="18" charset="0"/>
+                          <a:cs typeface="Segoe UI Semibold" panose="020B0702040204020203" pitchFamily="34" charset="0"/>
+                        </a:rPr>
+                        <a:t>ciertas</a:t>
+                      </a:r>
+                      <a:r>
+                        <a:rPr lang="en-US" sz="1200" b="0" baseline="0" noProof="0" dirty="0" smtClean="0">
+                          <a:effectLst/>
+                          <a:latin typeface="+mn-lt"/>
+                          <a:ea typeface="Times New Roman" panose="02020603050405020304" pitchFamily="18" charset="0"/>
+                          <a:cs typeface="Segoe UI Semibold" panose="020B0702040204020203" pitchFamily="34" charset="0"/>
+                        </a:rPr>
+                        <a:t> </a:t>
+                      </a:r>
+                      <a:r>
+                        <a:rPr lang="es-CO" sz="1200" b="0" baseline="0" noProof="0" dirty="0" smtClean="0">
+                          <a:effectLst/>
+                          <a:latin typeface="+mn-lt"/>
+                          <a:ea typeface="Times New Roman" panose="02020603050405020304" pitchFamily="18" charset="0"/>
+                          <a:cs typeface="Segoe UI Semibold" panose="020B0702040204020203" pitchFamily="34" charset="0"/>
+                        </a:rPr>
+                        <a:t>opciones</a:t>
+                      </a:r>
+                      <a:r>
+                        <a:rPr lang="en-US" sz="1200" b="0" baseline="0" noProof="0" dirty="0" smtClean="0">
+                          <a:effectLst/>
+                          <a:latin typeface="+mn-lt"/>
+                          <a:ea typeface="Times New Roman" panose="02020603050405020304" pitchFamily="18" charset="0"/>
+                          <a:cs typeface="Segoe UI Semibold" panose="020B0702040204020203" pitchFamily="34" charset="0"/>
+                        </a:rPr>
+                        <a:t>.</a:t>
+                      </a:r>
+                      <a:endParaRPr lang="en-US" sz="1200" b="0" dirty="0" smtClean="0">
+                        <a:effectLst/>
+                        <a:latin typeface="+mn-lt"/>
+                        <a:ea typeface="Times New Roman" panose="02020603050405020304" pitchFamily="18" charset="0"/>
+                        <a:cs typeface="Segoe UI Semibold" panose="020B0702040204020203" pitchFamily="34" charset="0"/>
+                      </a:endParaRPr>
+                    </a:p>
+                  </a:txBody>
+                  <a:tcPr/>
+                </a:tc>
+                <a:tc>
+                  <a:txBody>
+                    <a:bodyPr/>
+                    <a:lstStyle/>
+                    <a:p>
+                      <a:pPr marL="0" marR="0" indent="0" algn="l" defTabSz="914400" rtl="0" eaLnBrk="1" fontAlgn="auto" latinLnBrk="0" hangingPunct="1">
+                        <a:lnSpc>
+                          <a:spcPct val="100000"/>
+                        </a:lnSpc>
+                        <a:spcBef>
+                          <a:spcPts val="0"/>
+                        </a:spcBef>
+                        <a:spcAft>
+                          <a:spcPts val="0"/>
+                        </a:spcAft>
+                        <a:buClrTx/>
+                        <a:buSzTx/>
+                        <a:buFontTx/>
+                        <a:buNone/>
+                        <a:tabLst/>
+                        <a:defRPr/>
+                      </a:pPr>
+                      <a:r>
+                        <a:rPr lang="es-CO" sz="1200" dirty="0" smtClean="0"/>
+                        <a:t>Aún no se ha creado el</a:t>
+                      </a:r>
+                      <a:r>
+                        <a:rPr lang="es-CO" sz="1200" baseline="0" dirty="0" smtClean="0"/>
+                        <a:t> back-</a:t>
+                      </a:r>
+                      <a:r>
+                        <a:rPr lang="es-CO" sz="1200" baseline="0" dirty="0" err="1" smtClean="0"/>
+                        <a:t>end</a:t>
+                      </a:r>
+                      <a:r>
+                        <a:rPr lang="es-CO" sz="1200" dirty="0" smtClean="0"/>
+                        <a:t> de</a:t>
+                      </a:r>
+                      <a:r>
+                        <a:rPr lang="es-CO" sz="1200" baseline="0" dirty="0" smtClean="0"/>
+                        <a:t> la página web.</a:t>
+                      </a:r>
+                      <a:endParaRPr lang="es-419" sz="1200" dirty="0" smtClean="0"/>
+                    </a:p>
+                    <a:p>
+                      <a:pPr algn="l"/>
+                      <a:endParaRPr lang="es-419" sz="1200" dirty="0"/>
+                    </a:p>
+                  </a:txBody>
+                  <a:tcPr/>
+                </a:tc>
+                <a:extLst>
+                  <a:ext uri="{0D108BD9-81ED-4DB2-BD59-A6C34878D82A}">
+                    <a16:rowId xmlns:a16="http://schemas.microsoft.com/office/drawing/2014/main" val="3612729649"/>
+                  </a:ext>
+                </a:extLst>
+              </a:tr>
+              <a:tr h="494051">
+                <a:tc>
+                  <a:txBody>
+                    <a:bodyPr/>
+                    <a:lstStyle/>
+                    <a:p>
+                      <a:pPr marL="0" marR="0" indent="0" algn="l" defTabSz="914400" rtl="0" eaLnBrk="1" fontAlgn="auto" latinLnBrk="0" hangingPunct="1">
+                        <a:lnSpc>
+                          <a:spcPct val="100000"/>
+                        </a:lnSpc>
+                        <a:spcBef>
+                          <a:spcPts val="0"/>
+                        </a:spcBef>
+                        <a:spcAft>
+                          <a:spcPts val="0"/>
+                        </a:spcAft>
+                        <a:buClrTx/>
+                        <a:buSzTx/>
+                        <a:buFontTx/>
+                        <a:buNone/>
+                        <a:tabLst/>
+                        <a:defRPr/>
+                      </a:pPr>
+                      <a:r>
+                        <a:rPr lang="es-CO" sz="1200" dirty="0" smtClean="0">
+                          <a:effectLst/>
+                        </a:rPr>
+                        <a:t> La</a:t>
+                      </a:r>
+                      <a:r>
+                        <a:rPr lang="es-CO" sz="1200" baseline="0" dirty="0" smtClean="0">
+                          <a:effectLst/>
+                        </a:rPr>
+                        <a:t> página web deberá mostrar reportes de las basuras ingresadas.</a:t>
+                      </a:r>
+                      <a:endParaRPr lang="en-US" sz="1200" dirty="0" smtClean="0">
+                        <a:effectLst/>
+                        <a:latin typeface="Times New Roman" panose="02020603050405020304" pitchFamily="18" charset="0"/>
+                        <a:ea typeface="Times New Roman" panose="02020603050405020304" pitchFamily="18" charset="0"/>
+                        <a:cs typeface="Times New Roman" panose="02020603050405020304" pitchFamily="18" charset="0"/>
+                      </a:endParaRPr>
+                    </a:p>
+                    <a:p>
+                      <a:pPr marL="0" marR="0" indent="0" algn="l" defTabSz="914400" rtl="0" eaLnBrk="1" fontAlgn="auto" latinLnBrk="0" hangingPunct="1">
+                        <a:lnSpc>
+                          <a:spcPct val="100000"/>
+                        </a:lnSpc>
+                        <a:spcBef>
+                          <a:spcPts val="0"/>
+                        </a:spcBef>
+                        <a:spcAft>
+                          <a:spcPts val="0"/>
+                        </a:spcAft>
+                        <a:buClrTx/>
+                        <a:buSzTx/>
+                        <a:buFontTx/>
+                        <a:buNone/>
+                        <a:tabLst/>
+                        <a:defRPr/>
+                      </a:pPr>
+                      <a:endParaRPr lang="en-US" sz="1200" dirty="0" smtClean="0">
+                        <a:effectLst/>
+                        <a:latin typeface="Times New Roman" panose="02020603050405020304" pitchFamily="18" charset="0"/>
+                        <a:ea typeface="Times New Roman" panose="02020603050405020304" pitchFamily="18" charset="0"/>
+                        <a:cs typeface="Times New Roman" panose="02020603050405020304" pitchFamily="18" charset="0"/>
+                      </a:endParaRPr>
+                    </a:p>
+                  </a:txBody>
+                  <a:tcPr/>
+                </a:tc>
+                <a:tc>
+                  <a:txBody>
+                    <a:bodyPr/>
+                    <a:lstStyle/>
+                    <a:p>
+                      <a:pPr marL="0" marR="0" indent="0" algn="l" defTabSz="914400" rtl="0" eaLnBrk="1" fontAlgn="auto" latinLnBrk="0" hangingPunct="1">
+                        <a:lnSpc>
+                          <a:spcPct val="100000"/>
+                        </a:lnSpc>
+                        <a:spcBef>
+                          <a:spcPts val="0"/>
+                        </a:spcBef>
+                        <a:spcAft>
+                          <a:spcPts val="0"/>
+                        </a:spcAft>
+                        <a:buClrTx/>
+                        <a:buSzTx/>
+                        <a:buFontTx/>
+                        <a:buNone/>
+                        <a:tabLst/>
+                        <a:defRPr/>
+                      </a:pPr>
+                      <a:r>
+                        <a:rPr lang="es-CO" sz="1200" dirty="0" smtClean="0"/>
+                        <a:t>Aún no se ha creado el</a:t>
+                      </a:r>
+                      <a:r>
+                        <a:rPr lang="es-CO" sz="1200" baseline="0" dirty="0" smtClean="0"/>
+                        <a:t> back-</a:t>
+                      </a:r>
+                      <a:r>
+                        <a:rPr lang="es-CO" sz="1200" baseline="0" dirty="0" err="1" smtClean="0"/>
+                        <a:t>end</a:t>
+                      </a:r>
+                      <a:r>
+                        <a:rPr lang="es-CO" sz="1200" dirty="0" smtClean="0"/>
+                        <a:t> de</a:t>
+                      </a:r>
+                      <a:r>
+                        <a:rPr lang="es-CO" sz="1200" baseline="0" dirty="0" smtClean="0"/>
+                        <a:t> la página web.</a:t>
+                      </a:r>
+                      <a:endParaRPr lang="es-419" sz="1200" smtClean="0"/>
+                    </a:p>
+                    <a:p>
+                      <a:pPr algn="l"/>
+                      <a:endParaRPr lang="es-419" sz="1200" dirty="0"/>
+                    </a:p>
+                  </a:txBody>
+                  <a:tcPr/>
+                </a:tc>
+                <a:extLst>
+                  <a:ext uri="{0D108BD9-81ED-4DB2-BD59-A6C34878D82A}">
+                    <a16:rowId xmlns:a16="http://schemas.microsoft.com/office/drawing/2014/main" val="1688823906"/>
+                  </a:ext>
+                </a:extLst>
+              </a:tr>
+            </a:tbl>
+          </a:graphicData>
+        </a:graphic>
+      </p:graphicFrame>
+    </p:spTree>
+    <p:extLst>
+      <p:ext uri="{BB962C8B-B14F-4D97-AF65-F5344CB8AC3E}">
+        <p14:creationId xmlns:p14="http://schemas.microsoft.com/office/powerpoint/2010/main" val="109050347"/>
+      </p:ext>
+    </p:extLst>
+  </p:cSld>
+  <p:clrMapOvr>
+    <a:masterClrMapping/>
+  </p:clrMapOvr>
+  <p:timing>
+    <p:tnLst>
+      <p:par>
+        <p:cTn id="1" dur="indefinite" restart="never" nodeType="tmRoot"/>
+      </p:par>
+    </p:tnLst>
+  </p:timing>
+</p:sld>
+</file>
+
+<file path=ppt/slides/slide14.xml><?xml version="1.0" encoding="utf-8"?>
+<p:sld xmlns:a="http://schemas.openxmlformats.org/drawingml/2006/main" xmlns:r="http://schemas.openxmlformats.org/officeDocument/2006/relationships" xmlns:p="http://schemas.openxmlformats.org/presentationml/2006/main">
+  <p:cSld>
+    <p:spTree>
+      <p:nvGrpSpPr>
+        <p:cNvPr id="1" name=""/>
+        <p:cNvGrpSpPr/>
+        <p:nvPr/>
+      </p:nvGrpSpPr>
+      <p:grpSpPr>
+        <a:xfrm>
+          <a:off x="0" y="0"/>
+          <a:ext cx="0" cy="0"/>
+          <a:chOff x="0" y="0"/>
+          <a:chExt cx="0" cy="0"/>
+        </a:xfrm>
+      </p:grpSpPr>
+      <p:pic>
+        <p:nvPicPr>
           <p:cNvPr id="4" name="Imagen 3"/>
           <p:cNvPicPr>
             <a:picLocks noChangeAspect="1"/>
@@ -3295,7 +6940,7 @@
 </p:sld>
 </file>
 
-<file path=ppt/slides/slide11.xml><?xml version="1.0" encoding="utf-8"?>
+<file path=ppt/slides/slide15.xml><?xml version="1.0" encoding="utf-8"?>
 <p:sld xmlns:a="http://schemas.openxmlformats.org/drawingml/2006/main" xmlns:r="http://schemas.openxmlformats.org/officeDocument/2006/relationships" xmlns:p="http://schemas.openxmlformats.org/presentationml/2006/main">
   <p:cSld>
     <p:spTree>
@@ -3392,7 +7037,7 @@
 </p:sld>
 </file>
 
-<file path=ppt/slides/slide12.xml><?xml version="1.0" encoding="utf-8"?>
+<file path=ppt/slides/slide16.xml><?xml version="1.0" encoding="utf-8"?>
 <p:sld xmlns:a="http://schemas.openxmlformats.org/drawingml/2006/main" xmlns:r="http://schemas.openxmlformats.org/officeDocument/2006/relationships" xmlns:p="http://schemas.openxmlformats.org/presentationml/2006/main">
   <p:cSld>
     <p:spTree>
@@ -4517,7 +8162,7 @@
             <p:ph idx="1"/>
             <p:extLst>
               <p:ext uri="{D42A27DB-BD31-4B8C-83A1-F6EECF244321}">
-                <p14:modId xmlns:p14="http://schemas.microsoft.com/office/powerpoint/2010/main" val="785915162"/>
+                <p14:modId xmlns:p14="http://schemas.microsoft.com/office/powerpoint/2010/main" val="2211575926"/>
               </p:ext>
             </p:extLst>
           </p:nvPr>
@@ -4666,12 +8311,24 @@
                         </a:spcAft>
                       </a:pPr>
                       <a:r>
-                        <a:rPr lang="es-CO" sz="1300">
-                          <a:effectLst/>
-                        </a:rPr>
-                        <a:t> Esta cámara instalada en la caja deberá tomar la foto del material para ser posteriormente analizada para su respectivo reciclaje.</a:t>
-                      </a:r>
-                      <a:endParaRPr lang="en-US" sz="1300">
+                        <a:rPr lang="es-CO" sz="1300" dirty="0">
+                          <a:effectLst/>
+                        </a:rPr>
+                        <a:t> </a:t>
+                      </a:r>
+                      <a:r>
+                        <a:rPr lang="es-CO" sz="1300" dirty="0" smtClean="0">
+                          <a:effectLst/>
+                        </a:rPr>
+                        <a:t>La </a:t>
+                      </a:r>
+                      <a:r>
+                        <a:rPr lang="es-CO" sz="1300" dirty="0">
+                          <a:effectLst/>
+                        </a:rPr>
+                        <a:t>cámara instalada en la caja deberá tomar la foto del material para ser posteriormente analizada para su respectivo reciclaje.</a:t>
+                      </a:r>
+                      <a:endParaRPr lang="en-US" sz="1300" dirty="0">
                         <a:effectLst/>
                         <a:latin typeface="Times New Roman" panose="02020603050405020304" pitchFamily="18" charset="0"/>
                         <a:ea typeface="Times New Roman" panose="02020603050405020304" pitchFamily="18" charset="0"/>
@@ -5823,7 +9480,7 @@
             <p:ph idx="1"/>
             <p:extLst>
               <p:ext uri="{D42A27DB-BD31-4B8C-83A1-F6EECF244321}">
-                <p14:modId xmlns:p14="http://schemas.microsoft.com/office/powerpoint/2010/main" val="1918928838"/>
+                <p14:modId xmlns:p14="http://schemas.microsoft.com/office/powerpoint/2010/main" val="1338147575"/>
               </p:ext>
             </p:extLst>
           </p:nvPr>
@@ -6002,16 +9659,16 @@
                           <a:ea typeface="+mn-ea"/>
                           <a:cs typeface="+mn-cs"/>
                         </a:rPr>
-                        <a:t> base de datos debe contar con las tablas de: Usuario, Basura, </a:t>
-                      </a:r>
-                      <a:r>
-                        <a:rPr lang="es-CO" sz="1300" baseline="0" dirty="0" err="1" smtClean="0">
+                        <a:t> base de datos debe contar con las tablas de: </a:t>
+                      </a:r>
+                      <a:r>
+                        <a:rPr lang="es-CO" sz="1300" baseline="0" dirty="0" smtClean="0">
                           <a:effectLst/>
                           <a:latin typeface="+mn-lt"/>
                           <a:ea typeface="+mn-ea"/>
                           <a:cs typeface="+mn-cs"/>
                         </a:rPr>
-                        <a:t>Categoria</a:t>
+                        <a:t>usuario</a:t>
                       </a:r>
                       <a:r>
                         <a:rPr lang="es-CO" sz="1300" baseline="0" dirty="0" smtClean="0">
@@ -6020,7 +9677,7 @@
                           <a:ea typeface="+mn-ea"/>
                           <a:cs typeface="+mn-cs"/>
                         </a:rPr>
-                        <a:t> </a:t>
+                        <a:t>, </a:t>
                       </a:r>
                       <a:r>
                         <a:rPr lang="es-CO" sz="1300" baseline="0" dirty="0" smtClean="0">
@@ -6029,7 +9686,79 @@
                           <a:ea typeface="+mn-ea"/>
                           <a:cs typeface="+mn-cs"/>
                         </a:rPr>
-                        <a:t>e Historial.</a:t>
+                        <a:t>basura</a:t>
+                      </a:r>
+                      <a:r>
+                        <a:rPr lang="es-CO" sz="1300" baseline="0" dirty="0" smtClean="0">
+                          <a:effectLst/>
+                          <a:latin typeface="+mn-lt"/>
+                          <a:ea typeface="+mn-ea"/>
+                          <a:cs typeface="+mn-cs"/>
+                        </a:rPr>
+                        <a:t>, </a:t>
+                      </a:r>
+                      <a:r>
+                        <a:rPr lang="es-CO" sz="1300" baseline="0" dirty="0" err="1" smtClean="0">
+                          <a:effectLst/>
+                          <a:latin typeface="+mn-lt"/>
+                          <a:ea typeface="+mn-ea"/>
+                          <a:cs typeface="+mn-cs"/>
+                        </a:rPr>
+                        <a:t>categoria</a:t>
+                      </a:r>
+                      <a:r>
+                        <a:rPr lang="es-CO" sz="1300" baseline="0" dirty="0" smtClean="0">
+                          <a:effectLst/>
+                          <a:latin typeface="+mn-lt"/>
+                          <a:ea typeface="+mn-ea"/>
+                          <a:cs typeface="+mn-cs"/>
+                        </a:rPr>
+                        <a:t>, </a:t>
+                      </a:r>
+                      <a:r>
+                        <a:rPr lang="es-CO" sz="1300" baseline="0" dirty="0" err="1" smtClean="0">
+                          <a:effectLst/>
+                          <a:latin typeface="+mn-lt"/>
+                          <a:ea typeface="+mn-ea"/>
+                          <a:cs typeface="+mn-cs"/>
+                        </a:rPr>
+                        <a:t>empresa,datos</a:t>
+                      </a:r>
+                      <a:r>
+                        <a:rPr lang="es-CO" sz="1300" baseline="0" dirty="0" smtClean="0">
+                          <a:effectLst/>
+                          <a:latin typeface="+mn-lt"/>
+                          <a:ea typeface="+mn-ea"/>
+                          <a:cs typeface="+mn-cs"/>
+                        </a:rPr>
+                        <a:t> de contacto, maquina </a:t>
+                      </a:r>
+                      <a:r>
+                        <a:rPr lang="es-CO" sz="1300" baseline="0" dirty="0" smtClean="0">
+                          <a:effectLst/>
+                          <a:latin typeface="+mn-lt"/>
+                          <a:ea typeface="+mn-ea"/>
+                          <a:cs typeface="+mn-cs"/>
+                        </a:rPr>
+                        <a:t>e </a:t>
+                      </a:r>
+                      <a:r>
+                        <a:rPr lang="es-CO" sz="1300" baseline="0" dirty="0" smtClean="0">
+                          <a:effectLst/>
+                          <a:latin typeface="+mn-lt"/>
+                          <a:ea typeface="+mn-ea"/>
+                          <a:cs typeface="+mn-cs"/>
+                        </a:rPr>
+                        <a:t>historial</a:t>
+                      </a:r>
+                      <a:r>
+                        <a:rPr lang="es-CO" sz="1300" baseline="0" dirty="0" smtClean="0">
+                          <a:effectLst/>
+                          <a:latin typeface="+mn-lt"/>
+                          <a:ea typeface="+mn-ea"/>
+                          <a:cs typeface="+mn-cs"/>
+                        </a:rPr>
+                        <a:t>.</a:t>
                       </a:r>
                       <a:endParaRPr lang="en-US" sz="1300" dirty="0">
                         <a:effectLst/>
@@ -6103,13 +9832,7 @@
                         <a:rPr lang="es-CO" sz="1300" dirty="0" smtClean="0">
                           <a:effectLst/>
                         </a:rPr>
-                        <a:t>02 </a:t>
-                      </a:r>
-                      <a:r>
-                        <a:rPr lang="es-CO" sz="1300" dirty="0" smtClean="0">
-                          <a:effectLst/>
-                        </a:rPr>
-                        <a:t>Base</a:t>
+                        <a:t>02 Base</a:t>
                       </a:r>
                       <a:r>
                         <a:rPr lang="es-CO" sz="1300" baseline="0" dirty="0" smtClean="0">
@@ -6174,24 +9897,60 @@
                     <a:bodyPr/>
                     <a:lstStyle/>
                     <a:p>
-                      <a:pPr>
+                      <a:pPr marL="0" marR="0" indent="0" algn="l" defTabSz="914400" rtl="0" eaLnBrk="1" fontAlgn="auto" latinLnBrk="0" hangingPunct="1">
+                        <a:lnSpc>
+                          <a:spcPct val="100000"/>
+                        </a:lnSpc>
+                        <a:spcBef>
+                          <a:spcPts val="0"/>
+                        </a:spcBef>
                         <a:spcAft>
                           <a:spcPts val="0"/>
                         </a:spcAft>
+                        <a:buClrTx/>
+                        <a:buSzTx/>
+                        <a:buFontTx/>
+                        <a:buNone/>
+                        <a:tabLst/>
+                        <a:defRPr/>
                       </a:pPr>
                       <a:r>
-                        <a:rPr lang="es-CO" sz="1300" dirty="0" smtClean="0">
+                        <a:rPr lang="es-CO" sz="1200" dirty="0" smtClean="0">
                           <a:effectLst/>
                         </a:rPr>
                         <a:t>La</a:t>
                       </a:r>
                       <a:r>
-                        <a:rPr lang="es-CO" sz="1300" baseline="0" dirty="0" smtClean="0">
-                          <a:effectLst/>
-                        </a:rPr>
-                        <a:t> base de datos debe contar con un CRUD para las tablas de basura, categoría y usuario.</a:t>
-                      </a:r>
-                      <a:endParaRPr lang="en-US" sz="1300" dirty="0">
+                        <a:rPr lang="es-CO" sz="1200" baseline="0" dirty="0" smtClean="0">
+                          <a:effectLst/>
+                        </a:rPr>
+                        <a:t> base de datos debe contar con un CRUD para las tablas de basura, </a:t>
+                      </a:r>
+                      <a:r>
+                        <a:rPr lang="es-CO" sz="1200" baseline="0" dirty="0" err="1" smtClean="0">
+                          <a:effectLst/>
+                        </a:rPr>
+                        <a:t>categoría,datos</a:t>
+                      </a:r>
+                      <a:r>
+                        <a:rPr lang="es-CO" sz="1200" baseline="0" dirty="0" smtClean="0">
+                          <a:effectLst/>
+                        </a:rPr>
+                        <a:t> de </a:t>
+                      </a:r>
+                      <a:r>
+                        <a:rPr lang="es-CO" sz="1200" baseline="0" dirty="0" err="1" smtClean="0">
+                          <a:effectLst/>
+                        </a:rPr>
+                        <a:t>contacto,empresa</a:t>
+                      </a:r>
+                      <a:r>
+                        <a:rPr lang="es-CO" sz="1200" baseline="0" dirty="0" smtClean="0">
+                          <a:effectLst/>
+                        </a:rPr>
+                        <a:t>, maquina y usuario.</a:t>
+                      </a:r>
+                      <a:endParaRPr lang="en-US" sz="1200" dirty="0" smtClean="0">
                         <a:effectLst/>
                         <a:latin typeface="Times New Roman" panose="02020603050405020304" pitchFamily="18" charset="0"/>
                         <a:ea typeface="Times New Roman" panose="02020603050405020304" pitchFamily="18" charset="0"/>
@@ -6263,13 +10022,7 @@
                         <a:rPr lang="es-CO" sz="1300" dirty="0" smtClean="0">
                           <a:effectLst/>
                         </a:rPr>
-                        <a:t>03 </a:t>
-                      </a:r>
-                      <a:r>
-                        <a:rPr lang="es-CO" sz="1300" dirty="0" smtClean="0">
-                          <a:effectLst/>
-                        </a:rPr>
-                        <a:t>Base</a:t>
+                        <a:t>03 Base</a:t>
                       </a:r>
                       <a:r>
                         <a:rPr lang="es-CO" sz="1300" baseline="0" dirty="0" smtClean="0">
@@ -7199,16 +10952,7 @@
                           </a:solidFill>
                           <a:effectLst/>
                         </a:rPr>
-                        <a:t>#</a:t>
-                      </a:r>
-                      <a:r>
-                        <a:rPr lang="es-419" sz="2000" dirty="0" smtClean="0">
-                          <a:solidFill>
-                            <a:schemeClr val="tx1"/>
-                          </a:solidFill>
-                          <a:effectLst/>
-                        </a:rPr>
-                        <a:t>1.1</a:t>
+                        <a:t>#1.1</a:t>
                       </a:r>
                       <a:endParaRPr lang="en-US" sz="2400" dirty="0">
                         <a:solidFill>

</xml_diff>